<commit_message>
added Bahavior Pattern in General
</commit_message>
<xml_diff>
--- a/Behavioral Patterns - JS Patterns and Anti Patterns.pptx
+++ b/Behavioral Patterns - JS Patterns and Anti Patterns.pptx
@@ -500,7 +500,7 @@
   <p:cSld>
     <p:spTree>
       <p:nvGrpSpPr>
-        <p:cNvPr id="84" name="Shape 84"/>
+        <p:cNvPr id="85" name="Shape 85"/>
         <p:cNvGrpSpPr/>
         <p:nvPr/>
       </p:nvGrpSpPr>
@@ -514,7 +514,7 @@
       </p:grpSpPr>
       <p:sp>
         <p:nvSpPr>
-          <p:cNvPr id="85" name="Shape 85"/>
+          <p:cNvPr id="86" name="Shape 86"/>
           <p:cNvSpPr/>
           <p:nvPr>
             <p:ph idx="2" type="sldImg"/>
@@ -558,7 +558,7 @@
       </p:sp>
       <p:sp>
         <p:nvSpPr>
-          <p:cNvPr id="86" name="Shape 86"/>
+          <p:cNvPr id="87" name="Shape 87"/>
           <p:cNvSpPr txBox="1"/>
           <p:nvPr>
             <p:ph idx="1" type="body"/>
@@ -605,7 +605,7 @@
   <p:cSld>
     <p:spTree>
       <p:nvGrpSpPr>
-        <p:cNvPr id="93" name="Shape 93"/>
+        <p:cNvPr id="94" name="Shape 94"/>
         <p:cNvGrpSpPr/>
         <p:nvPr/>
       </p:nvGrpSpPr>
@@ -619,7 +619,7 @@
       </p:grpSpPr>
       <p:sp>
         <p:nvSpPr>
-          <p:cNvPr id="94" name="Shape 94"/>
+          <p:cNvPr id="95" name="Shape 95"/>
           <p:cNvSpPr/>
           <p:nvPr>
             <p:ph idx="2" type="sldImg"/>
@@ -663,7 +663,7 @@
       </p:sp>
       <p:sp>
         <p:nvSpPr>
-          <p:cNvPr id="95" name="Shape 95"/>
+          <p:cNvPr id="96" name="Shape 96"/>
           <p:cNvSpPr txBox="1"/>
           <p:nvPr>
             <p:ph idx="1" type="body"/>
@@ -710,7 +710,7 @@
   <p:cSld>
     <p:spTree>
       <p:nvGrpSpPr>
-        <p:cNvPr id="100" name="Shape 100"/>
+        <p:cNvPr id="101" name="Shape 101"/>
         <p:cNvGrpSpPr/>
         <p:nvPr/>
       </p:nvGrpSpPr>
@@ -724,7 +724,7 @@
       </p:grpSpPr>
       <p:sp>
         <p:nvSpPr>
-          <p:cNvPr id="101" name="Shape 101"/>
+          <p:cNvPr id="102" name="Shape 102"/>
           <p:cNvSpPr/>
           <p:nvPr>
             <p:ph idx="2" type="sldImg"/>
@@ -768,7 +768,7 @@
       </p:sp>
       <p:sp>
         <p:nvSpPr>
-          <p:cNvPr id="102" name="Shape 102"/>
+          <p:cNvPr id="103" name="Shape 103"/>
           <p:cNvSpPr txBox="1"/>
           <p:nvPr>
             <p:ph idx="1" type="body"/>
@@ -815,7 +815,7 @@
   <p:cSld>
     <p:spTree>
       <p:nvGrpSpPr>
-        <p:cNvPr id="107" name="Shape 107"/>
+        <p:cNvPr id="108" name="Shape 108"/>
         <p:cNvGrpSpPr/>
         <p:nvPr/>
       </p:nvGrpSpPr>
@@ -829,7 +829,7 @@
       </p:grpSpPr>
       <p:sp>
         <p:nvSpPr>
-          <p:cNvPr id="108" name="Shape 108"/>
+          <p:cNvPr id="109" name="Shape 109"/>
           <p:cNvSpPr/>
           <p:nvPr>
             <p:ph idx="2" type="sldImg"/>
@@ -873,7 +873,7 @@
       </p:sp>
       <p:sp>
         <p:nvSpPr>
-          <p:cNvPr id="109" name="Shape 109"/>
+          <p:cNvPr id="110" name="Shape 110"/>
           <p:cNvSpPr txBox="1"/>
           <p:nvPr>
             <p:ph idx="1" type="body"/>
@@ -920,7 +920,7 @@
   <p:cSld>
     <p:spTree>
       <p:nvGrpSpPr>
-        <p:cNvPr id="114" name="Shape 114"/>
+        <p:cNvPr id="115" name="Shape 115"/>
         <p:cNvGrpSpPr/>
         <p:nvPr/>
       </p:nvGrpSpPr>
@@ -934,7 +934,7 @@
       </p:grpSpPr>
       <p:sp>
         <p:nvSpPr>
-          <p:cNvPr id="115" name="Shape 115"/>
+          <p:cNvPr id="116" name="Shape 116"/>
           <p:cNvSpPr/>
           <p:nvPr>
             <p:ph idx="2" type="sldImg"/>
@@ -978,7 +978,7 @@
       </p:sp>
       <p:sp>
         <p:nvSpPr>
-          <p:cNvPr id="116" name="Shape 116"/>
+          <p:cNvPr id="117" name="Shape 117"/>
           <p:cNvSpPr txBox="1"/>
           <p:nvPr>
             <p:ph idx="1" type="body"/>
@@ -1025,7 +1025,7 @@
   <p:cSld>
     <p:spTree>
       <p:nvGrpSpPr>
-        <p:cNvPr id="121" name="Shape 121"/>
+        <p:cNvPr id="122" name="Shape 122"/>
         <p:cNvGrpSpPr/>
         <p:nvPr/>
       </p:nvGrpSpPr>
@@ -1039,7 +1039,7 @@
       </p:grpSpPr>
       <p:sp>
         <p:nvSpPr>
-          <p:cNvPr id="122" name="Shape 122"/>
+          <p:cNvPr id="123" name="Shape 123"/>
           <p:cNvSpPr/>
           <p:nvPr>
             <p:ph idx="2" type="sldImg"/>
@@ -1083,7 +1083,7 @@
       </p:sp>
       <p:sp>
         <p:nvSpPr>
-          <p:cNvPr id="123" name="Shape 123"/>
+          <p:cNvPr id="124" name="Shape 124"/>
           <p:cNvSpPr txBox="1"/>
           <p:nvPr>
             <p:ph idx="1" type="body"/>
@@ -1235,7 +1235,7 @@
   <p:cSld>
     <p:spTree>
       <p:nvGrpSpPr>
-        <p:cNvPr id="32" name="Shape 32"/>
+        <p:cNvPr id="33" name="Shape 33"/>
         <p:cNvGrpSpPr/>
         <p:nvPr/>
       </p:nvGrpSpPr>
@@ -1249,7 +1249,7 @@
       </p:grpSpPr>
       <p:sp>
         <p:nvSpPr>
-          <p:cNvPr id="33" name="Shape 33"/>
+          <p:cNvPr id="34" name="Shape 34"/>
           <p:cNvSpPr/>
           <p:nvPr>
             <p:ph idx="2" type="sldImg"/>
@@ -1293,7 +1293,7 @@
       </p:sp>
       <p:sp>
         <p:nvSpPr>
-          <p:cNvPr id="34" name="Shape 34"/>
+          <p:cNvPr id="35" name="Shape 35"/>
           <p:cNvSpPr txBox="1"/>
           <p:nvPr>
             <p:ph idx="1" type="body"/>
@@ -1340,7 +1340,7 @@
   <p:cSld>
     <p:spTree>
       <p:nvGrpSpPr>
-        <p:cNvPr id="40" name="Shape 40"/>
+        <p:cNvPr id="41" name="Shape 41"/>
         <p:cNvGrpSpPr/>
         <p:nvPr/>
       </p:nvGrpSpPr>
@@ -1354,7 +1354,7 @@
       </p:grpSpPr>
       <p:sp>
         <p:nvSpPr>
-          <p:cNvPr id="41" name="Shape 41"/>
+          <p:cNvPr id="42" name="Shape 42"/>
           <p:cNvSpPr/>
           <p:nvPr>
             <p:ph idx="2" type="sldImg"/>
@@ -1398,7 +1398,7 @@
       </p:sp>
       <p:sp>
         <p:nvSpPr>
-          <p:cNvPr id="42" name="Shape 42"/>
+          <p:cNvPr id="43" name="Shape 43"/>
           <p:cNvSpPr txBox="1"/>
           <p:nvPr>
             <p:ph idx="1" type="body"/>
@@ -1445,7 +1445,7 @@
   <p:cSld>
     <p:spTree>
       <p:nvGrpSpPr>
-        <p:cNvPr id="47" name="Shape 47"/>
+        <p:cNvPr id="48" name="Shape 48"/>
         <p:cNvGrpSpPr/>
         <p:nvPr/>
       </p:nvGrpSpPr>
@@ -1459,7 +1459,7 @@
       </p:grpSpPr>
       <p:sp>
         <p:nvSpPr>
-          <p:cNvPr id="48" name="Shape 48"/>
+          <p:cNvPr id="49" name="Shape 49"/>
           <p:cNvSpPr/>
           <p:nvPr>
             <p:ph idx="2" type="sldImg"/>
@@ -1503,7 +1503,7 @@
       </p:sp>
       <p:sp>
         <p:nvSpPr>
-          <p:cNvPr id="49" name="Shape 49"/>
+          <p:cNvPr id="50" name="Shape 50"/>
           <p:cNvSpPr txBox="1"/>
           <p:nvPr>
             <p:ph idx="1" type="body"/>
@@ -1550,7 +1550,7 @@
   <p:cSld>
     <p:spTree>
       <p:nvGrpSpPr>
-        <p:cNvPr id="56" name="Shape 56"/>
+        <p:cNvPr id="57" name="Shape 57"/>
         <p:cNvGrpSpPr/>
         <p:nvPr/>
       </p:nvGrpSpPr>
@@ -1564,7 +1564,7 @@
       </p:grpSpPr>
       <p:sp>
         <p:nvSpPr>
-          <p:cNvPr id="57" name="Shape 57"/>
+          <p:cNvPr id="58" name="Shape 58"/>
           <p:cNvSpPr/>
           <p:nvPr>
             <p:ph idx="2" type="sldImg"/>
@@ -1608,7 +1608,7 @@
       </p:sp>
       <p:sp>
         <p:nvSpPr>
-          <p:cNvPr id="58" name="Shape 58"/>
+          <p:cNvPr id="59" name="Shape 59"/>
           <p:cNvSpPr txBox="1"/>
           <p:nvPr>
             <p:ph idx="1" type="body"/>
@@ -1655,7 +1655,7 @@
   <p:cSld>
     <p:spTree>
       <p:nvGrpSpPr>
-        <p:cNvPr id="63" name="Shape 63"/>
+        <p:cNvPr id="64" name="Shape 64"/>
         <p:cNvGrpSpPr/>
         <p:nvPr/>
       </p:nvGrpSpPr>
@@ -1669,7 +1669,7 @@
       </p:grpSpPr>
       <p:sp>
         <p:nvSpPr>
-          <p:cNvPr id="64" name="Shape 64"/>
+          <p:cNvPr id="65" name="Shape 65"/>
           <p:cNvSpPr/>
           <p:nvPr>
             <p:ph idx="2" type="sldImg"/>
@@ -1713,7 +1713,7 @@
       </p:sp>
       <p:sp>
         <p:nvSpPr>
-          <p:cNvPr id="65" name="Shape 65"/>
+          <p:cNvPr id="66" name="Shape 66"/>
           <p:cNvSpPr txBox="1"/>
           <p:nvPr>
             <p:ph idx="1" type="body"/>
@@ -1760,7 +1760,7 @@
   <p:cSld>
     <p:spTree>
       <p:nvGrpSpPr>
-        <p:cNvPr id="70" name="Shape 70"/>
+        <p:cNvPr id="71" name="Shape 71"/>
         <p:cNvGrpSpPr/>
         <p:nvPr/>
       </p:nvGrpSpPr>
@@ -1774,7 +1774,7 @@
       </p:grpSpPr>
       <p:sp>
         <p:nvSpPr>
-          <p:cNvPr id="71" name="Shape 71"/>
+          <p:cNvPr id="72" name="Shape 72"/>
           <p:cNvSpPr/>
           <p:nvPr>
             <p:ph idx="2" type="sldImg"/>
@@ -1818,7 +1818,7 @@
       </p:sp>
       <p:sp>
         <p:nvSpPr>
-          <p:cNvPr id="72" name="Shape 72"/>
+          <p:cNvPr id="73" name="Shape 73"/>
           <p:cNvSpPr txBox="1"/>
           <p:nvPr>
             <p:ph idx="1" type="body"/>
@@ -1865,7 +1865,7 @@
   <p:cSld>
     <p:spTree>
       <p:nvGrpSpPr>
-        <p:cNvPr id="77" name="Shape 77"/>
+        <p:cNvPr id="78" name="Shape 78"/>
         <p:cNvGrpSpPr/>
         <p:nvPr/>
       </p:nvGrpSpPr>
@@ -1879,7 +1879,7 @@
       </p:grpSpPr>
       <p:sp>
         <p:nvSpPr>
-          <p:cNvPr id="78" name="Shape 78"/>
+          <p:cNvPr id="79" name="Shape 79"/>
           <p:cNvSpPr/>
           <p:nvPr>
             <p:ph idx="2" type="sldImg"/>
@@ -1923,7 +1923,7 @@
       </p:sp>
       <p:sp>
         <p:nvSpPr>
-          <p:cNvPr id="79" name="Shape 79"/>
+          <p:cNvPr id="80" name="Shape 80"/>
           <p:cNvSpPr txBox="1"/>
           <p:nvPr>
             <p:ph idx="1" type="body"/>
@@ -2587,7 +2587,7 @@
   <p:cSld name="Title Slide">
     <p:spTree>
       <p:nvGrpSpPr>
-        <p:cNvPr id="128" name="Shape 128"/>
+        <p:cNvPr id="129" name="Shape 129"/>
         <p:cNvGrpSpPr/>
         <p:nvPr/>
       </p:nvGrpSpPr>
@@ -2601,7 +2601,7 @@
       </p:grpSpPr>
       <p:sp>
         <p:nvSpPr>
-          <p:cNvPr id="129" name="Shape 129"/>
+          <p:cNvPr id="130" name="Shape 130"/>
           <p:cNvSpPr txBox="1"/>
           <p:nvPr>
             <p:ph type="ctrTitle"/>
@@ -2688,7 +2688,7 @@
       </p:sp>
       <p:sp>
         <p:nvSpPr>
-          <p:cNvPr id="130" name="Shape 130"/>
+          <p:cNvPr id="131" name="Shape 131"/>
           <p:cNvSpPr txBox="1"/>
           <p:nvPr>
             <p:ph idx="1" type="subTitle"/>
@@ -2846,7 +2846,7 @@
       </p:sp>
       <p:sp>
         <p:nvSpPr>
-          <p:cNvPr id="131" name="Shape 131"/>
+          <p:cNvPr id="132" name="Shape 132"/>
           <p:cNvSpPr txBox="1"/>
           <p:nvPr>
             <p:ph idx="12" type="sldNum"/>
@@ -2893,7 +2893,7 @@
   <p:cSld name="Title and Body">
     <p:spTree>
       <p:nvGrpSpPr>
-        <p:cNvPr id="132" name="Shape 132"/>
+        <p:cNvPr id="133" name="Shape 133"/>
         <p:cNvGrpSpPr/>
         <p:nvPr/>
       </p:nvGrpSpPr>
@@ -2907,7 +2907,7 @@
       </p:grpSpPr>
       <p:sp>
         <p:nvSpPr>
-          <p:cNvPr id="133" name="Shape 133"/>
+          <p:cNvPr id="134" name="Shape 134"/>
           <p:cNvSpPr txBox="1"/>
           <p:nvPr>
             <p:ph type="title"/>
@@ -2985,7 +2985,7 @@
       </p:sp>
       <p:sp>
         <p:nvSpPr>
-          <p:cNvPr id="134" name="Shape 134"/>
+          <p:cNvPr id="135" name="Shape 135"/>
           <p:cNvSpPr txBox="1"/>
           <p:nvPr>
             <p:ph idx="1" type="body"/>
@@ -3063,7 +3063,7 @@
       </p:sp>
       <p:sp>
         <p:nvSpPr>
-          <p:cNvPr id="135" name="Shape 135"/>
+          <p:cNvPr id="136" name="Shape 136"/>
           <p:cNvSpPr txBox="1"/>
           <p:nvPr>
             <p:ph idx="12" type="sldNum"/>
@@ -3110,7 +3110,7 @@
   <p:cSld name="Title and Two Columns">
     <p:spTree>
       <p:nvGrpSpPr>
-        <p:cNvPr id="136" name="Shape 136"/>
+        <p:cNvPr id="137" name="Shape 137"/>
         <p:cNvGrpSpPr/>
         <p:nvPr/>
       </p:nvGrpSpPr>
@@ -3124,7 +3124,7 @@
       </p:grpSpPr>
       <p:sp>
         <p:nvSpPr>
-          <p:cNvPr id="137" name="Shape 137"/>
+          <p:cNvPr id="138" name="Shape 138"/>
           <p:cNvSpPr txBox="1"/>
           <p:nvPr>
             <p:ph type="title"/>
@@ -3202,7 +3202,7 @@
       </p:sp>
       <p:sp>
         <p:nvSpPr>
-          <p:cNvPr id="138" name="Shape 138"/>
+          <p:cNvPr id="139" name="Shape 139"/>
           <p:cNvSpPr txBox="1"/>
           <p:nvPr>
             <p:ph idx="1" type="body"/>
@@ -3280,7 +3280,7 @@
       </p:sp>
       <p:sp>
         <p:nvSpPr>
-          <p:cNvPr id="139" name="Shape 139"/>
+          <p:cNvPr id="140" name="Shape 140"/>
           <p:cNvSpPr txBox="1"/>
           <p:nvPr>
             <p:ph idx="2" type="body"/>
@@ -3358,7 +3358,7 @@
       </p:sp>
       <p:sp>
         <p:nvSpPr>
-          <p:cNvPr id="140" name="Shape 140"/>
+          <p:cNvPr id="141" name="Shape 141"/>
           <p:cNvSpPr txBox="1"/>
           <p:nvPr>
             <p:ph idx="12" type="sldNum"/>
@@ -3405,7 +3405,7 @@
   <p:cSld name="Title Only">
     <p:spTree>
       <p:nvGrpSpPr>
-        <p:cNvPr id="141" name="Shape 141"/>
+        <p:cNvPr id="142" name="Shape 142"/>
         <p:cNvGrpSpPr/>
         <p:nvPr/>
       </p:nvGrpSpPr>
@@ -3419,7 +3419,7 @@
       </p:grpSpPr>
       <p:sp>
         <p:nvSpPr>
-          <p:cNvPr id="142" name="Shape 142"/>
+          <p:cNvPr id="143" name="Shape 143"/>
           <p:cNvSpPr txBox="1"/>
           <p:nvPr>
             <p:ph type="title"/>
@@ -3497,7 +3497,7 @@
       </p:sp>
       <p:sp>
         <p:nvSpPr>
-          <p:cNvPr id="143" name="Shape 143"/>
+          <p:cNvPr id="144" name="Shape 144"/>
           <p:cNvSpPr txBox="1"/>
           <p:nvPr>
             <p:ph idx="12" type="sldNum"/>
@@ -3544,7 +3544,7 @@
   <p:cSld name="Caption">
     <p:spTree>
       <p:nvGrpSpPr>
-        <p:cNvPr id="144" name="Shape 144"/>
+        <p:cNvPr id="145" name="Shape 145"/>
         <p:cNvGrpSpPr/>
         <p:nvPr/>
       </p:nvGrpSpPr>
@@ -3558,7 +3558,7 @@
       </p:grpSpPr>
       <p:sp>
         <p:nvSpPr>
-          <p:cNvPr id="145" name="Shape 145"/>
+          <p:cNvPr id="146" name="Shape 146"/>
           <p:cNvSpPr txBox="1"/>
           <p:nvPr>
             <p:ph idx="1" type="body"/>
@@ -3590,7 +3590,7 @@
       </p:sp>
       <p:sp>
         <p:nvSpPr>
-          <p:cNvPr id="146" name="Shape 146"/>
+          <p:cNvPr id="147" name="Shape 147"/>
           <p:cNvSpPr txBox="1"/>
           <p:nvPr>
             <p:ph idx="12" type="sldNum"/>
@@ -3637,7 +3637,7 @@
   <p:cSld name="Blank">
     <p:spTree>
       <p:nvGrpSpPr>
-        <p:cNvPr id="147" name="Shape 147"/>
+        <p:cNvPr id="148" name="Shape 148"/>
         <p:cNvGrpSpPr/>
         <p:nvPr/>
       </p:nvGrpSpPr>
@@ -3651,7 +3651,7 @@
       </p:grpSpPr>
       <p:sp>
         <p:nvSpPr>
-          <p:cNvPr id="148" name="Shape 148"/>
+          <p:cNvPr id="149" name="Shape 149"/>
           <p:cNvSpPr txBox="1"/>
           <p:nvPr>
             <p:ph idx="12" type="sldNum"/>
@@ -4276,7 +4276,7 @@
     </p:bg>
     <p:spTree>
       <p:nvGrpSpPr>
-        <p:cNvPr id="124" name="Shape 124"/>
+        <p:cNvPr id="125" name="Shape 125"/>
         <p:cNvGrpSpPr/>
         <p:nvPr/>
       </p:nvGrpSpPr>
@@ -4290,7 +4290,7 @@
       </p:grpSpPr>
       <p:sp>
         <p:nvSpPr>
-          <p:cNvPr id="125" name="Shape 125"/>
+          <p:cNvPr id="126" name="Shape 126"/>
           <p:cNvSpPr txBox="1"/>
           <p:nvPr>
             <p:ph type="title"/>
@@ -4453,7 +4453,7 @@
       </p:sp>
       <p:sp>
         <p:nvSpPr>
-          <p:cNvPr id="126" name="Shape 126"/>
+          <p:cNvPr id="127" name="Shape 127"/>
           <p:cNvSpPr txBox="1"/>
           <p:nvPr>
             <p:ph idx="1" type="body"/>
@@ -4607,7 +4607,7 @@
       </p:sp>
       <p:sp>
         <p:nvSpPr>
-          <p:cNvPr id="127" name="Shape 127"/>
+          <p:cNvPr id="128" name="Shape 128"/>
           <p:cNvSpPr txBox="1"/>
           <p:nvPr>
             <p:ph idx="12" type="sldNum"/>
@@ -5311,7 +5311,7 @@
   <p:cSld>
     <p:spTree>
       <p:nvGrpSpPr>
-        <p:cNvPr id="80" name="Shape 80"/>
+        <p:cNvPr id="81" name="Shape 81"/>
         <p:cNvGrpSpPr/>
         <p:nvPr/>
       </p:nvGrpSpPr>
@@ -5325,7 +5325,7 @@
       </p:grpSpPr>
       <p:sp>
         <p:nvSpPr>
-          <p:cNvPr id="81" name="Shape 81"/>
+          <p:cNvPr id="82" name="Shape 82"/>
           <p:cNvSpPr txBox="1"/>
           <p:nvPr>
             <p:ph type="title"/>
@@ -5369,7 +5369,7 @@
       </p:sp>
       <p:sp>
         <p:nvSpPr>
-          <p:cNvPr id="82" name="Shape 82"/>
+          <p:cNvPr id="83" name="Shape 83"/>
           <p:cNvSpPr txBox="1"/>
           <p:nvPr>
             <p:ph idx="1" type="body"/>
@@ -5471,7 +5471,7 @@
       </p:sp>
       <p:sp>
         <p:nvSpPr>
-          <p:cNvPr id="83" name="Shape 83"/>
+          <p:cNvPr id="84" name="Shape 84"/>
           <p:cNvSpPr txBox="1"/>
           <p:nvPr/>
         </p:nvSpPr>
@@ -5537,7 +5537,7 @@
   <p:cSld>
     <p:spTree>
       <p:nvGrpSpPr>
-        <p:cNvPr id="87" name="Shape 87"/>
+        <p:cNvPr id="88" name="Shape 88"/>
         <p:cNvGrpSpPr/>
         <p:nvPr/>
       </p:nvGrpSpPr>
@@ -5551,7 +5551,7 @@
       </p:grpSpPr>
       <p:sp>
         <p:nvSpPr>
-          <p:cNvPr id="88" name="Shape 88"/>
+          <p:cNvPr id="89" name="Shape 89"/>
           <p:cNvSpPr txBox="1"/>
           <p:nvPr>
             <p:ph type="title"/>
@@ -5595,7 +5595,7 @@
       </p:sp>
       <p:sp>
         <p:nvSpPr>
-          <p:cNvPr id="89" name="Shape 89"/>
+          <p:cNvPr id="90" name="Shape 90"/>
           <p:cNvSpPr txBox="1"/>
           <p:nvPr>
             <p:ph idx="1" type="body"/>
@@ -5700,7 +5700,7 @@
       </p:sp>
       <p:sp>
         <p:nvSpPr>
-          <p:cNvPr id="90" name="Shape 90"/>
+          <p:cNvPr id="91" name="Shape 91"/>
           <p:cNvSpPr txBox="1"/>
           <p:nvPr/>
         </p:nvSpPr>
@@ -5752,7 +5752,7 @@
       </p:sp>
       <p:sp>
         <p:nvSpPr>
-          <p:cNvPr id="91" name="Shape 91"/>
+          <p:cNvPr id="92" name="Shape 92"/>
           <p:cNvSpPr txBox="1"/>
           <p:nvPr/>
         </p:nvSpPr>
@@ -5790,7 +5790,7 @@
       </p:sp>
       <p:pic>
         <p:nvPicPr>
-          <p:cNvPr id="92" name="Shape 92"/>
+          <p:cNvPr id="93" name="Shape 93"/>
           <p:cNvPicPr preferRelativeResize="0"/>
           <p:nvPr/>
         </p:nvPicPr>
@@ -5832,7 +5832,7 @@
   <p:cSld>
     <p:spTree>
       <p:nvGrpSpPr>
-        <p:cNvPr id="96" name="Shape 96"/>
+        <p:cNvPr id="97" name="Shape 97"/>
         <p:cNvGrpSpPr/>
         <p:nvPr/>
       </p:nvGrpSpPr>
@@ -5846,7 +5846,7 @@
       </p:grpSpPr>
       <p:sp>
         <p:nvSpPr>
-          <p:cNvPr id="97" name="Shape 97"/>
+          <p:cNvPr id="98" name="Shape 98"/>
           <p:cNvSpPr txBox="1"/>
           <p:nvPr>
             <p:ph type="title"/>
@@ -5890,7 +5890,7 @@
       </p:sp>
       <p:sp>
         <p:nvSpPr>
-          <p:cNvPr id="98" name="Shape 98"/>
+          <p:cNvPr id="99" name="Shape 99"/>
           <p:cNvSpPr txBox="1"/>
           <p:nvPr>
             <p:ph idx="1" type="body"/>
@@ -6099,7 +6099,7 @@
       </p:sp>
       <p:sp>
         <p:nvSpPr>
-          <p:cNvPr id="99" name="Shape 99"/>
+          <p:cNvPr id="100" name="Shape 100"/>
           <p:cNvSpPr txBox="1"/>
           <p:nvPr/>
         </p:nvSpPr>
@@ -6165,7 +6165,7 @@
   <p:cSld>
     <p:spTree>
       <p:nvGrpSpPr>
-        <p:cNvPr id="103" name="Shape 103"/>
+        <p:cNvPr id="104" name="Shape 104"/>
         <p:cNvGrpSpPr/>
         <p:nvPr/>
       </p:nvGrpSpPr>
@@ -6179,7 +6179,7 @@
       </p:grpSpPr>
       <p:sp>
         <p:nvSpPr>
-          <p:cNvPr id="104" name="Shape 104"/>
+          <p:cNvPr id="105" name="Shape 105"/>
           <p:cNvSpPr txBox="1"/>
           <p:nvPr>
             <p:ph type="title"/>
@@ -6223,7 +6223,7 @@
       </p:sp>
       <p:sp>
         <p:nvSpPr>
-          <p:cNvPr id="105" name="Shape 105"/>
+          <p:cNvPr id="106" name="Shape 106"/>
           <p:cNvSpPr txBox="1"/>
           <p:nvPr>
             <p:ph idx="1" type="body"/>
@@ -6556,7 +6556,7 @@
       </p:sp>
       <p:sp>
         <p:nvSpPr>
-          <p:cNvPr id="106" name="Shape 106"/>
+          <p:cNvPr id="107" name="Shape 107"/>
           <p:cNvSpPr txBox="1"/>
           <p:nvPr/>
         </p:nvSpPr>
@@ -6622,7 +6622,7 @@
   <p:cSld>
     <p:spTree>
       <p:nvGrpSpPr>
-        <p:cNvPr id="110" name="Shape 110"/>
+        <p:cNvPr id="111" name="Shape 111"/>
         <p:cNvGrpSpPr/>
         <p:nvPr/>
       </p:nvGrpSpPr>
@@ -6636,7 +6636,7 @@
       </p:grpSpPr>
       <p:sp>
         <p:nvSpPr>
-          <p:cNvPr id="111" name="Shape 111"/>
+          <p:cNvPr id="112" name="Shape 112"/>
           <p:cNvSpPr txBox="1"/>
           <p:nvPr>
             <p:ph type="title"/>
@@ -6700,7 +6700,7 @@
       </p:sp>
       <p:sp>
         <p:nvSpPr>
-          <p:cNvPr id="112" name="Shape 112"/>
+          <p:cNvPr id="113" name="Shape 113"/>
           <p:cNvSpPr txBox="1"/>
           <p:nvPr>
             <p:ph idx="1" type="body"/>
@@ -7034,7 +7034,7 @@
       </p:sp>
       <p:sp>
         <p:nvSpPr>
-          <p:cNvPr id="113" name="Shape 113"/>
+          <p:cNvPr id="114" name="Shape 114"/>
           <p:cNvSpPr txBox="1"/>
           <p:nvPr/>
         </p:nvSpPr>
@@ -7100,7 +7100,7 @@
   <p:cSld>
     <p:spTree>
       <p:nvGrpSpPr>
-        <p:cNvPr id="117" name="Shape 117"/>
+        <p:cNvPr id="118" name="Shape 118"/>
         <p:cNvGrpSpPr/>
         <p:nvPr/>
       </p:nvGrpSpPr>
@@ -7114,7 +7114,7 @@
       </p:grpSpPr>
       <p:sp>
         <p:nvSpPr>
-          <p:cNvPr id="118" name="Shape 118"/>
+          <p:cNvPr id="119" name="Shape 119"/>
           <p:cNvSpPr txBox="1"/>
           <p:nvPr>
             <p:ph type="title"/>
@@ -7178,7 +7178,7 @@
       </p:sp>
       <p:sp>
         <p:nvSpPr>
-          <p:cNvPr id="119" name="Shape 119"/>
+          <p:cNvPr id="120" name="Shape 120"/>
           <p:cNvSpPr txBox="1"/>
           <p:nvPr>
             <p:ph idx="1" type="body"/>
@@ -7209,7 +7209,7 @@
               <a:buNone/>
             </a:pPr>
             <a:r>
-              <a:rPr lang="en-GB" sz="2400" u="sng">
+              <a:rPr lang="en-GB" u="sng">
                 <a:solidFill>
                   <a:schemeClr val="hlink"/>
                 </a:solidFill>
@@ -7229,7 +7229,7 @@
               <a:buNone/>
             </a:pPr>
             <a:r>
-              <a:rPr lang="en-GB" sz="2400" u="sng">
+              <a:rPr lang="en-GB" u="sng">
                 <a:solidFill>
                   <a:schemeClr val="hlink"/>
                 </a:solidFill>
@@ -7249,7 +7249,7 @@
               <a:buNone/>
             </a:pPr>
             <a:r>
-              <a:rPr lang="en-GB" sz="2400" u="sng">
+              <a:rPr lang="en-GB" u="sng">
                 <a:solidFill>
                   <a:schemeClr val="hlink"/>
                 </a:solidFill>
@@ -7259,6 +7259,26 @@
             </a:r>
           </a:p>
           <a:p>
+            <a:pPr rtl="0">
+              <a:lnSpc>
+                <a:spcPct val="150000"/>
+              </a:lnSpc>
+              <a:spcBef>
+                <a:spcPts val="0"/>
+              </a:spcBef>
+              <a:buNone/>
+            </a:pPr>
+            <a:r>
+              <a:rPr lang="en-GB" u="sng">
+                <a:solidFill>
+                  <a:schemeClr val="hlink"/>
+                </a:solidFill>
+                <a:hlinkClick r:id="rId6"/>
+              </a:rPr>
+              <a:t>https://de.wikipedia.org/wiki/Memento_%28Entwurfsmuster%29</a:t>
+            </a:r>
+          </a:p>
+          <a:p>
             <a:pPr lvl="0" rtl="0">
               <a:lnSpc>
                 <a:spcPct val="150000"/>
@@ -7269,8 +7289,12 @@
               <a:buNone/>
             </a:pPr>
             <a:r>
-              <a:rPr lang="en-GB" sz="2400"/>
-              <a:t>https://de.wikipedia.org/wiki/Memento_%28Entwurfsmuster%29</a:t>
+              <a:rPr b="1" lang="en-GB"/>
+              <a:t>(Osmani, A. (2012).</a:t>
+            </a:r>
+            <a:r>
+              <a:rPr lang="en-GB"/>
+              <a:t> Learning JavaScript Design Patterns. O'Reilly Media, Inc.)</a:t>
             </a:r>
           </a:p>
           <a:p>
@@ -7289,7 +7313,7 @@
       </p:sp>
       <p:sp>
         <p:nvSpPr>
-          <p:cNvPr id="120" name="Shape 120"/>
+          <p:cNvPr id="121" name="Shape 121"/>
           <p:cNvSpPr txBox="1"/>
           <p:nvPr/>
         </p:nvSpPr>
@@ -7667,6 +7691,139 @@
             </a:r>
           </a:p>
           <a:p>
+            <a:pPr indent="-381000" lvl="0" marL="457200" rtl="0">
+              <a:spcBef>
+                <a:spcPts val="0"/>
+              </a:spcBef>
+              <a:buSzPct val="100000"/>
+              <a:buFont typeface="Helvetica Neue"/>
+              <a:buChar char="●"/>
+            </a:pPr>
+            <a:r>
+              <a:rPr lang="en-GB" sz="2400">
+                <a:latin typeface="Helvetica Neue"/>
+                <a:ea typeface="Helvetica Neue"/>
+                <a:cs typeface="Helvetica Neue"/>
+                <a:sym typeface="Helvetica Neue"/>
+              </a:rPr>
+              <a:t>Chain of responsibility</a:t>
+            </a:r>
+          </a:p>
+          <a:p>
+            <a:pPr indent="-381000" lvl="0" marL="457200" rtl="0">
+              <a:spcBef>
+                <a:spcPts val="0"/>
+              </a:spcBef>
+              <a:buSzPct val="100000"/>
+              <a:buFont typeface="Helvetica Neue"/>
+              <a:buChar char="●"/>
+            </a:pPr>
+            <a:r>
+              <a:rPr lang="en-GB" sz="2400">
+                <a:latin typeface="Helvetica Neue"/>
+                <a:ea typeface="Helvetica Neue"/>
+                <a:cs typeface="Helvetica Neue"/>
+                <a:sym typeface="Helvetica Neue"/>
+              </a:rPr>
+              <a:t>Command</a:t>
+            </a:r>
+          </a:p>
+          <a:p>
+            <a:pPr indent="-381000" lvl="0" marL="457200" rtl="0">
+              <a:spcBef>
+                <a:spcPts val="0"/>
+              </a:spcBef>
+              <a:buSzPct val="100000"/>
+              <a:buFont typeface="Helvetica Neue"/>
+              <a:buChar char="●"/>
+            </a:pPr>
+            <a:r>
+              <a:rPr lang="en-GB" sz="2400">
+                <a:latin typeface="Helvetica Neue"/>
+                <a:ea typeface="Helvetica Neue"/>
+                <a:cs typeface="Helvetica Neue"/>
+                <a:sym typeface="Helvetica Neue"/>
+              </a:rPr>
+              <a:t>Interpreter</a:t>
+            </a:r>
+          </a:p>
+          <a:p>
+            <a:pPr indent="-381000" lvl="0" marL="457200" rtl="0">
+              <a:spcBef>
+                <a:spcPts val="0"/>
+              </a:spcBef>
+              <a:buSzPct val="100000"/>
+              <a:buFont typeface="Helvetica Neue"/>
+              <a:buChar char="●"/>
+            </a:pPr>
+            <a:r>
+              <a:rPr lang="en-GB" sz="2400">
+                <a:latin typeface="Helvetica Neue"/>
+                <a:ea typeface="Helvetica Neue"/>
+                <a:cs typeface="Helvetica Neue"/>
+                <a:sym typeface="Helvetica Neue"/>
+              </a:rPr>
+              <a:t>Iterator</a:t>
+            </a:r>
+          </a:p>
+          <a:p>
+            <a:pPr indent="-381000" lvl="0" marL="457200" rtl="0">
+              <a:spcBef>
+                <a:spcPts val="0"/>
+              </a:spcBef>
+              <a:buSzPct val="100000"/>
+              <a:buFont typeface="Helvetica Neue"/>
+              <a:buChar char="●"/>
+            </a:pPr>
+            <a:r>
+              <a:rPr lang="en-GB" sz="2400">
+                <a:latin typeface="Helvetica Neue"/>
+                <a:ea typeface="Helvetica Neue"/>
+                <a:cs typeface="Helvetica Neue"/>
+                <a:sym typeface="Helvetica Neue"/>
+              </a:rPr>
+              <a:t>Mediator</a:t>
+            </a:r>
+          </a:p>
+          <a:p>
+            <a:pPr indent="-381000" lvl="0" marL="457200" rtl="0">
+              <a:spcBef>
+                <a:spcPts val="0"/>
+              </a:spcBef>
+              <a:buSzPct val="100000"/>
+              <a:buFont typeface="Helvetica Neue"/>
+              <a:buChar char="●"/>
+            </a:pPr>
+            <a:r>
+              <a:rPr lang="en-GB" sz="2400">
+                <a:latin typeface="Helvetica Neue"/>
+                <a:ea typeface="Helvetica Neue"/>
+                <a:cs typeface="Helvetica Neue"/>
+                <a:sym typeface="Helvetica Neue"/>
+              </a:rPr>
+              <a:t>Memento</a:t>
+            </a:r>
+          </a:p>
+          <a:p>
+            <a:pPr indent="-381000" lvl="0" marL="457200" rtl="0">
+              <a:spcBef>
+                <a:spcPts val="0"/>
+              </a:spcBef>
+              <a:buSzPct val="100000"/>
+              <a:buFont typeface="Helvetica Neue"/>
+              <a:buChar char="●"/>
+            </a:pPr>
+            <a:r>
+              <a:rPr lang="en-GB" sz="2400">
+                <a:latin typeface="Helvetica Neue"/>
+                <a:ea typeface="Helvetica Neue"/>
+                <a:cs typeface="Helvetica Neue"/>
+                <a:sym typeface="Helvetica Neue"/>
+              </a:rPr>
+              <a:t>Null Object </a:t>
+            </a:r>
+          </a:p>
+          <a:p>
             <a:pPr lvl="0" rtl="0">
               <a:spcBef>
                 <a:spcPts val="0"/>
@@ -7732,6 +7889,114 @@
           </a:p>
         </p:txBody>
       </p:sp>
+      <p:sp>
+        <p:nvSpPr>
+          <p:cNvPr id="32" name="Shape 32"/>
+          <p:cNvSpPr txBox="1"/>
+          <p:nvPr/>
+        </p:nvSpPr>
+        <p:spPr>
+          <a:xfrm>
+            <a:off x="4328075" y="2520900"/>
+            <a:ext cx="4445399" cy="2936700"/>
+          </a:xfrm>
+          <a:prstGeom prst="rect">
+            <a:avLst/>
+          </a:prstGeom>
+          <a:noFill/>
+          <a:ln>
+            <a:noFill/>
+          </a:ln>
+        </p:spPr>
+        <p:txBody>
+          <a:bodyPr anchorCtr="0" anchor="t" bIns="91425" lIns="91425" rIns="91425" tIns="91425">
+            <a:noAutofit/>
+          </a:bodyPr>
+          <a:lstStyle/>
+          <a:p>
+            <a:pPr indent="-381000" lvl="0" marL="457200" rtl="0">
+              <a:spcBef>
+                <a:spcPts val="0"/>
+              </a:spcBef>
+              <a:buSzPct val="100000"/>
+              <a:buChar char="●"/>
+            </a:pPr>
+            <a:r>
+              <a:rPr lang="en-GB" sz="2400"/>
+              <a:t>Observer</a:t>
+            </a:r>
+          </a:p>
+          <a:p>
+            <a:pPr indent="-381000" lvl="0" marL="457200" rtl="0">
+              <a:spcBef>
+                <a:spcPts val="0"/>
+              </a:spcBef>
+              <a:buSzPct val="100000"/>
+              <a:buChar char="●"/>
+            </a:pPr>
+            <a:r>
+              <a:rPr lang="en-GB" sz="2400"/>
+              <a:t>State</a:t>
+            </a:r>
+          </a:p>
+          <a:p>
+            <a:pPr indent="-381000" lvl="0" marL="457200" rtl="0">
+              <a:spcBef>
+                <a:spcPts val="0"/>
+              </a:spcBef>
+              <a:buSzPct val="100000"/>
+              <a:buChar char="●"/>
+            </a:pPr>
+            <a:r>
+              <a:rPr lang="en-GB" sz="2400"/>
+              <a:t>Strategy</a:t>
+            </a:r>
+          </a:p>
+          <a:p>
+            <a:pPr indent="-381000" lvl="0" marL="457200" rtl="0">
+              <a:spcBef>
+                <a:spcPts val="0"/>
+              </a:spcBef>
+              <a:buSzPct val="100000"/>
+              <a:buChar char="●"/>
+            </a:pPr>
+            <a:r>
+              <a:rPr lang="en-GB" sz="2400"/>
+              <a:t>Template method</a:t>
+            </a:r>
+          </a:p>
+          <a:p>
+            <a:pPr indent="-381000" lvl="0" marL="457200" rtl="0">
+              <a:spcBef>
+                <a:spcPts val="0"/>
+              </a:spcBef>
+              <a:buSzPct val="100000"/>
+              <a:buChar char="●"/>
+            </a:pPr>
+            <a:r>
+              <a:rPr lang="en-GB" sz="2400"/>
+              <a:t>Visitor</a:t>
+            </a:r>
+          </a:p>
+          <a:p>
+            <a:pPr>
+              <a:spcBef>
+                <a:spcPts val="0"/>
+              </a:spcBef>
+              <a:buNone/>
+            </a:pPr>
+            <a:r>
+              <a:t/>
+            </a:r>
+            <a:endParaRPr sz="2400">
+              <a:latin typeface="Helvetica Neue"/>
+              <a:ea typeface="Helvetica Neue"/>
+              <a:cs typeface="Helvetica Neue"/>
+              <a:sym typeface="Helvetica Neue"/>
+            </a:endParaRPr>
+          </a:p>
+        </p:txBody>
+      </p:sp>
     </p:spTree>
   </p:cSld>
   <p:clrMapOvr>
@@ -7748,7 +8013,7 @@
   <p:cSld>
     <p:spTree>
       <p:nvGrpSpPr>
-        <p:cNvPr id="35" name="Shape 35"/>
+        <p:cNvPr id="36" name="Shape 36"/>
         <p:cNvGrpSpPr/>
         <p:nvPr/>
       </p:nvGrpSpPr>
@@ -7762,7 +8027,7 @@
       </p:grpSpPr>
       <p:sp>
         <p:nvSpPr>
-          <p:cNvPr id="36" name="Shape 36"/>
+          <p:cNvPr id="37" name="Shape 37"/>
           <p:cNvSpPr txBox="1"/>
           <p:nvPr>
             <p:ph type="title"/>
@@ -7806,7 +8071,7 @@
       </p:sp>
       <p:sp>
         <p:nvSpPr>
-          <p:cNvPr id="37" name="Shape 37"/>
+          <p:cNvPr id="38" name="Shape 38"/>
           <p:cNvSpPr txBox="1"/>
           <p:nvPr>
             <p:ph idx="1" type="body"/>
@@ -7908,7 +8173,7 @@
       </p:sp>
       <p:sp>
         <p:nvSpPr>
-          <p:cNvPr id="38" name="Shape 38"/>
+          <p:cNvPr id="39" name="Shape 39"/>
           <p:cNvSpPr txBox="1"/>
           <p:nvPr/>
         </p:nvSpPr>
@@ -7960,7 +8225,7 @@
       </p:sp>
       <p:pic>
         <p:nvPicPr>
-          <p:cNvPr id="39" name="Shape 39"/>
+          <p:cNvPr id="40" name="Shape 40"/>
           <p:cNvPicPr preferRelativeResize="0"/>
           <p:nvPr/>
         </p:nvPicPr>
@@ -8002,7 +8267,7 @@
   <p:cSld>
     <p:spTree>
       <p:nvGrpSpPr>
-        <p:cNvPr id="43" name="Shape 43"/>
+        <p:cNvPr id="44" name="Shape 44"/>
         <p:cNvGrpSpPr/>
         <p:nvPr/>
       </p:nvGrpSpPr>
@@ -8016,7 +8281,7 @@
       </p:grpSpPr>
       <p:sp>
         <p:nvSpPr>
-          <p:cNvPr id="44" name="Shape 44"/>
+          <p:cNvPr id="45" name="Shape 45"/>
           <p:cNvSpPr txBox="1"/>
           <p:nvPr>
             <p:ph type="title"/>
@@ -8060,7 +8325,7 @@
       </p:sp>
       <p:sp>
         <p:nvSpPr>
-          <p:cNvPr id="45" name="Shape 45"/>
+          <p:cNvPr id="46" name="Shape 46"/>
           <p:cNvSpPr txBox="1"/>
           <p:nvPr>
             <p:ph idx="1" type="body"/>
@@ -8180,7 +8445,7 @@
       </p:sp>
       <p:sp>
         <p:nvSpPr>
-          <p:cNvPr id="46" name="Shape 46"/>
+          <p:cNvPr id="47" name="Shape 47"/>
           <p:cNvSpPr txBox="1"/>
           <p:nvPr/>
         </p:nvSpPr>
@@ -8246,7 +8511,7 @@
   <p:cSld>
     <p:spTree>
       <p:nvGrpSpPr>
-        <p:cNvPr id="50" name="Shape 50"/>
+        <p:cNvPr id="51" name="Shape 51"/>
         <p:cNvGrpSpPr/>
         <p:nvPr/>
       </p:nvGrpSpPr>
@@ -8260,7 +8525,7 @@
       </p:grpSpPr>
       <p:pic>
         <p:nvPicPr>
-          <p:cNvPr id="51" name="Shape 51"/>
+          <p:cNvPr id="52" name="Shape 52"/>
           <p:cNvPicPr preferRelativeResize="0"/>
           <p:nvPr/>
         </p:nvPicPr>
@@ -8288,7 +8553,7 @@
       </p:pic>
       <p:sp>
         <p:nvSpPr>
-          <p:cNvPr id="52" name="Shape 52"/>
+          <p:cNvPr id="53" name="Shape 53"/>
           <p:cNvSpPr txBox="1"/>
           <p:nvPr>
             <p:ph type="title"/>
@@ -8332,7 +8597,7 @@
       </p:sp>
       <p:sp>
         <p:nvSpPr>
-          <p:cNvPr id="53" name="Shape 53"/>
+          <p:cNvPr id="54" name="Shape 54"/>
           <p:cNvSpPr txBox="1"/>
           <p:nvPr>
             <p:ph idx="1" type="body"/>
@@ -8456,7 +8721,7 @@
       </p:sp>
       <p:sp>
         <p:nvSpPr>
-          <p:cNvPr id="54" name="Shape 54"/>
+          <p:cNvPr id="55" name="Shape 55"/>
           <p:cNvSpPr txBox="1"/>
           <p:nvPr/>
         </p:nvSpPr>
@@ -8508,7 +8773,7 @@
       </p:sp>
       <p:sp>
         <p:nvSpPr>
-          <p:cNvPr id="55" name="Shape 55"/>
+          <p:cNvPr id="56" name="Shape 56"/>
           <p:cNvSpPr txBox="1"/>
           <p:nvPr/>
         </p:nvSpPr>
@@ -8560,7 +8825,7 @@
   <p:cSld>
     <p:spTree>
       <p:nvGrpSpPr>
-        <p:cNvPr id="59" name="Shape 59"/>
+        <p:cNvPr id="60" name="Shape 60"/>
         <p:cNvGrpSpPr/>
         <p:nvPr/>
       </p:nvGrpSpPr>
@@ -8574,7 +8839,7 @@
       </p:grpSpPr>
       <p:sp>
         <p:nvSpPr>
-          <p:cNvPr id="60" name="Shape 60"/>
+          <p:cNvPr id="61" name="Shape 61"/>
           <p:cNvSpPr txBox="1"/>
           <p:nvPr>
             <p:ph type="title"/>
@@ -8618,7 +8883,7 @@
       </p:sp>
       <p:sp>
         <p:nvSpPr>
-          <p:cNvPr id="61" name="Shape 61"/>
+          <p:cNvPr id="62" name="Shape 62"/>
           <p:cNvSpPr txBox="1"/>
           <p:nvPr>
             <p:ph idx="1" type="body"/>
@@ -8874,7 +9139,7 @@
       </p:sp>
       <p:sp>
         <p:nvSpPr>
-          <p:cNvPr id="62" name="Shape 62"/>
+          <p:cNvPr id="63" name="Shape 63"/>
           <p:cNvSpPr txBox="1"/>
           <p:nvPr/>
         </p:nvSpPr>
@@ -8940,7 +9205,7 @@
   <p:cSld>
     <p:spTree>
       <p:nvGrpSpPr>
-        <p:cNvPr id="66" name="Shape 66"/>
+        <p:cNvPr id="67" name="Shape 67"/>
         <p:cNvGrpSpPr/>
         <p:nvPr/>
       </p:nvGrpSpPr>
@@ -8954,7 +9219,7 @@
       </p:grpSpPr>
       <p:sp>
         <p:nvSpPr>
-          <p:cNvPr id="67" name="Shape 67"/>
+          <p:cNvPr id="68" name="Shape 68"/>
           <p:cNvSpPr txBox="1"/>
           <p:nvPr>
             <p:ph type="title"/>
@@ -8998,7 +9263,7 @@
       </p:sp>
       <p:sp>
         <p:nvSpPr>
-          <p:cNvPr id="68" name="Shape 68"/>
+          <p:cNvPr id="69" name="Shape 69"/>
           <p:cNvSpPr txBox="1"/>
           <p:nvPr>
             <p:ph idx="1" type="body"/>
@@ -9377,7 +9642,7 @@
       </p:sp>
       <p:sp>
         <p:nvSpPr>
-          <p:cNvPr id="69" name="Shape 69"/>
+          <p:cNvPr id="70" name="Shape 70"/>
           <p:cNvSpPr txBox="1"/>
           <p:nvPr/>
         </p:nvSpPr>
@@ -9443,7 +9708,7 @@
   <p:cSld>
     <p:spTree>
       <p:nvGrpSpPr>
-        <p:cNvPr id="73" name="Shape 73"/>
+        <p:cNvPr id="74" name="Shape 74"/>
         <p:cNvGrpSpPr/>
         <p:nvPr/>
       </p:nvGrpSpPr>
@@ -9457,7 +9722,7 @@
       </p:grpSpPr>
       <p:sp>
         <p:nvSpPr>
-          <p:cNvPr id="74" name="Shape 74"/>
+          <p:cNvPr id="75" name="Shape 75"/>
           <p:cNvSpPr txBox="1"/>
           <p:nvPr>
             <p:ph type="title"/>
@@ -9521,7 +9786,7 @@
       </p:sp>
       <p:sp>
         <p:nvSpPr>
-          <p:cNvPr id="75" name="Shape 75"/>
+          <p:cNvPr id="76" name="Shape 76"/>
           <p:cNvSpPr txBox="1"/>
           <p:nvPr>
             <p:ph idx="1" type="body"/>
@@ -9773,7 +10038,7 @@
       </p:sp>
       <p:sp>
         <p:nvSpPr>
-          <p:cNvPr id="76" name="Shape 76"/>
+          <p:cNvPr id="77" name="Shape 77"/>
           <p:cNvSpPr txBox="1"/>
           <p:nvPr/>
         </p:nvSpPr>
@@ -9835,44 +10100,44 @@
 </file>
 
 <file path=ppt/theme/theme1.xml><?xml version="1.0" encoding="utf-8"?>
-<a:theme xmlns:a="http://schemas.openxmlformats.org/drawingml/2006/main" xmlns:r="http://schemas.openxmlformats.org/officeDocument/2006/relationships" name="simple-light">
+<a:theme xmlns:a="http://schemas.openxmlformats.org/drawingml/2006/main" xmlns:r="http://schemas.openxmlformats.org/officeDocument/2006/relationships" name="VT_Vorlage_Präsentation_Ma">
   <a:themeElements>
-    <a:clrScheme name="Custom 347">
+    <a:clrScheme name="">
       <a:dk1>
-        <a:srgbClr val="000000"/>
+        <a:srgbClr val="333333"/>
       </a:dk1>
       <a:lt1>
         <a:srgbClr val="FFFFFF"/>
       </a:lt1>
       <a:dk2>
-        <a:srgbClr val="666666"/>
+        <a:srgbClr val="333333"/>
       </a:dk2>
       <a:lt2>
-        <a:srgbClr val="CCCCCC"/>
+        <a:srgbClr val="808080"/>
       </a:lt2>
       <a:accent1>
-        <a:srgbClr val="3A81BA"/>
+        <a:srgbClr val="CCCCCC"/>
       </a:accent1>
       <a:accent2>
-        <a:srgbClr val="D89F39"/>
+        <a:srgbClr val="074FB0"/>
       </a:accent2>
       <a:accent3>
-        <a:srgbClr val="8BAB42"/>
+        <a:srgbClr val="FFFFFF"/>
       </a:accent3>
       <a:accent4>
-        <a:srgbClr val="57A7B5"/>
+        <a:srgbClr val="2A2A2A"/>
       </a:accent4>
       <a:accent5>
-        <a:srgbClr val="8B81D2"/>
+        <a:srgbClr val="E2E2E2"/>
       </a:accent5>
       <a:accent6>
-        <a:srgbClr val="963334"/>
+        <a:srgbClr val="06479F"/>
       </a:accent6>
       <a:hlink>
-        <a:srgbClr val="1155CC"/>
+        <a:srgbClr val="E53418"/>
       </a:hlink>
       <a:folHlink>
-        <a:srgbClr val="6611CC"/>
+        <a:srgbClr val="CA213F"/>
       </a:folHlink>
     </a:clrScheme>
     <a:fontScheme name="Office">
@@ -10393,44 +10658,44 @@
 </file>
 
 <file path=ppt/theme/theme3.xml><?xml version="1.0" encoding="utf-8"?>
-<a:theme xmlns:a="http://schemas.openxmlformats.org/drawingml/2006/main" xmlns:r="http://schemas.openxmlformats.org/officeDocument/2006/relationships" name="VT_Vorlage_Präsentation_Ma">
+<a:theme xmlns:a="http://schemas.openxmlformats.org/drawingml/2006/main" xmlns:r="http://schemas.openxmlformats.org/officeDocument/2006/relationships" name="simple-light">
   <a:themeElements>
-    <a:clrScheme name="">
+    <a:clrScheme name="Custom 347">
       <a:dk1>
-        <a:srgbClr val="333333"/>
+        <a:srgbClr val="000000"/>
       </a:dk1>
       <a:lt1>
         <a:srgbClr val="FFFFFF"/>
       </a:lt1>
       <a:dk2>
-        <a:srgbClr val="333333"/>
+        <a:srgbClr val="666666"/>
       </a:dk2>
       <a:lt2>
-        <a:srgbClr val="808080"/>
+        <a:srgbClr val="CCCCCC"/>
       </a:lt2>
       <a:accent1>
-        <a:srgbClr val="CCCCCC"/>
+        <a:srgbClr val="3A81BA"/>
       </a:accent1>
       <a:accent2>
-        <a:srgbClr val="074FB0"/>
+        <a:srgbClr val="D89F39"/>
       </a:accent2>
       <a:accent3>
-        <a:srgbClr val="FFFFFF"/>
+        <a:srgbClr val="8BAB42"/>
       </a:accent3>
       <a:accent4>
-        <a:srgbClr val="2A2A2A"/>
+        <a:srgbClr val="57A7B5"/>
       </a:accent4>
       <a:accent5>
-        <a:srgbClr val="E2E2E2"/>
+        <a:srgbClr val="8B81D2"/>
       </a:accent5>
       <a:accent6>
-        <a:srgbClr val="06479F"/>
+        <a:srgbClr val="963334"/>
       </a:accent6>
       <a:hlink>
-        <a:srgbClr val="E53418"/>
+        <a:srgbClr val="1155CC"/>
       </a:hlink>
       <a:folHlink>
-        <a:srgbClr val="CA213F"/>
+        <a:srgbClr val="6611CC"/>
       </a:folHlink>
     </a:clrScheme>
     <a:fontScheme name="Office">

</xml_diff>

<commit_message>
addes chain of responsibility and added marker for what changed befor->after
</commit_message>
<xml_diff>
--- a/Behavioral Patterns - JS Patterns and Anti Patterns.pptx
+++ b/Behavioral Patterns - JS Patterns and Anti Patterns.pptx
@@ -24,6 +24,12 @@
     <p:sldId id="268" r:id="rId19"/>
     <p:sldId id="269" r:id="rId20"/>
     <p:sldId id="270" r:id="rId21"/>
+    <p:sldId id="271" r:id="rId22"/>
+    <p:sldId id="272" r:id="rId23"/>
+    <p:sldId id="273" r:id="rId24"/>
+    <p:sldId id="274" r:id="rId25"/>
+    <p:sldId id="275" r:id="rId26"/>
+    <p:sldId id="276" r:id="rId27"/>
   </p:sldIdLst>
   <p:sldSz cy="6858000" cx="9144000"/>
   <p:notesSz cx="6858000" cy="9144000"/>
@@ -1125,6 +1131,426 @@
 </p:notes>
 </file>
 
+<file path=ppt/notesSlides/notesSlide16.xml><?xml version="1.0" encoding="utf-8"?>
+<p:notes xmlns:a="http://schemas.openxmlformats.org/drawingml/2006/main" xmlns:r="http://schemas.openxmlformats.org/officeDocument/2006/relationships" xmlns:mc="http://schemas.openxmlformats.org/markup-compatibility/2006" xmlns:mv="urn:schemas-microsoft-com:mac:vml" xmlns:p="http://schemas.openxmlformats.org/presentationml/2006/main" xmlns:c="http://schemas.openxmlformats.org/drawingml/2006/chart" xmlns:dgm="http://schemas.openxmlformats.org/drawingml/2006/diagram" xmlns:o="urn:schemas-microsoft-com:office:office" xmlns:v="urn:schemas-microsoft-com:vml" xmlns:pvml="urn:schemas-microsoft-com:office:powerpoint" xmlns:com="http://schemas.openxmlformats.org/drawingml/2006/compatibility" xmlns:p14="http://schemas.microsoft.com/office/powerpoint/2010/main" showMasterPhAnim="0" showMasterSp="0">
+  <p:cSld>
+    <p:spTree>
+      <p:nvGrpSpPr>
+        <p:cNvPr id="131" name="Shape 131"/>
+        <p:cNvGrpSpPr/>
+        <p:nvPr/>
+      </p:nvGrpSpPr>
+      <p:grpSpPr>
+        <a:xfrm>
+          <a:off x="0" y="0"/>
+          <a:ext cx="0" cy="0"/>
+          <a:chOff x="0" y="0"/>
+          <a:chExt cx="0" cy="0"/>
+        </a:xfrm>
+      </p:grpSpPr>
+      <p:sp>
+        <p:nvSpPr>
+          <p:cNvPr id="132" name="Shape 132"/>
+          <p:cNvSpPr/>
+          <p:nvPr>
+            <p:ph idx="2" type="sldImg"/>
+          </p:nvPr>
+        </p:nvSpPr>
+        <p:spPr>
+          <a:xfrm>
+            <a:off x="1143300" y="685800"/>
+            <a:ext cx="4572000" cy="3429000"/>
+          </a:xfrm>
+          <a:custGeom>
+            <a:pathLst>
+              <a:path extrusionOk="0" h="120000" w="120000">
+                <a:moveTo>
+                  <a:pt x="0" y="0"/>
+                </a:moveTo>
+                <a:lnTo>
+                  <a:pt x="120000" y="0"/>
+                </a:lnTo>
+                <a:lnTo>
+                  <a:pt x="120000" y="120000"/>
+                </a:lnTo>
+                <a:lnTo>
+                  <a:pt x="0" y="120000"/>
+                </a:lnTo>
+                <a:close/>
+              </a:path>
+            </a:pathLst>
+          </a:custGeom>
+          <a:noFill/>
+          <a:ln cap="flat" cmpd="sng" w="9525">
+            <a:solidFill>
+              <a:srgbClr val="000000"/>
+            </a:solidFill>
+            <a:prstDash val="solid"/>
+            <a:round/>
+            <a:headEnd len="med" w="med" type="none"/>
+            <a:tailEnd len="med" w="med" type="none"/>
+          </a:ln>
+        </p:spPr>
+      </p:sp>
+      <p:sp>
+        <p:nvSpPr>
+          <p:cNvPr id="133" name="Shape 133"/>
+          <p:cNvSpPr txBox="1"/>
+          <p:nvPr>
+            <p:ph idx="1" type="body"/>
+          </p:nvPr>
+        </p:nvSpPr>
+        <p:spPr>
+          <a:xfrm>
+            <a:off x="685800" y="4343400"/>
+            <a:ext cx="5486399" cy="4114800"/>
+          </a:xfrm>
+          <a:prstGeom prst="rect">
+            <a:avLst/>
+          </a:prstGeom>
+        </p:spPr>
+        <p:txBody>
+          <a:bodyPr anchorCtr="0" anchor="t" bIns="91425" lIns="91425" rIns="91425" tIns="91425">
+            <a:noAutofit/>
+          </a:bodyPr>
+          <a:lstStyle/>
+          <a:p>
+            <a:pPr lvl="0" rtl="0">
+              <a:spcBef>
+                <a:spcPts val="0"/>
+              </a:spcBef>
+              <a:buNone/>
+            </a:pPr>
+            <a:r>
+              <a:t/>
+            </a:r>
+            <a:endParaRPr/>
+          </a:p>
+        </p:txBody>
+      </p:sp>
+    </p:spTree>
+  </p:cSld>
+  <p:clrMapOvr>
+    <a:masterClrMapping/>
+  </p:clrMapOvr>
+</p:notes>
+</file>
+
+<file path=ppt/notesSlides/notesSlide17.xml><?xml version="1.0" encoding="utf-8"?>
+<p:notes xmlns:a="http://schemas.openxmlformats.org/drawingml/2006/main" xmlns:r="http://schemas.openxmlformats.org/officeDocument/2006/relationships" xmlns:mc="http://schemas.openxmlformats.org/markup-compatibility/2006" xmlns:mv="urn:schemas-microsoft-com:mac:vml" xmlns:p="http://schemas.openxmlformats.org/presentationml/2006/main" xmlns:c="http://schemas.openxmlformats.org/drawingml/2006/chart" xmlns:dgm="http://schemas.openxmlformats.org/drawingml/2006/diagram" xmlns:o="urn:schemas-microsoft-com:office:office" xmlns:v="urn:schemas-microsoft-com:vml" xmlns:pvml="urn:schemas-microsoft-com:office:powerpoint" xmlns:com="http://schemas.openxmlformats.org/drawingml/2006/compatibility" xmlns:p14="http://schemas.microsoft.com/office/powerpoint/2010/main" showMasterPhAnim="0" showMasterSp="0">
+  <p:cSld>
+    <p:spTree>
+      <p:nvGrpSpPr>
+        <p:cNvPr id="138" name="Shape 138"/>
+        <p:cNvGrpSpPr/>
+        <p:nvPr/>
+      </p:nvGrpSpPr>
+      <p:grpSpPr>
+        <a:xfrm>
+          <a:off x="0" y="0"/>
+          <a:ext cx="0" cy="0"/>
+          <a:chOff x="0" y="0"/>
+          <a:chExt cx="0" cy="0"/>
+        </a:xfrm>
+      </p:grpSpPr>
+      <p:sp>
+        <p:nvSpPr>
+          <p:cNvPr id="139" name="Shape 139"/>
+          <p:cNvSpPr/>
+          <p:nvPr>
+            <p:ph idx="2" type="sldImg"/>
+          </p:nvPr>
+        </p:nvSpPr>
+        <p:spPr>
+          <a:xfrm>
+            <a:off x="1143300" y="685800"/>
+            <a:ext cx="4572000" cy="3429000"/>
+          </a:xfrm>
+          <a:custGeom>
+            <a:pathLst>
+              <a:path extrusionOk="0" h="120000" w="120000">
+                <a:moveTo>
+                  <a:pt x="0" y="0"/>
+                </a:moveTo>
+                <a:lnTo>
+                  <a:pt x="120000" y="0"/>
+                </a:lnTo>
+                <a:lnTo>
+                  <a:pt x="120000" y="120000"/>
+                </a:lnTo>
+                <a:lnTo>
+                  <a:pt x="0" y="120000"/>
+                </a:lnTo>
+                <a:close/>
+              </a:path>
+            </a:pathLst>
+          </a:custGeom>
+          <a:noFill/>
+          <a:ln cap="flat" cmpd="sng" w="9525">
+            <a:solidFill>
+              <a:srgbClr val="000000"/>
+            </a:solidFill>
+            <a:prstDash val="solid"/>
+            <a:round/>
+            <a:headEnd len="med" w="med" type="none"/>
+            <a:tailEnd len="med" w="med" type="none"/>
+          </a:ln>
+        </p:spPr>
+      </p:sp>
+      <p:sp>
+        <p:nvSpPr>
+          <p:cNvPr id="140" name="Shape 140"/>
+          <p:cNvSpPr txBox="1"/>
+          <p:nvPr>
+            <p:ph idx="1" type="body"/>
+          </p:nvPr>
+        </p:nvSpPr>
+        <p:spPr>
+          <a:xfrm>
+            <a:off x="685800" y="4343400"/>
+            <a:ext cx="5486399" cy="4114800"/>
+          </a:xfrm>
+          <a:prstGeom prst="rect">
+            <a:avLst/>
+          </a:prstGeom>
+        </p:spPr>
+        <p:txBody>
+          <a:bodyPr anchorCtr="0" anchor="t" bIns="91425" lIns="91425" rIns="91425" tIns="91425">
+            <a:noAutofit/>
+          </a:bodyPr>
+          <a:lstStyle/>
+          <a:p>
+            <a:pPr lvl="0" rtl="0">
+              <a:spcBef>
+                <a:spcPts val="0"/>
+              </a:spcBef>
+              <a:buNone/>
+            </a:pPr>
+            <a:r>
+              <a:t/>
+            </a:r>
+            <a:endParaRPr/>
+          </a:p>
+        </p:txBody>
+      </p:sp>
+    </p:spTree>
+  </p:cSld>
+  <p:clrMapOvr>
+    <a:masterClrMapping/>
+  </p:clrMapOvr>
+</p:notes>
+</file>
+
+<file path=ppt/notesSlides/notesSlide18.xml><?xml version="1.0" encoding="utf-8"?>
+<p:notes xmlns:a="http://schemas.openxmlformats.org/drawingml/2006/main" xmlns:r="http://schemas.openxmlformats.org/officeDocument/2006/relationships" xmlns:mc="http://schemas.openxmlformats.org/markup-compatibility/2006" xmlns:mv="urn:schemas-microsoft-com:mac:vml" xmlns:p="http://schemas.openxmlformats.org/presentationml/2006/main" xmlns:c="http://schemas.openxmlformats.org/drawingml/2006/chart" xmlns:dgm="http://schemas.openxmlformats.org/drawingml/2006/diagram" xmlns:o="urn:schemas-microsoft-com:office:office" xmlns:v="urn:schemas-microsoft-com:vml" xmlns:pvml="urn:schemas-microsoft-com:office:powerpoint" xmlns:com="http://schemas.openxmlformats.org/drawingml/2006/compatibility" xmlns:p14="http://schemas.microsoft.com/office/powerpoint/2010/main" showMasterPhAnim="0" showMasterSp="0">
+  <p:cSld>
+    <p:spTree>
+      <p:nvGrpSpPr>
+        <p:cNvPr id="145" name="Shape 145"/>
+        <p:cNvGrpSpPr/>
+        <p:nvPr/>
+      </p:nvGrpSpPr>
+      <p:grpSpPr>
+        <a:xfrm>
+          <a:off x="0" y="0"/>
+          <a:ext cx="0" cy="0"/>
+          <a:chOff x="0" y="0"/>
+          <a:chExt cx="0" cy="0"/>
+        </a:xfrm>
+      </p:grpSpPr>
+      <p:sp>
+        <p:nvSpPr>
+          <p:cNvPr id="146" name="Shape 146"/>
+          <p:cNvSpPr/>
+          <p:nvPr>
+            <p:ph idx="2" type="sldImg"/>
+          </p:nvPr>
+        </p:nvSpPr>
+        <p:spPr>
+          <a:xfrm>
+            <a:off x="1143300" y="685800"/>
+            <a:ext cx="4572000" cy="3429000"/>
+          </a:xfrm>
+          <a:custGeom>
+            <a:pathLst>
+              <a:path extrusionOk="0" h="120000" w="120000">
+                <a:moveTo>
+                  <a:pt x="0" y="0"/>
+                </a:moveTo>
+                <a:lnTo>
+                  <a:pt x="120000" y="0"/>
+                </a:lnTo>
+                <a:lnTo>
+                  <a:pt x="120000" y="120000"/>
+                </a:lnTo>
+                <a:lnTo>
+                  <a:pt x="0" y="120000"/>
+                </a:lnTo>
+                <a:close/>
+              </a:path>
+            </a:pathLst>
+          </a:custGeom>
+          <a:noFill/>
+          <a:ln cap="flat" cmpd="sng" w="9525">
+            <a:solidFill>
+              <a:srgbClr val="000000"/>
+            </a:solidFill>
+            <a:prstDash val="solid"/>
+            <a:round/>
+            <a:headEnd len="med" w="med" type="none"/>
+            <a:tailEnd len="med" w="med" type="none"/>
+          </a:ln>
+        </p:spPr>
+      </p:sp>
+      <p:sp>
+        <p:nvSpPr>
+          <p:cNvPr id="147" name="Shape 147"/>
+          <p:cNvSpPr txBox="1"/>
+          <p:nvPr>
+            <p:ph idx="1" type="body"/>
+          </p:nvPr>
+        </p:nvSpPr>
+        <p:spPr>
+          <a:xfrm>
+            <a:off x="685800" y="4343400"/>
+            <a:ext cx="5486399" cy="4114800"/>
+          </a:xfrm>
+          <a:prstGeom prst="rect">
+            <a:avLst/>
+          </a:prstGeom>
+        </p:spPr>
+        <p:txBody>
+          <a:bodyPr anchorCtr="0" anchor="t" bIns="91425" lIns="91425" rIns="91425" tIns="91425">
+            <a:noAutofit/>
+          </a:bodyPr>
+          <a:lstStyle/>
+          <a:p>
+            <a:pPr lvl="0" rtl="0">
+              <a:spcBef>
+                <a:spcPts val="0"/>
+              </a:spcBef>
+              <a:buNone/>
+            </a:pPr>
+            <a:r>
+              <a:t/>
+            </a:r>
+            <a:endParaRPr/>
+          </a:p>
+        </p:txBody>
+      </p:sp>
+    </p:spTree>
+  </p:cSld>
+  <p:clrMapOvr>
+    <a:masterClrMapping/>
+  </p:clrMapOvr>
+</p:notes>
+</file>
+
+<file path=ppt/notesSlides/notesSlide19.xml><?xml version="1.0" encoding="utf-8"?>
+<p:notes xmlns:a="http://schemas.openxmlformats.org/drawingml/2006/main" xmlns:r="http://schemas.openxmlformats.org/officeDocument/2006/relationships" xmlns:mc="http://schemas.openxmlformats.org/markup-compatibility/2006" xmlns:mv="urn:schemas-microsoft-com:mac:vml" xmlns:p="http://schemas.openxmlformats.org/presentationml/2006/main" xmlns:c="http://schemas.openxmlformats.org/drawingml/2006/chart" xmlns:dgm="http://schemas.openxmlformats.org/drawingml/2006/diagram" xmlns:o="urn:schemas-microsoft-com:office:office" xmlns:v="urn:schemas-microsoft-com:vml" xmlns:pvml="urn:schemas-microsoft-com:office:powerpoint" xmlns:com="http://schemas.openxmlformats.org/drawingml/2006/compatibility" xmlns:p14="http://schemas.microsoft.com/office/powerpoint/2010/main" showMasterPhAnim="0" showMasterSp="0">
+  <p:cSld>
+    <p:spTree>
+      <p:nvGrpSpPr>
+        <p:cNvPr id="152" name="Shape 152"/>
+        <p:cNvGrpSpPr/>
+        <p:nvPr/>
+      </p:nvGrpSpPr>
+      <p:grpSpPr>
+        <a:xfrm>
+          <a:off x="0" y="0"/>
+          <a:ext cx="0" cy="0"/>
+          <a:chOff x="0" y="0"/>
+          <a:chExt cx="0" cy="0"/>
+        </a:xfrm>
+      </p:grpSpPr>
+      <p:sp>
+        <p:nvSpPr>
+          <p:cNvPr id="153" name="Shape 153"/>
+          <p:cNvSpPr/>
+          <p:nvPr>
+            <p:ph idx="2" type="sldImg"/>
+          </p:nvPr>
+        </p:nvSpPr>
+        <p:spPr>
+          <a:xfrm>
+            <a:off x="1143300" y="685800"/>
+            <a:ext cx="4572000" cy="3429000"/>
+          </a:xfrm>
+          <a:custGeom>
+            <a:pathLst>
+              <a:path extrusionOk="0" h="120000" w="120000">
+                <a:moveTo>
+                  <a:pt x="0" y="0"/>
+                </a:moveTo>
+                <a:lnTo>
+                  <a:pt x="120000" y="0"/>
+                </a:lnTo>
+                <a:lnTo>
+                  <a:pt x="120000" y="120000"/>
+                </a:lnTo>
+                <a:lnTo>
+                  <a:pt x="0" y="120000"/>
+                </a:lnTo>
+                <a:close/>
+              </a:path>
+            </a:pathLst>
+          </a:custGeom>
+          <a:noFill/>
+          <a:ln cap="flat" cmpd="sng" w="9525">
+            <a:solidFill>
+              <a:srgbClr val="000000"/>
+            </a:solidFill>
+            <a:prstDash val="solid"/>
+            <a:round/>
+            <a:headEnd len="med" w="med" type="none"/>
+            <a:tailEnd len="med" w="med" type="none"/>
+          </a:ln>
+        </p:spPr>
+      </p:sp>
+      <p:sp>
+        <p:nvSpPr>
+          <p:cNvPr id="154" name="Shape 154"/>
+          <p:cNvSpPr txBox="1"/>
+          <p:nvPr>
+            <p:ph idx="1" type="body"/>
+          </p:nvPr>
+        </p:nvSpPr>
+        <p:spPr>
+          <a:xfrm>
+            <a:off x="685800" y="4343400"/>
+            <a:ext cx="5486399" cy="4114800"/>
+          </a:xfrm>
+          <a:prstGeom prst="rect">
+            <a:avLst/>
+          </a:prstGeom>
+        </p:spPr>
+        <p:txBody>
+          <a:bodyPr anchorCtr="0" anchor="t" bIns="91425" lIns="91425" rIns="91425" tIns="91425">
+            <a:noAutofit/>
+          </a:bodyPr>
+          <a:lstStyle/>
+          <a:p>
+            <a:pPr lvl="0" rtl="0">
+              <a:spcBef>
+                <a:spcPts val="0"/>
+              </a:spcBef>
+              <a:buNone/>
+            </a:pPr>
+            <a:r>
+              <a:t/>
+            </a:r>
+            <a:endParaRPr/>
+          </a:p>
+        </p:txBody>
+      </p:sp>
+    </p:spTree>
+  </p:cSld>
+  <p:clrMapOvr>
+    <a:masterClrMapping/>
+  </p:clrMapOvr>
+</p:notes>
+</file>
+
 <file path=ppt/notesSlides/notesSlide2.xml><?xml version="1.0" encoding="utf-8"?>
 <p:notes xmlns:a="http://schemas.openxmlformats.org/drawingml/2006/main" xmlns:r="http://schemas.openxmlformats.org/officeDocument/2006/relationships" xmlns:mc="http://schemas.openxmlformats.org/markup-compatibility/2006" xmlns:mv="urn:schemas-microsoft-com:mac:vml" xmlns:p="http://schemas.openxmlformats.org/presentationml/2006/main" xmlns:c="http://schemas.openxmlformats.org/drawingml/2006/chart" xmlns:dgm="http://schemas.openxmlformats.org/drawingml/2006/diagram" xmlns:o="urn:schemas-microsoft-com:office:office" xmlns:v="urn:schemas-microsoft-com:vml" xmlns:pvml="urn:schemas-microsoft-com:office:powerpoint" xmlns:com="http://schemas.openxmlformats.org/drawingml/2006/compatibility" xmlns:p14="http://schemas.microsoft.com/office/powerpoint/2010/main" showMasterPhAnim="0" showMasterSp="0">
   <p:cSld>
@@ -1210,6 +1636,216 @@
           <a:lstStyle/>
           <a:p>
             <a:pPr>
+              <a:spcBef>
+                <a:spcPts val="0"/>
+              </a:spcBef>
+              <a:buNone/>
+            </a:pPr>
+            <a:r>
+              <a:t/>
+            </a:r>
+            <a:endParaRPr/>
+          </a:p>
+        </p:txBody>
+      </p:sp>
+    </p:spTree>
+  </p:cSld>
+  <p:clrMapOvr>
+    <a:masterClrMapping/>
+  </p:clrMapOvr>
+</p:notes>
+</file>
+
+<file path=ppt/notesSlides/notesSlide20.xml><?xml version="1.0" encoding="utf-8"?>
+<p:notes xmlns:a="http://schemas.openxmlformats.org/drawingml/2006/main" xmlns:r="http://schemas.openxmlformats.org/officeDocument/2006/relationships" xmlns:mc="http://schemas.openxmlformats.org/markup-compatibility/2006" xmlns:mv="urn:schemas-microsoft-com:mac:vml" xmlns:p="http://schemas.openxmlformats.org/presentationml/2006/main" xmlns:c="http://schemas.openxmlformats.org/drawingml/2006/chart" xmlns:dgm="http://schemas.openxmlformats.org/drawingml/2006/diagram" xmlns:o="urn:schemas-microsoft-com:office:office" xmlns:v="urn:schemas-microsoft-com:vml" xmlns:pvml="urn:schemas-microsoft-com:office:powerpoint" xmlns:com="http://schemas.openxmlformats.org/drawingml/2006/compatibility" xmlns:p14="http://schemas.microsoft.com/office/powerpoint/2010/main" showMasterPhAnim="0" showMasterSp="0">
+  <p:cSld>
+    <p:spTree>
+      <p:nvGrpSpPr>
+        <p:cNvPr id="159" name="Shape 159"/>
+        <p:cNvGrpSpPr/>
+        <p:nvPr/>
+      </p:nvGrpSpPr>
+      <p:grpSpPr>
+        <a:xfrm>
+          <a:off x="0" y="0"/>
+          <a:ext cx="0" cy="0"/>
+          <a:chOff x="0" y="0"/>
+          <a:chExt cx="0" cy="0"/>
+        </a:xfrm>
+      </p:grpSpPr>
+      <p:sp>
+        <p:nvSpPr>
+          <p:cNvPr id="160" name="Shape 160"/>
+          <p:cNvSpPr/>
+          <p:nvPr>
+            <p:ph idx="2" type="sldImg"/>
+          </p:nvPr>
+        </p:nvSpPr>
+        <p:spPr>
+          <a:xfrm>
+            <a:off x="1143300" y="685800"/>
+            <a:ext cx="4572000" cy="3429000"/>
+          </a:xfrm>
+          <a:custGeom>
+            <a:pathLst>
+              <a:path extrusionOk="0" h="120000" w="120000">
+                <a:moveTo>
+                  <a:pt x="0" y="0"/>
+                </a:moveTo>
+                <a:lnTo>
+                  <a:pt x="120000" y="0"/>
+                </a:lnTo>
+                <a:lnTo>
+                  <a:pt x="120000" y="120000"/>
+                </a:lnTo>
+                <a:lnTo>
+                  <a:pt x="0" y="120000"/>
+                </a:lnTo>
+                <a:close/>
+              </a:path>
+            </a:pathLst>
+          </a:custGeom>
+          <a:noFill/>
+          <a:ln cap="flat" cmpd="sng" w="9525">
+            <a:solidFill>
+              <a:srgbClr val="000000"/>
+            </a:solidFill>
+            <a:prstDash val="solid"/>
+            <a:round/>
+            <a:headEnd len="med" w="med" type="none"/>
+            <a:tailEnd len="med" w="med" type="none"/>
+          </a:ln>
+        </p:spPr>
+      </p:sp>
+      <p:sp>
+        <p:nvSpPr>
+          <p:cNvPr id="161" name="Shape 161"/>
+          <p:cNvSpPr txBox="1"/>
+          <p:nvPr>
+            <p:ph idx="1" type="body"/>
+          </p:nvPr>
+        </p:nvSpPr>
+        <p:spPr>
+          <a:xfrm>
+            <a:off x="685800" y="4343400"/>
+            <a:ext cx="5486399" cy="4114800"/>
+          </a:xfrm>
+          <a:prstGeom prst="rect">
+            <a:avLst/>
+          </a:prstGeom>
+        </p:spPr>
+        <p:txBody>
+          <a:bodyPr anchorCtr="0" anchor="t" bIns="91425" lIns="91425" rIns="91425" tIns="91425">
+            <a:noAutofit/>
+          </a:bodyPr>
+          <a:lstStyle/>
+          <a:p>
+            <a:pPr lvl="0" rtl="0">
+              <a:spcBef>
+                <a:spcPts val="0"/>
+              </a:spcBef>
+              <a:buNone/>
+            </a:pPr>
+            <a:r>
+              <a:t/>
+            </a:r>
+            <a:endParaRPr/>
+          </a:p>
+        </p:txBody>
+      </p:sp>
+    </p:spTree>
+  </p:cSld>
+  <p:clrMapOvr>
+    <a:masterClrMapping/>
+  </p:clrMapOvr>
+</p:notes>
+</file>
+
+<file path=ppt/notesSlides/notesSlide21.xml><?xml version="1.0" encoding="utf-8"?>
+<p:notes xmlns:a="http://schemas.openxmlformats.org/drawingml/2006/main" xmlns:r="http://schemas.openxmlformats.org/officeDocument/2006/relationships" xmlns:mc="http://schemas.openxmlformats.org/markup-compatibility/2006" xmlns:mv="urn:schemas-microsoft-com:mac:vml" xmlns:p="http://schemas.openxmlformats.org/presentationml/2006/main" xmlns:c="http://schemas.openxmlformats.org/drawingml/2006/chart" xmlns:dgm="http://schemas.openxmlformats.org/drawingml/2006/diagram" xmlns:o="urn:schemas-microsoft-com:office:office" xmlns:v="urn:schemas-microsoft-com:vml" xmlns:pvml="urn:schemas-microsoft-com:office:powerpoint" xmlns:com="http://schemas.openxmlformats.org/drawingml/2006/compatibility" xmlns:p14="http://schemas.microsoft.com/office/powerpoint/2010/main" showMasterPhAnim="0" showMasterSp="0">
+  <p:cSld>
+    <p:spTree>
+      <p:nvGrpSpPr>
+        <p:cNvPr id="166" name="Shape 166"/>
+        <p:cNvGrpSpPr/>
+        <p:nvPr/>
+      </p:nvGrpSpPr>
+      <p:grpSpPr>
+        <a:xfrm>
+          <a:off x="0" y="0"/>
+          <a:ext cx="0" cy="0"/>
+          <a:chOff x="0" y="0"/>
+          <a:chExt cx="0" cy="0"/>
+        </a:xfrm>
+      </p:grpSpPr>
+      <p:sp>
+        <p:nvSpPr>
+          <p:cNvPr id="167" name="Shape 167"/>
+          <p:cNvSpPr/>
+          <p:nvPr>
+            <p:ph idx="2" type="sldImg"/>
+          </p:nvPr>
+        </p:nvSpPr>
+        <p:spPr>
+          <a:xfrm>
+            <a:off x="1143300" y="685800"/>
+            <a:ext cx="4572000" cy="3429000"/>
+          </a:xfrm>
+          <a:custGeom>
+            <a:pathLst>
+              <a:path extrusionOk="0" h="120000" w="120000">
+                <a:moveTo>
+                  <a:pt x="0" y="0"/>
+                </a:moveTo>
+                <a:lnTo>
+                  <a:pt x="120000" y="0"/>
+                </a:lnTo>
+                <a:lnTo>
+                  <a:pt x="120000" y="120000"/>
+                </a:lnTo>
+                <a:lnTo>
+                  <a:pt x="0" y="120000"/>
+                </a:lnTo>
+                <a:close/>
+              </a:path>
+            </a:pathLst>
+          </a:custGeom>
+          <a:noFill/>
+          <a:ln cap="flat" cmpd="sng" w="9525">
+            <a:solidFill>
+              <a:srgbClr val="000000"/>
+            </a:solidFill>
+            <a:prstDash val="solid"/>
+            <a:round/>
+            <a:headEnd len="med" w="med" type="none"/>
+            <a:tailEnd len="med" w="med" type="none"/>
+          </a:ln>
+        </p:spPr>
+      </p:sp>
+      <p:sp>
+        <p:nvSpPr>
+          <p:cNvPr id="168" name="Shape 168"/>
+          <p:cNvSpPr txBox="1"/>
+          <p:nvPr>
+            <p:ph idx="1" type="body"/>
+          </p:nvPr>
+        </p:nvSpPr>
+        <p:spPr>
+          <a:xfrm>
+            <a:off x="685800" y="4343400"/>
+            <a:ext cx="5486399" cy="4114800"/>
+          </a:xfrm>
+          <a:prstGeom prst="rect">
+            <a:avLst/>
+          </a:prstGeom>
+        </p:spPr>
+        <p:txBody>
+          <a:bodyPr anchorCtr="0" anchor="t" bIns="91425" lIns="91425" rIns="91425" tIns="91425">
+            <a:noAutofit/>
+          </a:bodyPr>
+          <a:lstStyle/>
+          <a:p>
+            <a:pPr lvl="0" rtl="0">
               <a:spcBef>
                 <a:spcPts val="0"/>
               </a:spcBef>
@@ -2587,7 +3223,7 @@
   <p:cSld name="Title Slide">
     <p:spTree>
       <p:nvGrpSpPr>
-        <p:cNvPr id="129" name="Shape 129"/>
+        <p:cNvPr id="173" name="Shape 173"/>
         <p:cNvGrpSpPr/>
         <p:nvPr/>
       </p:nvGrpSpPr>
@@ -2601,7 +3237,7 @@
       </p:grpSpPr>
       <p:sp>
         <p:nvSpPr>
-          <p:cNvPr id="130" name="Shape 130"/>
+          <p:cNvPr id="174" name="Shape 174"/>
           <p:cNvSpPr txBox="1"/>
           <p:nvPr>
             <p:ph type="ctrTitle"/>
@@ -2688,7 +3324,7 @@
       </p:sp>
       <p:sp>
         <p:nvSpPr>
-          <p:cNvPr id="131" name="Shape 131"/>
+          <p:cNvPr id="175" name="Shape 175"/>
           <p:cNvSpPr txBox="1"/>
           <p:nvPr>
             <p:ph idx="1" type="subTitle"/>
@@ -2846,7 +3482,7 @@
       </p:sp>
       <p:sp>
         <p:nvSpPr>
-          <p:cNvPr id="132" name="Shape 132"/>
+          <p:cNvPr id="176" name="Shape 176"/>
           <p:cNvSpPr txBox="1"/>
           <p:nvPr>
             <p:ph idx="12" type="sldNum"/>
@@ -2893,7 +3529,7 @@
   <p:cSld name="Title and Body">
     <p:spTree>
       <p:nvGrpSpPr>
-        <p:cNvPr id="133" name="Shape 133"/>
+        <p:cNvPr id="177" name="Shape 177"/>
         <p:cNvGrpSpPr/>
         <p:nvPr/>
       </p:nvGrpSpPr>
@@ -2907,7 +3543,7 @@
       </p:grpSpPr>
       <p:sp>
         <p:nvSpPr>
-          <p:cNvPr id="134" name="Shape 134"/>
+          <p:cNvPr id="178" name="Shape 178"/>
           <p:cNvSpPr txBox="1"/>
           <p:nvPr>
             <p:ph type="title"/>
@@ -2985,7 +3621,7 @@
       </p:sp>
       <p:sp>
         <p:nvSpPr>
-          <p:cNvPr id="135" name="Shape 135"/>
+          <p:cNvPr id="179" name="Shape 179"/>
           <p:cNvSpPr txBox="1"/>
           <p:nvPr>
             <p:ph idx="1" type="body"/>
@@ -3063,7 +3699,7 @@
       </p:sp>
       <p:sp>
         <p:nvSpPr>
-          <p:cNvPr id="136" name="Shape 136"/>
+          <p:cNvPr id="180" name="Shape 180"/>
           <p:cNvSpPr txBox="1"/>
           <p:nvPr>
             <p:ph idx="12" type="sldNum"/>
@@ -3110,7 +3746,7 @@
   <p:cSld name="Title and Two Columns">
     <p:spTree>
       <p:nvGrpSpPr>
-        <p:cNvPr id="137" name="Shape 137"/>
+        <p:cNvPr id="181" name="Shape 181"/>
         <p:cNvGrpSpPr/>
         <p:nvPr/>
       </p:nvGrpSpPr>
@@ -3124,7 +3760,7 @@
       </p:grpSpPr>
       <p:sp>
         <p:nvSpPr>
-          <p:cNvPr id="138" name="Shape 138"/>
+          <p:cNvPr id="182" name="Shape 182"/>
           <p:cNvSpPr txBox="1"/>
           <p:nvPr>
             <p:ph type="title"/>
@@ -3202,7 +3838,7 @@
       </p:sp>
       <p:sp>
         <p:nvSpPr>
-          <p:cNvPr id="139" name="Shape 139"/>
+          <p:cNvPr id="183" name="Shape 183"/>
           <p:cNvSpPr txBox="1"/>
           <p:nvPr>
             <p:ph idx="1" type="body"/>
@@ -3280,7 +3916,7 @@
       </p:sp>
       <p:sp>
         <p:nvSpPr>
-          <p:cNvPr id="140" name="Shape 140"/>
+          <p:cNvPr id="184" name="Shape 184"/>
           <p:cNvSpPr txBox="1"/>
           <p:nvPr>
             <p:ph idx="2" type="body"/>
@@ -3358,7 +3994,7 @@
       </p:sp>
       <p:sp>
         <p:nvSpPr>
-          <p:cNvPr id="141" name="Shape 141"/>
+          <p:cNvPr id="185" name="Shape 185"/>
           <p:cNvSpPr txBox="1"/>
           <p:nvPr>
             <p:ph idx="12" type="sldNum"/>
@@ -3405,7 +4041,7 @@
   <p:cSld name="Title Only">
     <p:spTree>
       <p:nvGrpSpPr>
-        <p:cNvPr id="142" name="Shape 142"/>
+        <p:cNvPr id="186" name="Shape 186"/>
         <p:cNvGrpSpPr/>
         <p:nvPr/>
       </p:nvGrpSpPr>
@@ -3419,7 +4055,7 @@
       </p:grpSpPr>
       <p:sp>
         <p:nvSpPr>
-          <p:cNvPr id="143" name="Shape 143"/>
+          <p:cNvPr id="187" name="Shape 187"/>
           <p:cNvSpPr txBox="1"/>
           <p:nvPr>
             <p:ph type="title"/>
@@ -3497,7 +4133,7 @@
       </p:sp>
       <p:sp>
         <p:nvSpPr>
-          <p:cNvPr id="144" name="Shape 144"/>
+          <p:cNvPr id="188" name="Shape 188"/>
           <p:cNvSpPr txBox="1"/>
           <p:nvPr>
             <p:ph idx="12" type="sldNum"/>
@@ -3544,7 +4180,7 @@
   <p:cSld name="Caption">
     <p:spTree>
       <p:nvGrpSpPr>
-        <p:cNvPr id="145" name="Shape 145"/>
+        <p:cNvPr id="189" name="Shape 189"/>
         <p:cNvGrpSpPr/>
         <p:nvPr/>
       </p:nvGrpSpPr>
@@ -3558,7 +4194,7 @@
       </p:grpSpPr>
       <p:sp>
         <p:nvSpPr>
-          <p:cNvPr id="146" name="Shape 146"/>
+          <p:cNvPr id="190" name="Shape 190"/>
           <p:cNvSpPr txBox="1"/>
           <p:nvPr>
             <p:ph idx="1" type="body"/>
@@ -3590,7 +4226,7 @@
       </p:sp>
       <p:sp>
         <p:nvSpPr>
-          <p:cNvPr id="147" name="Shape 147"/>
+          <p:cNvPr id="191" name="Shape 191"/>
           <p:cNvSpPr txBox="1"/>
           <p:nvPr>
             <p:ph idx="12" type="sldNum"/>
@@ -3637,7 +4273,7 @@
   <p:cSld name="Blank">
     <p:spTree>
       <p:nvGrpSpPr>
-        <p:cNvPr id="148" name="Shape 148"/>
+        <p:cNvPr id="192" name="Shape 192"/>
         <p:cNvGrpSpPr/>
         <p:nvPr/>
       </p:nvGrpSpPr>
@@ -3651,7 +4287,7 @@
       </p:grpSpPr>
       <p:sp>
         <p:nvSpPr>
-          <p:cNvPr id="149" name="Shape 149"/>
+          <p:cNvPr id="193" name="Shape 193"/>
           <p:cNvSpPr txBox="1"/>
           <p:nvPr>
             <p:ph idx="12" type="sldNum"/>
@@ -4276,7 +4912,7 @@
     </p:bg>
     <p:spTree>
       <p:nvGrpSpPr>
-        <p:cNvPr id="125" name="Shape 125"/>
+        <p:cNvPr id="169" name="Shape 169"/>
         <p:cNvGrpSpPr/>
         <p:nvPr/>
       </p:nvGrpSpPr>
@@ -4290,7 +4926,7 @@
       </p:grpSpPr>
       <p:sp>
         <p:nvSpPr>
-          <p:cNvPr id="126" name="Shape 126"/>
+          <p:cNvPr id="170" name="Shape 170"/>
           <p:cNvSpPr txBox="1"/>
           <p:nvPr>
             <p:ph type="title"/>
@@ -4453,7 +5089,7 @@
       </p:sp>
       <p:sp>
         <p:nvSpPr>
-          <p:cNvPr id="127" name="Shape 127"/>
+          <p:cNvPr id="171" name="Shape 171"/>
           <p:cNvSpPr txBox="1"/>
           <p:nvPr>
             <p:ph idx="1" type="body"/>
@@ -4607,7 +5243,7 @@
       </p:sp>
       <p:sp>
         <p:nvSpPr>
-          <p:cNvPr id="128" name="Shape 128"/>
+          <p:cNvPr id="172" name="Shape 172"/>
           <p:cNvSpPr txBox="1"/>
           <p:nvPr>
             <p:ph idx="12" type="sldNum"/>
@@ -5883,7 +6519,7 @@
                 <a:cs typeface="Helvetica Neue"/>
                 <a:sym typeface="Helvetica Neue"/>
               </a:rPr>
-              <a:t>Memento - Spaceinvader before 1/3</a:t>
+              <a:t>Memento - Spaceinvader 1/3</a:t>
             </a:r>
           </a:p>
         </p:txBody>
@@ -6014,6 +6650,23 @@
               </a:rPr>
               <a:t>[…]</a:t>
             </a:r>
+          </a:p>
+          <a:p>
+            <a:pPr rtl="0">
+              <a:spcBef>
+                <a:spcPts val="0"/>
+              </a:spcBef>
+              <a:buNone/>
+            </a:pPr>
+            <a:r>
+              <a:t/>
+            </a:r>
+            <a:endParaRPr sz="1800">
+              <a:latin typeface="Courier New"/>
+              <a:ea typeface="Courier New"/>
+              <a:cs typeface="Courier New"/>
+              <a:sym typeface="Courier New"/>
+            </a:endParaRPr>
           </a:p>
           <a:p>
             <a:pPr lvl="0" rtl="0">
@@ -6216,7 +6869,7 @@
                 <a:cs typeface="Helvetica Neue"/>
                 <a:sym typeface="Helvetica Neue"/>
               </a:rPr>
-              <a:t>Memento - Spaceinvader after 2/3</a:t>
+              <a:t>Memento - Spaceinvader 2/3</a:t>
             </a:r>
           </a:p>
         </p:txBody>
@@ -6673,7 +7326,7 @@
                 <a:cs typeface="Helvetica Neue"/>
                 <a:sym typeface="Helvetica Neue"/>
               </a:rPr>
-              <a:t>Memento - Spaceinvader after 3/3</a:t>
+              <a:t>Memento - Spaceinvader 3/3</a:t>
             </a:r>
           </a:p>
           <a:p>
@@ -6853,16 +7506,8 @@
                 <a:cs typeface="Courier New"/>
                 <a:sym typeface="Courier New"/>
               </a:rPr>
-              <a:t>caretaker.addMemento(new Memento(new LevelIntroState(game.level)));	game.moveToState((caretaker.getMemento(0)).getSavedState())	</a:t>
-            </a:r>
-          </a:p>
-          <a:p>
-            <a:pPr indent="457200" rtl="0">
-              <a:spcBef>
-                <a:spcPts val="0"/>
-              </a:spcBef>
-              <a:buNone/>
-            </a:pPr>
+              <a:t>caretaker.addMemento(new Memento(new LevelIntroState(game.level)));</a:t>
+            </a:r>
             <a:r>
               <a:rPr lang="en-GB" sz="1500">
                 <a:latin typeface="Courier New"/>
@@ -6870,16 +7515,8 @@
                 <a:cs typeface="Courier New"/>
                 <a:sym typeface="Courier New"/>
               </a:rPr>
-              <a:t>}</a:t>
-            </a:r>
-          </a:p>
-          <a:p>
-            <a:pPr rtl="0">
-              <a:spcBef>
-                <a:spcPts val="0"/>
-              </a:spcBef>
-              <a:buNone/>
-            </a:pPr>
+              <a:t>	game.moveToState(</a:t>
+            </a:r>
             <a:r>
               <a:rPr lang="en-GB" sz="1500">
                 <a:latin typeface="Courier New"/>
@@ -6887,20 +7524,8 @@
                 <a:cs typeface="Courier New"/>
                 <a:sym typeface="Courier New"/>
               </a:rPr>
-              <a:t>}</a:t>
-            </a:r>
-            <a:r>
-              <a:rPr lang="en-GB" sz="1500"/>
-              <a:t>;</a:t>
-            </a:r>
-          </a:p>
-          <a:p>
-            <a:pPr rtl="0">
-              <a:spcBef>
-                <a:spcPts val="0"/>
-              </a:spcBef>
-              <a:buNone/>
-            </a:pPr>
+              <a:t>(caretaker.getMemento(0)).getSavedState()</a:t>
+            </a:r>
             <a:r>
               <a:rPr lang="en-GB" sz="1500">
                 <a:latin typeface="Courier New"/>
@@ -6908,11 +7533,11 @@
                 <a:cs typeface="Courier New"/>
                 <a:sym typeface="Courier New"/>
               </a:rPr>
-              <a:t>[…]</a:t>
-            </a:r>
-          </a:p>
-          <a:p>
-            <a:pPr rtl="0">
+              <a:t>)	</a:t>
+            </a:r>
+          </a:p>
+          <a:p>
+            <a:pPr indent="457200" rtl="0">
               <a:spcBef>
                 <a:spcPts val="0"/>
               </a:spcBef>
@@ -6925,7 +7550,7 @@
                 <a:cs typeface="Courier New"/>
                 <a:sym typeface="Courier New"/>
               </a:rPr>
-              <a:t> </a:t>
+              <a:t>}</a:t>
             </a:r>
           </a:p>
           <a:p>
@@ -6942,7 +7567,11 @@
                 <a:cs typeface="Courier New"/>
                 <a:sym typeface="Courier New"/>
               </a:rPr>
-              <a:t>GameOverState.prototype.keyDown = function(game, keyCode) {</a:t>
+              <a:t>}</a:t>
+            </a:r>
+            <a:r>
+              <a:rPr lang="en-GB" sz="1500"/>
+              <a:t>;</a:t>
             </a:r>
           </a:p>
           <a:p>
@@ -6959,7 +7588,7 @@
                 <a:cs typeface="Courier New"/>
                 <a:sym typeface="Courier New"/>
               </a:rPr>
-              <a:t>[…] </a:t>
+              <a:t>[…]</a:t>
             </a:r>
           </a:p>
           <a:p>
@@ -6976,7 +7605,76 @@
                 <a:cs typeface="Courier New"/>
                 <a:sym typeface="Courier New"/>
               </a:rPr>
-              <a:t>game.moveToState((caretaker.getMemento(0)).getSavedState());</a:t>
+              <a:t> </a:t>
+            </a:r>
+          </a:p>
+          <a:p>
+            <a:pPr rtl="0">
+              <a:spcBef>
+                <a:spcPts val="0"/>
+              </a:spcBef>
+              <a:buNone/>
+            </a:pPr>
+            <a:r>
+              <a:rPr lang="en-GB" sz="1500">
+                <a:latin typeface="Courier New"/>
+                <a:ea typeface="Courier New"/>
+                <a:cs typeface="Courier New"/>
+                <a:sym typeface="Courier New"/>
+              </a:rPr>
+              <a:t>GameOverState.prototype.keyDown = function(game, keyCode) {</a:t>
+            </a:r>
+          </a:p>
+          <a:p>
+            <a:pPr rtl="0">
+              <a:spcBef>
+                <a:spcPts val="0"/>
+              </a:spcBef>
+              <a:buNone/>
+            </a:pPr>
+            <a:r>
+              <a:rPr lang="en-GB" sz="1500">
+                <a:latin typeface="Courier New"/>
+                <a:ea typeface="Courier New"/>
+                <a:cs typeface="Courier New"/>
+                <a:sym typeface="Courier New"/>
+              </a:rPr>
+              <a:t>[…] </a:t>
+            </a:r>
+          </a:p>
+          <a:p>
+            <a:pPr rtl="0">
+              <a:spcBef>
+                <a:spcPts val="0"/>
+              </a:spcBef>
+              <a:buNone/>
+            </a:pPr>
+            <a:r>
+              <a:rPr lang="en-GB" sz="1500">
+                <a:latin typeface="Courier New"/>
+                <a:ea typeface="Courier New"/>
+                <a:cs typeface="Courier New"/>
+                <a:sym typeface="Courier New"/>
+              </a:rPr>
+              <a:t>game.moveToState(</a:t>
+            </a:r>
+            <a:r>
+              <a:rPr lang="en-GB" sz="1500">
+                <a:latin typeface="Courier New"/>
+                <a:ea typeface="Courier New"/>
+                <a:cs typeface="Courier New"/>
+                <a:sym typeface="Courier New"/>
+              </a:rPr>
+              <a:t>(caretaker.getMemento(0)).getSavedState()</a:t>
+            </a:r>
+            <a:r>
+              <a:rPr lang="en-GB" sz="1500">
+                <a:latin typeface="Courier New"/>
+                <a:ea typeface="Courier New"/>
+                <a:cs typeface="Courier New"/>
+                <a:sym typeface="Courier New"/>
+              </a:rPr>
+              <a:t>);</a:t>
             </a:r>
           </a:p>
           <a:p>
@@ -7135,7 +7833,7 @@
           </a:bodyPr>
           <a:lstStyle/>
           <a:p>
-            <a:pPr rtl="0">
+            <a:pPr lvl="0" rtl="0">
               <a:lnSpc>
                 <a:spcPct val="150000"/>
               </a:lnSpc>
@@ -7151,7 +7849,7 @@
                 <a:cs typeface="Helvetica Neue"/>
                 <a:sym typeface="Helvetica Neue"/>
               </a:rPr>
-              <a:t>Sources</a:t>
+              <a:t>Chain of responsibility </a:t>
             </a:r>
           </a:p>
           <a:p>
@@ -7186,7 +7884,7 @@
         </p:nvSpPr>
         <p:spPr>
           <a:xfrm>
-            <a:off x="471050" y="1427625"/>
+            <a:off x="461825" y="1387075"/>
             <a:ext cx="8183399" cy="4816199"/>
           </a:xfrm>
           <a:prstGeom prst="rect">
@@ -7199,121 +7897,1607 @@
           </a:bodyPr>
           <a:lstStyle/>
           <a:p>
-            <a:pPr rtl="0">
+            <a:pPr indent="-381000" lvl="0" marL="457200" rtl="0">
               <a:lnSpc>
                 <a:spcPct val="150000"/>
               </a:lnSpc>
               <a:spcBef>
                 <a:spcPts val="0"/>
               </a:spcBef>
-              <a:buNone/>
-            </a:pPr>
-            <a:r>
-              <a:rPr lang="en-GB" u="sng">
-                <a:solidFill>
-                  <a:schemeClr val="hlink"/>
-                </a:solidFill>
-                <a:hlinkClick r:id="rId3"/>
-              </a:rPr>
-              <a:t>http://www.dofactory.com/javascript/design-patterns</a:t>
-            </a:r>
-          </a:p>
-          <a:p>
-            <a:pPr rtl="0">
+              <a:buSzPct val="100000"/>
+              <a:buFont typeface="Helvetica Neue"/>
+              <a:buChar char="●"/>
+            </a:pPr>
+            <a:r>
+              <a:rPr lang="en-GB" sz="2400">
+                <a:latin typeface="Helvetica Neue"/>
+                <a:ea typeface="Helvetica Neue"/>
+                <a:cs typeface="Helvetica Neue"/>
+                <a:sym typeface="Helvetica Neue"/>
+              </a:rPr>
+              <a:t>Avoid coupling the sender of a request to its receiver.</a:t>
+            </a:r>
+          </a:p>
+          <a:p>
+            <a:pPr indent="-381000" lvl="0" marL="457200" rtl="0">
               <a:lnSpc>
                 <a:spcPct val="150000"/>
               </a:lnSpc>
               <a:spcBef>
                 <a:spcPts val="0"/>
               </a:spcBef>
-              <a:buNone/>
-            </a:pPr>
-            <a:r>
-              <a:rPr lang="en-GB" u="sng">
-                <a:solidFill>
-                  <a:schemeClr val="hlink"/>
-                </a:solidFill>
-                <a:hlinkClick r:id="rId4"/>
-              </a:rPr>
-              <a:t>https://sourcemaking.com/design_patterns</a:t>
-            </a:r>
-          </a:p>
-          <a:p>
-            <a:pPr rtl="0">
+              <a:buSzPct val="100000"/>
+              <a:buFont typeface="Helvetica Neue"/>
+              <a:buChar char="●"/>
+            </a:pPr>
+            <a:r>
+              <a:rPr lang="en-GB" sz="2400">
+                <a:latin typeface="Helvetica Neue"/>
+                <a:ea typeface="Helvetica Neue"/>
+                <a:cs typeface="Helvetica Neue"/>
+                <a:sym typeface="Helvetica Neue"/>
+              </a:rPr>
+              <a:t>More than one object have the chance to handle the request. </a:t>
+            </a:r>
+          </a:p>
+          <a:p>
+            <a:pPr indent="-381000" lvl="0" marL="457200" rtl="0">
               <a:lnSpc>
                 <a:spcPct val="150000"/>
               </a:lnSpc>
               <a:spcBef>
                 <a:spcPts val="0"/>
               </a:spcBef>
-              <a:buNone/>
-            </a:pPr>
-            <a:r>
-              <a:rPr lang="en-GB" u="sng">
-                <a:solidFill>
-                  <a:schemeClr val="hlink"/>
-                </a:solidFill>
-                <a:hlinkClick r:id="rId5"/>
-              </a:rPr>
-              <a:t>https://en.wikipedia.org/wiki/Command_pattern</a:t>
-            </a:r>
-          </a:p>
-          <a:p>
-            <a:pPr rtl="0">
-              <a:lnSpc>
-                <a:spcPct val="150000"/>
-              </a:lnSpc>
-              <a:spcBef>
-                <a:spcPts val="0"/>
-              </a:spcBef>
-              <a:buNone/>
-            </a:pPr>
-            <a:r>
-              <a:rPr lang="en-GB" u="sng">
-                <a:solidFill>
-                  <a:schemeClr val="hlink"/>
-                </a:solidFill>
-                <a:hlinkClick r:id="rId6"/>
-              </a:rPr>
-              <a:t>https://de.wikipedia.org/wiki/Memento_%28Entwurfsmuster%29</a:t>
-            </a:r>
-          </a:p>
-          <a:p>
-            <a:pPr lvl="0" rtl="0">
-              <a:lnSpc>
-                <a:spcPct val="150000"/>
-              </a:lnSpc>
-              <a:spcBef>
-                <a:spcPts val="0"/>
-              </a:spcBef>
-              <a:buNone/>
-            </a:pPr>
-            <a:r>
-              <a:rPr b="1" lang="en-GB"/>
-              <a:t>(Osmani, A. (2012).</a:t>
-            </a:r>
-            <a:r>
-              <a:rPr lang="en-GB"/>
-              <a:t> Learning JavaScript Design Patterns. O'Reilly Media, Inc.)</a:t>
-            </a:r>
-          </a:p>
-          <a:p>
-            <a:pPr lvl="0" rtl="0">
-              <a:spcBef>
-                <a:spcPts val="0"/>
-              </a:spcBef>
-              <a:buNone/>
-            </a:pPr>
-            <a:r>
-              <a:t/>
-            </a:r>
-            <a:endParaRPr sz="2400"/>
+              <a:buSzPct val="100000"/>
+              <a:buFont typeface="Helvetica Neue"/>
+              <a:buChar char="●"/>
+            </a:pPr>
+            <a:r>
+              <a:rPr lang="en-GB" sz="2400">
+                <a:latin typeface="Helvetica Neue"/>
+                <a:ea typeface="Helvetica Neue"/>
+                <a:cs typeface="Helvetica Neue"/>
+                <a:sym typeface="Helvetica Neue"/>
+              </a:rPr>
+              <a:t>linear search for a handler</a:t>
+            </a:r>
           </a:p>
         </p:txBody>
       </p:sp>
       <p:sp>
         <p:nvSpPr>
           <p:cNvPr id="121" name="Shape 121"/>
+          <p:cNvSpPr txBox="1"/>
+          <p:nvPr/>
+        </p:nvSpPr>
+        <p:spPr>
+          <a:xfrm>
+            <a:off x="461825" y="6092700"/>
+            <a:ext cx="8225099" cy="629700"/>
+          </a:xfrm>
+          <a:prstGeom prst="rect">
+            <a:avLst/>
+          </a:prstGeom>
+          <a:noFill/>
+          <a:ln>
+            <a:noFill/>
+          </a:ln>
+        </p:spPr>
+        <p:txBody>
+          <a:bodyPr anchorCtr="0" anchor="t" bIns="91425" lIns="91425" rIns="91425" tIns="91425">
+            <a:noAutofit/>
+          </a:bodyPr>
+          <a:lstStyle/>
+          <a:p>
+            <a:pPr lvl="0" rtl="0" algn="ctr">
+              <a:lnSpc>
+                <a:spcPct val="115000"/>
+              </a:lnSpc>
+              <a:spcBef>
+                <a:spcPts val="2400"/>
+              </a:spcBef>
+              <a:spcAft>
+                <a:spcPts val="600"/>
+              </a:spcAft>
+              <a:buNone/>
+            </a:pPr>
+            <a:r>
+              <a:rPr lang="en-GB">
+                <a:solidFill>
+                  <a:srgbClr val="A0A0A0"/>
+                </a:solidFill>
+                <a:latin typeface="Helvetica Neue"/>
+                <a:ea typeface="Helvetica Neue"/>
+                <a:cs typeface="Helvetica Neue"/>
+                <a:sym typeface="Helvetica Neue"/>
+              </a:rPr>
+              <a:t>Patterns and Anti Patterns - Behavioral Patterns - Malte Brockmann, Jun Heui Cho - WS 2015</a:t>
+            </a:r>
+          </a:p>
+        </p:txBody>
+      </p:sp>
+    </p:spTree>
+  </p:cSld>
+  <p:clrMapOvr>
+    <a:masterClrMapping/>
+  </p:clrMapOvr>
+  <p:transition spd="slow">
+    <p:cut/>
+  </p:transition>
+</p:sld>
+</file>
+
+<file path=ppt/slides/slide16.xml><?xml version="1.0" encoding="utf-8"?>
+<p:sld xmlns:a="http://schemas.openxmlformats.org/drawingml/2006/main" xmlns:r="http://schemas.openxmlformats.org/officeDocument/2006/relationships" xmlns:mc="http://schemas.openxmlformats.org/markup-compatibility/2006" xmlns:mv="urn:schemas-microsoft-com:mac:vml" xmlns:p="http://schemas.openxmlformats.org/presentationml/2006/main" xmlns:c="http://schemas.openxmlformats.org/drawingml/2006/chart" xmlns:dgm="http://schemas.openxmlformats.org/drawingml/2006/diagram" xmlns:o="urn:schemas-microsoft-com:office:office" xmlns:v="urn:schemas-microsoft-com:vml" xmlns:pvml="urn:schemas-microsoft-com:office:powerpoint" xmlns:com="http://schemas.openxmlformats.org/drawingml/2006/compatibility" xmlns:p14="http://schemas.microsoft.com/office/powerpoint/2010/main">
+  <p:cSld>
+    <p:spTree>
+      <p:nvGrpSpPr>
+        <p:cNvPr id="125" name="Shape 125"/>
+        <p:cNvGrpSpPr/>
+        <p:nvPr/>
+      </p:nvGrpSpPr>
+      <p:grpSpPr>
+        <a:xfrm>
+          <a:off x="0" y="0"/>
+          <a:ext cx="0" cy="0"/>
+          <a:chOff x="0" y="0"/>
+          <a:chExt cx="0" cy="0"/>
+        </a:xfrm>
+      </p:grpSpPr>
+      <p:sp>
+        <p:nvSpPr>
+          <p:cNvPr id="126" name="Shape 126"/>
+          <p:cNvSpPr txBox="1"/>
+          <p:nvPr>
+            <p:ph type="title"/>
+          </p:nvPr>
+        </p:nvSpPr>
+        <p:spPr>
+          <a:xfrm>
+            <a:off x="461825" y="757370"/>
+            <a:ext cx="8225099" cy="629700"/>
+          </a:xfrm>
+          <a:prstGeom prst="rect">
+            <a:avLst/>
+          </a:prstGeom>
+        </p:spPr>
+        <p:txBody>
+          <a:bodyPr anchorCtr="0" anchor="t" bIns="91425" lIns="91425" rIns="91425" tIns="91425">
+            <a:noAutofit/>
+          </a:bodyPr>
+          <a:lstStyle/>
+          <a:p>
+            <a:pPr lvl="0" rtl="0">
+              <a:lnSpc>
+                <a:spcPct val="150000"/>
+              </a:lnSpc>
+              <a:spcBef>
+                <a:spcPts val="0"/>
+              </a:spcBef>
+              <a:buNone/>
+            </a:pPr>
+            <a:r>
+              <a:rPr b="1" lang="en-GB" sz="3600">
+                <a:latin typeface="Helvetica Neue"/>
+                <a:ea typeface="Helvetica Neue"/>
+                <a:cs typeface="Helvetica Neue"/>
+                <a:sym typeface="Helvetica Neue"/>
+              </a:rPr>
+              <a:t>Chain of responsibility - Participants </a:t>
+            </a:r>
+          </a:p>
+          <a:p>
+            <a:pPr lvl="0" rtl="0">
+              <a:lnSpc>
+                <a:spcPct val="150000"/>
+              </a:lnSpc>
+              <a:spcBef>
+                <a:spcPts val="0"/>
+              </a:spcBef>
+              <a:buNone/>
+            </a:pPr>
+            <a:r>
+              <a:t/>
+            </a:r>
+            <a:endParaRPr b="1" sz="3600">
+              <a:latin typeface="Helvetica Neue"/>
+              <a:ea typeface="Helvetica Neue"/>
+              <a:cs typeface="Helvetica Neue"/>
+              <a:sym typeface="Helvetica Neue"/>
+            </a:endParaRPr>
+          </a:p>
+        </p:txBody>
+      </p:sp>
+      <p:sp>
+        <p:nvSpPr>
+          <p:cNvPr id="127" name="Shape 127"/>
+          <p:cNvSpPr txBox="1"/>
+          <p:nvPr>
+            <p:ph idx="1" type="body"/>
+          </p:nvPr>
+        </p:nvSpPr>
+        <p:spPr>
+          <a:xfrm>
+            <a:off x="461825" y="1387075"/>
+            <a:ext cx="8183399" cy="4816199"/>
+          </a:xfrm>
+          <a:prstGeom prst="rect">
+            <a:avLst/>
+          </a:prstGeom>
+        </p:spPr>
+        <p:txBody>
+          <a:bodyPr anchorCtr="0" anchor="t" bIns="91425" lIns="91425" rIns="91425" tIns="91425">
+            <a:noAutofit/>
+          </a:bodyPr>
+          <a:lstStyle/>
+          <a:p>
+            <a:pPr indent="-381000" lvl="0" marL="457200" rtl="0">
+              <a:lnSpc>
+                <a:spcPct val="150000"/>
+              </a:lnSpc>
+              <a:spcBef>
+                <a:spcPts val="0"/>
+              </a:spcBef>
+              <a:buSzPct val="100000"/>
+              <a:buFont typeface="Helvetica Neue"/>
+              <a:buChar char="●"/>
+            </a:pPr>
+            <a:r>
+              <a:rPr lang="en-GB" sz="2400">
+                <a:latin typeface="Helvetica Neue"/>
+                <a:ea typeface="Helvetica Neue"/>
+                <a:cs typeface="Helvetica Neue"/>
+                <a:sym typeface="Helvetica Neue"/>
+              </a:rPr>
+              <a:t>Client: Initiator of the request</a:t>
+            </a:r>
+          </a:p>
+          <a:p>
+            <a:pPr indent="-381000" lvl="0" marL="457200" rtl="0">
+              <a:lnSpc>
+                <a:spcPct val="150000"/>
+              </a:lnSpc>
+              <a:spcBef>
+                <a:spcPts val="0"/>
+              </a:spcBef>
+              <a:buSzPct val="100000"/>
+              <a:buFont typeface="Helvetica Neue"/>
+              <a:buChar char="●"/>
+            </a:pPr>
+            <a:r>
+              <a:rPr lang="en-GB" sz="2400">
+                <a:latin typeface="Helvetica Neue"/>
+                <a:ea typeface="Helvetica Neue"/>
+                <a:cs typeface="Helvetica Neue"/>
+                <a:sym typeface="Helvetica Neue"/>
+              </a:rPr>
+              <a:t>Handler: has an interface for handling the request</a:t>
+            </a:r>
+          </a:p>
+        </p:txBody>
+      </p:sp>
+      <p:sp>
+        <p:nvSpPr>
+          <p:cNvPr id="128" name="Shape 128"/>
+          <p:cNvSpPr txBox="1"/>
+          <p:nvPr/>
+        </p:nvSpPr>
+        <p:spPr>
+          <a:xfrm>
+            <a:off x="461825" y="6092700"/>
+            <a:ext cx="8225099" cy="629700"/>
+          </a:xfrm>
+          <a:prstGeom prst="rect">
+            <a:avLst/>
+          </a:prstGeom>
+          <a:noFill/>
+          <a:ln>
+            <a:noFill/>
+          </a:ln>
+        </p:spPr>
+        <p:txBody>
+          <a:bodyPr anchorCtr="0" anchor="t" bIns="91425" lIns="91425" rIns="91425" tIns="91425">
+            <a:noAutofit/>
+          </a:bodyPr>
+          <a:lstStyle/>
+          <a:p>
+            <a:pPr lvl="0" rtl="0" algn="ctr">
+              <a:lnSpc>
+                <a:spcPct val="115000"/>
+              </a:lnSpc>
+              <a:spcBef>
+                <a:spcPts val="2400"/>
+              </a:spcBef>
+              <a:spcAft>
+                <a:spcPts val="600"/>
+              </a:spcAft>
+              <a:buNone/>
+            </a:pPr>
+            <a:r>
+              <a:rPr lang="en-GB">
+                <a:solidFill>
+                  <a:srgbClr val="A0A0A0"/>
+                </a:solidFill>
+                <a:latin typeface="Helvetica Neue"/>
+                <a:ea typeface="Helvetica Neue"/>
+                <a:cs typeface="Helvetica Neue"/>
+                <a:sym typeface="Helvetica Neue"/>
+              </a:rPr>
+              <a:t>Patterns and Anti Patterns - Behavioral Patterns - Malte Brockmann, Jun Heui Cho - WS 2015</a:t>
+            </a:r>
+          </a:p>
+        </p:txBody>
+      </p:sp>
+      <p:sp>
+        <p:nvSpPr>
+          <p:cNvPr id="129" name="Shape 129"/>
+          <p:cNvSpPr txBox="1"/>
+          <p:nvPr/>
+        </p:nvSpPr>
+        <p:spPr>
+          <a:xfrm rot="-5400000">
+            <a:off x="6101899" y="3067674"/>
+            <a:ext cx="5403300" cy="298199"/>
+          </a:xfrm>
+          <a:prstGeom prst="rect">
+            <a:avLst/>
+          </a:prstGeom>
+          <a:noFill/>
+          <a:ln>
+            <a:noFill/>
+          </a:ln>
+        </p:spPr>
+        <p:txBody>
+          <a:bodyPr anchorCtr="0" anchor="t" bIns="91425" lIns="91425" rIns="91425" tIns="91425">
+            <a:noAutofit/>
+          </a:bodyPr>
+          <a:lstStyle/>
+          <a:p>
+            <a:pPr lvl="0" rtl="0">
+              <a:spcBef>
+                <a:spcPts val="0"/>
+              </a:spcBef>
+              <a:buNone/>
+            </a:pPr>
+            <a:r>
+              <a:rPr lang="en-GB" sz="1000"/>
+              <a:t>http://www.dofactory.com/images/diagrams/javascript/javascript-chain-of-responsibility.jpg</a:t>
+            </a:r>
+          </a:p>
+        </p:txBody>
+      </p:sp>
+      <p:pic>
+        <p:nvPicPr>
+          <p:cNvPr id="130" name="Shape 130"/>
+          <p:cNvPicPr preferRelativeResize="0"/>
+          <p:nvPr/>
+        </p:nvPicPr>
+        <p:blipFill>
+          <a:blip r:embed="rId3">
+            <a:alphaModFix/>
+          </a:blip>
+          <a:stretch>
+            <a:fillRect/>
+          </a:stretch>
+        </p:blipFill>
+        <p:spPr>
+          <a:xfrm>
+            <a:off x="461812" y="3144406"/>
+            <a:ext cx="7689574" cy="947074"/>
+          </a:xfrm>
+          <a:prstGeom prst="rect">
+            <a:avLst/>
+          </a:prstGeom>
+          <a:noFill/>
+          <a:ln>
+            <a:noFill/>
+          </a:ln>
+        </p:spPr>
+      </p:pic>
+    </p:spTree>
+  </p:cSld>
+  <p:clrMapOvr>
+    <a:masterClrMapping/>
+  </p:clrMapOvr>
+  <p:transition spd="slow">
+    <p:cut/>
+  </p:transition>
+</p:sld>
+</file>
+
+<file path=ppt/slides/slide17.xml><?xml version="1.0" encoding="utf-8"?>
+<p:sld xmlns:a="http://schemas.openxmlformats.org/drawingml/2006/main" xmlns:r="http://schemas.openxmlformats.org/officeDocument/2006/relationships" xmlns:mc="http://schemas.openxmlformats.org/markup-compatibility/2006" xmlns:mv="urn:schemas-microsoft-com:mac:vml" xmlns:p="http://schemas.openxmlformats.org/presentationml/2006/main" xmlns:c="http://schemas.openxmlformats.org/drawingml/2006/chart" xmlns:dgm="http://schemas.openxmlformats.org/drawingml/2006/diagram" xmlns:o="urn:schemas-microsoft-com:office:office" xmlns:v="urn:schemas-microsoft-com:vml" xmlns:pvml="urn:schemas-microsoft-com:office:powerpoint" xmlns:com="http://schemas.openxmlformats.org/drawingml/2006/compatibility" xmlns:p14="http://schemas.microsoft.com/office/powerpoint/2010/main">
+  <p:cSld>
+    <p:spTree>
+      <p:nvGrpSpPr>
+        <p:cNvPr id="134" name="Shape 134"/>
+        <p:cNvGrpSpPr/>
+        <p:nvPr/>
+      </p:nvGrpSpPr>
+      <p:grpSpPr>
+        <a:xfrm>
+          <a:off x="0" y="0"/>
+          <a:ext cx="0" cy="0"/>
+          <a:chOff x="0" y="0"/>
+          <a:chExt cx="0" cy="0"/>
+        </a:xfrm>
+      </p:grpSpPr>
+      <p:sp>
+        <p:nvSpPr>
+          <p:cNvPr id="135" name="Shape 135"/>
+          <p:cNvSpPr txBox="1"/>
+          <p:nvPr>
+            <p:ph type="title"/>
+          </p:nvPr>
+        </p:nvSpPr>
+        <p:spPr>
+          <a:xfrm>
+            <a:off x="461825" y="757370"/>
+            <a:ext cx="8225099" cy="629700"/>
+          </a:xfrm>
+          <a:prstGeom prst="rect">
+            <a:avLst/>
+          </a:prstGeom>
+        </p:spPr>
+        <p:txBody>
+          <a:bodyPr anchorCtr="0" anchor="t" bIns="91425" lIns="91425" rIns="91425" tIns="91425">
+            <a:noAutofit/>
+          </a:bodyPr>
+          <a:lstStyle/>
+          <a:p>
+            <a:pPr lvl="0" rtl="0">
+              <a:lnSpc>
+                <a:spcPct val="150000"/>
+              </a:lnSpc>
+              <a:spcBef>
+                <a:spcPts val="0"/>
+              </a:spcBef>
+              <a:buNone/>
+            </a:pPr>
+            <a:r>
+              <a:rPr b="1" lang="en-GB" sz="3400">
+                <a:latin typeface="Helvetica Neue"/>
+                <a:ea typeface="Helvetica Neue"/>
+                <a:cs typeface="Helvetica Neue"/>
+                <a:sym typeface="Helvetica Neue"/>
+              </a:rPr>
+              <a:t>Chain of responsibility - Tic tac toe 1/4  </a:t>
+            </a:r>
+          </a:p>
+          <a:p>
+            <a:pPr lvl="0" rtl="0">
+              <a:lnSpc>
+                <a:spcPct val="150000"/>
+              </a:lnSpc>
+              <a:spcBef>
+                <a:spcPts val="0"/>
+              </a:spcBef>
+              <a:buNone/>
+            </a:pPr>
+            <a:r>
+              <a:t/>
+            </a:r>
+            <a:endParaRPr b="1" sz="3600">
+              <a:latin typeface="Helvetica Neue"/>
+              <a:ea typeface="Helvetica Neue"/>
+              <a:cs typeface="Helvetica Neue"/>
+              <a:sym typeface="Helvetica Neue"/>
+            </a:endParaRPr>
+          </a:p>
+        </p:txBody>
+      </p:sp>
+      <p:sp>
+        <p:nvSpPr>
+          <p:cNvPr id="136" name="Shape 136"/>
+          <p:cNvSpPr txBox="1"/>
+          <p:nvPr>
+            <p:ph idx="1" type="body"/>
+          </p:nvPr>
+        </p:nvSpPr>
+        <p:spPr>
+          <a:xfrm>
+            <a:off x="461825" y="1387075"/>
+            <a:ext cx="8183399" cy="4816199"/>
+          </a:xfrm>
+          <a:prstGeom prst="rect">
+            <a:avLst/>
+          </a:prstGeom>
+        </p:spPr>
+        <p:txBody>
+          <a:bodyPr anchorCtr="0" anchor="t" bIns="91425" lIns="91425" rIns="91425" tIns="91425">
+            <a:noAutofit/>
+          </a:bodyPr>
+          <a:lstStyle/>
+          <a:p>
+            <a:pPr rtl="0">
+              <a:lnSpc>
+                <a:spcPct val="150000"/>
+              </a:lnSpc>
+              <a:spcBef>
+                <a:spcPts val="0"/>
+              </a:spcBef>
+              <a:buNone/>
+            </a:pPr>
+            <a:r>
+              <a:rPr lang="en-GB" sz="2400">
+                <a:latin typeface="Helvetica Neue"/>
+                <a:ea typeface="Helvetica Neue"/>
+                <a:cs typeface="Helvetica Neue"/>
+                <a:sym typeface="Helvetica Neue"/>
+              </a:rPr>
+              <a:t>befor:</a:t>
+            </a:r>
+          </a:p>
+          <a:p>
+            <a:pPr rtl="0">
+              <a:lnSpc>
+                <a:spcPct val="100000"/>
+              </a:lnSpc>
+              <a:spcBef>
+                <a:spcPts val="0"/>
+              </a:spcBef>
+              <a:buNone/>
+            </a:pPr>
+            <a:r>
+              <a:rPr lang="en-GB" sz="1800">
+                <a:latin typeface="Courier New"/>
+                <a:ea typeface="Courier New"/>
+                <a:cs typeface="Courier New"/>
+                <a:sym typeface="Courier New"/>
+              </a:rPr>
+              <a:t>function checkWinner() {</a:t>
+            </a:r>
+          </a:p>
+          <a:p>
+            <a:pPr rtl="0">
+              <a:lnSpc>
+                <a:spcPct val="100000"/>
+              </a:lnSpc>
+              <a:spcBef>
+                <a:spcPts val="0"/>
+              </a:spcBef>
+              <a:buNone/>
+            </a:pPr>
+            <a:r>
+              <a:rPr lang="en-GB" sz="1800">
+                <a:latin typeface="Courier New"/>
+                <a:ea typeface="Courier New"/>
+                <a:cs typeface="Courier New"/>
+                <a:sym typeface="Courier New"/>
+              </a:rPr>
+              <a:t>	if (checkRows() === true || checkCols() === true || checkDiag() === true) {</a:t>
+            </a:r>
+          </a:p>
+          <a:p>
+            <a:pPr rtl="0">
+              <a:lnSpc>
+                <a:spcPct val="100000"/>
+              </a:lnSpc>
+              <a:spcBef>
+                <a:spcPts val="0"/>
+              </a:spcBef>
+              <a:buNone/>
+            </a:pPr>
+            <a:r>
+              <a:rPr lang="en-GB" sz="1800">
+                <a:latin typeface="Courier New"/>
+                <a:ea typeface="Courier New"/>
+                <a:cs typeface="Courier New"/>
+                <a:sym typeface="Courier New"/>
+              </a:rPr>
+              <a:t>		winningPlayer = turn.currentPlayerColor();</a:t>
+            </a:r>
+          </a:p>
+          <a:p>
+            <a:pPr rtl="0">
+              <a:lnSpc>
+                <a:spcPct val="100000"/>
+              </a:lnSpc>
+              <a:spcBef>
+                <a:spcPts val="0"/>
+              </a:spcBef>
+              <a:buNone/>
+            </a:pPr>
+            <a:r>
+              <a:rPr lang="en-GB" sz="1800">
+                <a:latin typeface="Courier New"/>
+                <a:ea typeface="Courier New"/>
+                <a:cs typeface="Courier New"/>
+                <a:sym typeface="Courier New"/>
+              </a:rPr>
+              <a:t>		// Alert winner</a:t>
+            </a:r>
+          </a:p>
+          <a:p>
+            <a:pPr rtl="0">
+              <a:lnSpc>
+                <a:spcPct val="100000"/>
+              </a:lnSpc>
+              <a:spcBef>
+                <a:spcPts val="0"/>
+              </a:spcBef>
+              <a:buNone/>
+            </a:pPr>
+            <a:r>
+              <a:rPr lang="en-GB" sz="1800">
+                <a:latin typeface="Courier New"/>
+                <a:ea typeface="Courier New"/>
+                <a:cs typeface="Courier New"/>
+                <a:sym typeface="Courier New"/>
+              </a:rPr>
+              <a:t>		endGame("Player " + winningPlayer + ", you win!");</a:t>
+            </a:r>
+          </a:p>
+          <a:p>
+            <a:pPr rtl="0">
+              <a:lnSpc>
+                <a:spcPct val="100000"/>
+              </a:lnSpc>
+              <a:spcBef>
+                <a:spcPts val="0"/>
+              </a:spcBef>
+              <a:buNone/>
+            </a:pPr>
+            <a:r>
+              <a:rPr lang="en-GB" sz="1800">
+                <a:latin typeface="Courier New"/>
+                <a:ea typeface="Courier New"/>
+                <a:cs typeface="Courier New"/>
+                <a:sym typeface="Courier New"/>
+              </a:rPr>
+              <a:t>	}</a:t>
+            </a:r>
+          </a:p>
+          <a:p>
+            <a:pPr rtl="0">
+              <a:lnSpc>
+                <a:spcPct val="100000"/>
+              </a:lnSpc>
+              <a:spcBef>
+                <a:spcPts val="0"/>
+              </a:spcBef>
+              <a:buNone/>
+            </a:pPr>
+            <a:r>
+              <a:rPr lang="en-GB" sz="1800">
+                <a:latin typeface="Courier New"/>
+                <a:ea typeface="Courier New"/>
+                <a:cs typeface="Courier New"/>
+                <a:sym typeface="Courier New"/>
+              </a:rPr>
+              <a:t>	else if (checkTie() === true) {</a:t>
+            </a:r>
+          </a:p>
+          <a:p>
+            <a:pPr rtl="0">
+              <a:lnSpc>
+                <a:spcPct val="100000"/>
+              </a:lnSpc>
+              <a:spcBef>
+                <a:spcPts val="0"/>
+              </a:spcBef>
+              <a:buNone/>
+            </a:pPr>
+            <a:r>
+              <a:rPr lang="en-GB" sz="1800">
+                <a:latin typeface="Courier New"/>
+                <a:ea typeface="Courier New"/>
+                <a:cs typeface="Courier New"/>
+                <a:sym typeface="Courier New"/>
+              </a:rPr>
+              <a:t>		endGame("It's a tie...");</a:t>
+            </a:r>
+          </a:p>
+          <a:p>
+            <a:pPr rtl="0">
+              <a:lnSpc>
+                <a:spcPct val="100000"/>
+              </a:lnSpc>
+              <a:spcBef>
+                <a:spcPts val="0"/>
+              </a:spcBef>
+              <a:buNone/>
+            </a:pPr>
+            <a:r>
+              <a:rPr lang="en-GB" sz="1800">
+                <a:latin typeface="Courier New"/>
+                <a:ea typeface="Courier New"/>
+                <a:cs typeface="Courier New"/>
+                <a:sym typeface="Courier New"/>
+              </a:rPr>
+              <a:t>	}</a:t>
+            </a:r>
+          </a:p>
+          <a:p>
+            <a:pPr rtl="0">
+              <a:lnSpc>
+                <a:spcPct val="100000"/>
+              </a:lnSpc>
+              <a:spcBef>
+                <a:spcPts val="0"/>
+              </a:spcBef>
+              <a:buNone/>
+            </a:pPr>
+            <a:r>
+              <a:rPr lang="en-GB" sz="1800">
+                <a:latin typeface="Courier New"/>
+                <a:ea typeface="Courier New"/>
+                <a:cs typeface="Courier New"/>
+                <a:sym typeface="Courier New"/>
+              </a:rPr>
+              <a:t>	else {</a:t>
+            </a:r>
+          </a:p>
+          <a:p>
+            <a:pPr rtl="0">
+              <a:lnSpc>
+                <a:spcPct val="100000"/>
+              </a:lnSpc>
+              <a:spcBef>
+                <a:spcPts val="0"/>
+              </a:spcBef>
+              <a:buNone/>
+            </a:pPr>
+            <a:r>
+              <a:rPr lang="en-GB" sz="1800">
+                <a:latin typeface="Courier New"/>
+                <a:ea typeface="Courier New"/>
+                <a:cs typeface="Courier New"/>
+                <a:sym typeface="Courier New"/>
+              </a:rPr>
+              <a:t>		turn.changeTurn();</a:t>
+            </a:r>
+          </a:p>
+          <a:p>
+            <a:pPr rtl="0">
+              <a:lnSpc>
+                <a:spcPct val="100000"/>
+              </a:lnSpc>
+              <a:spcBef>
+                <a:spcPts val="0"/>
+              </a:spcBef>
+              <a:buNone/>
+            </a:pPr>
+            <a:r>
+              <a:rPr lang="en-GB" sz="1800">
+                <a:latin typeface="Courier New"/>
+                <a:ea typeface="Courier New"/>
+                <a:cs typeface="Courier New"/>
+                <a:sym typeface="Courier New"/>
+              </a:rPr>
+              <a:t>	}</a:t>
+            </a:r>
+          </a:p>
+          <a:p>
+            <a:pPr rtl="0">
+              <a:lnSpc>
+                <a:spcPct val="100000"/>
+              </a:lnSpc>
+              <a:spcBef>
+                <a:spcPts val="0"/>
+              </a:spcBef>
+              <a:buNone/>
+            </a:pPr>
+            <a:r>
+              <a:rPr lang="en-GB" sz="1800">
+                <a:latin typeface="Courier New"/>
+                <a:ea typeface="Courier New"/>
+                <a:cs typeface="Courier New"/>
+                <a:sym typeface="Courier New"/>
+              </a:rPr>
+              <a:t>}</a:t>
+            </a:r>
+          </a:p>
+          <a:p>
+            <a:pPr lvl="0" rtl="0">
+              <a:lnSpc>
+                <a:spcPct val="100000"/>
+              </a:lnSpc>
+              <a:spcBef>
+                <a:spcPts val="0"/>
+              </a:spcBef>
+              <a:buNone/>
+            </a:pPr>
+            <a:r>
+              <a:t/>
+            </a:r>
+            <a:endParaRPr sz="1800">
+              <a:latin typeface="Courier New"/>
+              <a:ea typeface="Courier New"/>
+              <a:cs typeface="Courier New"/>
+              <a:sym typeface="Courier New"/>
+            </a:endParaRPr>
+          </a:p>
+        </p:txBody>
+      </p:sp>
+      <p:sp>
+        <p:nvSpPr>
+          <p:cNvPr id="137" name="Shape 137"/>
+          <p:cNvSpPr txBox="1"/>
+          <p:nvPr/>
+        </p:nvSpPr>
+        <p:spPr>
+          <a:xfrm>
+            <a:off x="461825" y="6092700"/>
+            <a:ext cx="8225099" cy="629700"/>
+          </a:xfrm>
+          <a:prstGeom prst="rect">
+            <a:avLst/>
+          </a:prstGeom>
+          <a:noFill/>
+          <a:ln>
+            <a:noFill/>
+          </a:ln>
+        </p:spPr>
+        <p:txBody>
+          <a:bodyPr anchorCtr="0" anchor="t" bIns="91425" lIns="91425" rIns="91425" tIns="91425">
+            <a:noAutofit/>
+          </a:bodyPr>
+          <a:lstStyle/>
+          <a:p>
+            <a:pPr lvl="0" rtl="0" algn="ctr">
+              <a:lnSpc>
+                <a:spcPct val="115000"/>
+              </a:lnSpc>
+              <a:spcBef>
+                <a:spcPts val="2400"/>
+              </a:spcBef>
+              <a:spcAft>
+                <a:spcPts val="600"/>
+              </a:spcAft>
+              <a:buNone/>
+            </a:pPr>
+            <a:r>
+              <a:rPr lang="en-GB">
+                <a:solidFill>
+                  <a:srgbClr val="A0A0A0"/>
+                </a:solidFill>
+                <a:latin typeface="Helvetica Neue"/>
+                <a:ea typeface="Helvetica Neue"/>
+                <a:cs typeface="Helvetica Neue"/>
+                <a:sym typeface="Helvetica Neue"/>
+              </a:rPr>
+              <a:t>Patterns and Anti Patterns - Behavioral Patterns - Malte Brockmann, Jun Heui Cho - WS 2015</a:t>
+            </a:r>
+          </a:p>
+        </p:txBody>
+      </p:sp>
+    </p:spTree>
+  </p:cSld>
+  <p:clrMapOvr>
+    <a:masterClrMapping/>
+  </p:clrMapOvr>
+  <p:transition spd="slow">
+    <p:cut/>
+  </p:transition>
+</p:sld>
+</file>
+
+<file path=ppt/slides/slide18.xml><?xml version="1.0" encoding="utf-8"?>
+<p:sld xmlns:a="http://schemas.openxmlformats.org/drawingml/2006/main" xmlns:r="http://schemas.openxmlformats.org/officeDocument/2006/relationships" xmlns:mc="http://schemas.openxmlformats.org/markup-compatibility/2006" xmlns:mv="urn:schemas-microsoft-com:mac:vml" xmlns:p="http://schemas.openxmlformats.org/presentationml/2006/main" xmlns:c="http://schemas.openxmlformats.org/drawingml/2006/chart" xmlns:dgm="http://schemas.openxmlformats.org/drawingml/2006/diagram" xmlns:o="urn:schemas-microsoft-com:office:office" xmlns:v="urn:schemas-microsoft-com:vml" xmlns:pvml="urn:schemas-microsoft-com:office:powerpoint" xmlns:com="http://schemas.openxmlformats.org/drawingml/2006/compatibility" xmlns:p14="http://schemas.microsoft.com/office/powerpoint/2010/main">
+  <p:cSld>
+    <p:spTree>
+      <p:nvGrpSpPr>
+        <p:cNvPr id="141" name="Shape 141"/>
+        <p:cNvGrpSpPr/>
+        <p:nvPr/>
+      </p:nvGrpSpPr>
+      <p:grpSpPr>
+        <a:xfrm>
+          <a:off x="0" y="0"/>
+          <a:ext cx="0" cy="0"/>
+          <a:chOff x="0" y="0"/>
+          <a:chExt cx="0" cy="0"/>
+        </a:xfrm>
+      </p:grpSpPr>
+      <p:sp>
+        <p:nvSpPr>
+          <p:cNvPr id="142" name="Shape 142"/>
+          <p:cNvSpPr txBox="1"/>
+          <p:nvPr>
+            <p:ph type="title"/>
+          </p:nvPr>
+        </p:nvSpPr>
+        <p:spPr>
+          <a:xfrm>
+            <a:off x="461825" y="757370"/>
+            <a:ext cx="8225099" cy="629700"/>
+          </a:xfrm>
+          <a:prstGeom prst="rect">
+            <a:avLst/>
+          </a:prstGeom>
+        </p:spPr>
+        <p:txBody>
+          <a:bodyPr anchorCtr="0" anchor="t" bIns="91425" lIns="91425" rIns="91425" tIns="91425">
+            <a:noAutofit/>
+          </a:bodyPr>
+          <a:lstStyle/>
+          <a:p>
+            <a:pPr lvl="0" rtl="0">
+              <a:lnSpc>
+                <a:spcPct val="150000"/>
+              </a:lnSpc>
+              <a:spcBef>
+                <a:spcPts val="0"/>
+              </a:spcBef>
+              <a:buNone/>
+            </a:pPr>
+            <a:r>
+              <a:rPr b="1" lang="en-GB" sz="3400">
+                <a:latin typeface="Helvetica Neue"/>
+                <a:ea typeface="Helvetica Neue"/>
+                <a:cs typeface="Helvetica Neue"/>
+                <a:sym typeface="Helvetica Neue"/>
+              </a:rPr>
+              <a:t>Chain of responsibility - Tic tac toe 2/4</a:t>
+            </a:r>
+          </a:p>
+        </p:txBody>
+      </p:sp>
+      <p:sp>
+        <p:nvSpPr>
+          <p:cNvPr id="143" name="Shape 143"/>
+          <p:cNvSpPr txBox="1"/>
+          <p:nvPr>
+            <p:ph idx="1" type="body"/>
+          </p:nvPr>
+        </p:nvSpPr>
+        <p:spPr>
+          <a:xfrm>
+            <a:off x="461825" y="1387075"/>
+            <a:ext cx="8183399" cy="4816199"/>
+          </a:xfrm>
+          <a:prstGeom prst="rect">
+            <a:avLst/>
+          </a:prstGeom>
+        </p:spPr>
+        <p:txBody>
+          <a:bodyPr anchorCtr="0" anchor="t" bIns="91425" lIns="91425" rIns="91425" tIns="91425">
+            <a:noAutofit/>
+          </a:bodyPr>
+          <a:lstStyle/>
+          <a:p>
+            <a:pPr lvl="0" rtl="0">
+              <a:lnSpc>
+                <a:spcPct val="150000"/>
+              </a:lnSpc>
+              <a:spcBef>
+                <a:spcPts val="0"/>
+              </a:spcBef>
+              <a:buNone/>
+            </a:pPr>
+            <a:r>
+              <a:rPr lang="en-GB" sz="2400">
+                <a:latin typeface="Helvetica Neue"/>
+                <a:ea typeface="Helvetica Neue"/>
+                <a:cs typeface="Helvetica Neue"/>
+                <a:sym typeface="Helvetica Neue"/>
+              </a:rPr>
+              <a:t>befor:</a:t>
+            </a:r>
+          </a:p>
+          <a:p>
+            <a:pPr rtl="0">
+              <a:lnSpc>
+                <a:spcPct val="100000"/>
+              </a:lnSpc>
+              <a:spcBef>
+                <a:spcPts val="0"/>
+              </a:spcBef>
+              <a:buNone/>
+            </a:pPr>
+            <a:r>
+              <a:rPr lang="en-GB" sz="1800">
+                <a:latin typeface="Courier New"/>
+                <a:ea typeface="Courier New"/>
+                <a:cs typeface="Courier New"/>
+                <a:sym typeface="Courier New"/>
+              </a:rPr>
+              <a:t>function checkRows() {</a:t>
+            </a:r>
+          </a:p>
+          <a:p>
+            <a:pPr rtl="0">
+              <a:lnSpc>
+                <a:spcPct val="100000"/>
+              </a:lnSpc>
+              <a:spcBef>
+                <a:spcPts val="0"/>
+              </a:spcBef>
+              <a:buNone/>
+            </a:pPr>
+            <a:r>
+              <a:rPr lang="en-GB" sz="1800">
+                <a:latin typeface="Courier New"/>
+                <a:ea typeface="Courier New"/>
+                <a:cs typeface="Courier New"/>
+                <a:sym typeface="Courier New"/>
+              </a:rPr>
+              <a:t>	for (i = 0; i &lt; board.length; i++) {</a:t>
+            </a:r>
+          </a:p>
+          <a:p>
+            <a:pPr rtl="0">
+              <a:lnSpc>
+                <a:spcPct val="100000"/>
+              </a:lnSpc>
+              <a:spcBef>
+                <a:spcPts val="0"/>
+              </a:spcBef>
+              <a:buNone/>
+            </a:pPr>
+            <a:r>
+              <a:rPr lang="en-GB" sz="1800">
+                <a:latin typeface="Courier New"/>
+                <a:ea typeface="Courier New"/>
+                <a:cs typeface="Courier New"/>
+                <a:sym typeface="Courier New"/>
+              </a:rPr>
+              <a:t>		var same = true;</a:t>
+            </a:r>
+          </a:p>
+          <a:p>
+            <a:pPr rtl="0">
+              <a:lnSpc>
+                <a:spcPct val="100000"/>
+              </a:lnSpc>
+              <a:spcBef>
+                <a:spcPts val="0"/>
+              </a:spcBef>
+              <a:buNone/>
+            </a:pPr>
+            <a:r>
+              <a:rPr lang="en-GB" sz="1800">
+                <a:latin typeface="Courier New"/>
+                <a:ea typeface="Courier New"/>
+                <a:cs typeface="Courier New"/>
+                <a:sym typeface="Courier New"/>
+              </a:rPr>
+              <a:t>		for (j = 0; j &lt; board[i].length; j++) {</a:t>
+            </a:r>
+          </a:p>
+          <a:p>
+            <a:pPr rtl="0">
+              <a:lnSpc>
+                <a:spcPct val="100000"/>
+              </a:lnSpc>
+              <a:spcBef>
+                <a:spcPts val="0"/>
+              </a:spcBef>
+              <a:buNone/>
+            </a:pPr>
+            <a:r>
+              <a:rPr lang="en-GB" sz="1800">
+                <a:latin typeface="Courier New"/>
+                <a:ea typeface="Courier New"/>
+                <a:cs typeface="Courier New"/>
+                <a:sym typeface="Courier New"/>
+              </a:rPr>
+              <a:t>			if (board[i][j] === 0 || board[i][j] !== board[i][0]) {</a:t>
+            </a:r>
+          </a:p>
+          <a:p>
+            <a:pPr rtl="0">
+              <a:lnSpc>
+                <a:spcPct val="100000"/>
+              </a:lnSpc>
+              <a:spcBef>
+                <a:spcPts val="0"/>
+              </a:spcBef>
+              <a:buNone/>
+            </a:pPr>
+            <a:r>
+              <a:rPr lang="en-GB" sz="1800">
+                <a:latin typeface="Courier New"/>
+                <a:ea typeface="Courier New"/>
+                <a:cs typeface="Courier New"/>
+                <a:sym typeface="Courier New"/>
+              </a:rPr>
+              <a:t>				same = false;</a:t>
+            </a:r>
+          </a:p>
+          <a:p>
+            <a:pPr rtl="0">
+              <a:lnSpc>
+                <a:spcPct val="100000"/>
+              </a:lnSpc>
+              <a:spcBef>
+                <a:spcPts val="0"/>
+              </a:spcBef>
+              <a:buNone/>
+            </a:pPr>
+            <a:r>
+              <a:rPr lang="en-GB" sz="1800">
+                <a:latin typeface="Courier New"/>
+                <a:ea typeface="Courier New"/>
+                <a:cs typeface="Courier New"/>
+                <a:sym typeface="Courier New"/>
+              </a:rPr>
+              <a:t>			}</a:t>
+            </a:r>
+          </a:p>
+          <a:p>
+            <a:pPr rtl="0">
+              <a:lnSpc>
+                <a:spcPct val="100000"/>
+              </a:lnSpc>
+              <a:spcBef>
+                <a:spcPts val="0"/>
+              </a:spcBef>
+              <a:buNone/>
+            </a:pPr>
+            <a:r>
+              <a:rPr lang="en-GB" sz="1800">
+                <a:latin typeface="Courier New"/>
+                <a:ea typeface="Courier New"/>
+                <a:cs typeface="Courier New"/>
+                <a:sym typeface="Courier New"/>
+              </a:rPr>
+              <a:t>		}</a:t>
+            </a:r>
+          </a:p>
+          <a:p>
+            <a:pPr rtl="0">
+              <a:lnSpc>
+                <a:spcPct val="100000"/>
+              </a:lnSpc>
+              <a:spcBef>
+                <a:spcPts val="0"/>
+              </a:spcBef>
+              <a:buNone/>
+            </a:pPr>
+            <a:r>
+              <a:rPr lang="en-GB" sz="1800">
+                <a:latin typeface="Courier New"/>
+                <a:ea typeface="Courier New"/>
+                <a:cs typeface="Courier New"/>
+                <a:sym typeface="Courier New"/>
+              </a:rPr>
+              <a:t>		if (same) {</a:t>
+            </a:r>
+          </a:p>
+          <a:p>
+            <a:pPr rtl="0">
+              <a:lnSpc>
+                <a:spcPct val="100000"/>
+              </a:lnSpc>
+              <a:spcBef>
+                <a:spcPts val="0"/>
+              </a:spcBef>
+              <a:buNone/>
+            </a:pPr>
+            <a:r>
+              <a:rPr lang="en-GB" sz="1800">
+                <a:latin typeface="Courier New"/>
+                <a:ea typeface="Courier New"/>
+                <a:cs typeface="Courier New"/>
+                <a:sym typeface="Courier New"/>
+              </a:rPr>
+              <a:t>			return same;</a:t>
+            </a:r>
+          </a:p>
+          <a:p>
+            <a:pPr rtl="0">
+              <a:lnSpc>
+                <a:spcPct val="100000"/>
+              </a:lnSpc>
+              <a:spcBef>
+                <a:spcPts val="0"/>
+              </a:spcBef>
+              <a:buNone/>
+            </a:pPr>
+            <a:r>
+              <a:rPr lang="en-GB" sz="1800">
+                <a:latin typeface="Courier New"/>
+                <a:ea typeface="Courier New"/>
+                <a:cs typeface="Courier New"/>
+                <a:sym typeface="Courier New"/>
+              </a:rPr>
+              <a:t>		}</a:t>
+            </a:r>
+          </a:p>
+          <a:p>
+            <a:pPr rtl="0">
+              <a:lnSpc>
+                <a:spcPct val="100000"/>
+              </a:lnSpc>
+              <a:spcBef>
+                <a:spcPts val="0"/>
+              </a:spcBef>
+              <a:buNone/>
+            </a:pPr>
+            <a:r>
+              <a:rPr lang="en-GB" sz="1800">
+                <a:latin typeface="Courier New"/>
+                <a:ea typeface="Courier New"/>
+                <a:cs typeface="Courier New"/>
+                <a:sym typeface="Courier New"/>
+              </a:rPr>
+              <a:t>	}</a:t>
+            </a:r>
+          </a:p>
+          <a:p>
+            <a:pPr rtl="0">
+              <a:lnSpc>
+                <a:spcPct val="100000"/>
+              </a:lnSpc>
+              <a:spcBef>
+                <a:spcPts val="0"/>
+              </a:spcBef>
+              <a:buNone/>
+            </a:pPr>
+            <a:r>
+              <a:rPr lang="en-GB" sz="1800">
+                <a:latin typeface="Courier New"/>
+                <a:ea typeface="Courier New"/>
+                <a:cs typeface="Courier New"/>
+                <a:sym typeface="Courier New"/>
+              </a:rPr>
+              <a:t>}</a:t>
+            </a:r>
+          </a:p>
+          <a:p>
+            <a:pPr lvl="0" rtl="0">
+              <a:lnSpc>
+                <a:spcPct val="100000"/>
+              </a:lnSpc>
+              <a:spcBef>
+                <a:spcPts val="0"/>
+              </a:spcBef>
+              <a:buNone/>
+            </a:pPr>
+            <a:r>
+              <a:t/>
+            </a:r>
+            <a:endParaRPr sz="1800">
+              <a:latin typeface="Courier New"/>
+              <a:ea typeface="Courier New"/>
+              <a:cs typeface="Courier New"/>
+              <a:sym typeface="Courier New"/>
+            </a:endParaRPr>
+          </a:p>
+          <a:p>
+            <a:pPr lvl="0" rtl="0">
+              <a:lnSpc>
+                <a:spcPct val="100000"/>
+              </a:lnSpc>
+              <a:spcBef>
+                <a:spcPts val="0"/>
+              </a:spcBef>
+              <a:buNone/>
+            </a:pPr>
+            <a:r>
+              <a:t/>
+            </a:r>
+            <a:endParaRPr sz="1800">
+              <a:latin typeface="Courier New"/>
+              <a:ea typeface="Courier New"/>
+              <a:cs typeface="Courier New"/>
+              <a:sym typeface="Courier New"/>
+            </a:endParaRPr>
+          </a:p>
+        </p:txBody>
+      </p:sp>
+      <p:sp>
+        <p:nvSpPr>
+          <p:cNvPr id="144" name="Shape 144"/>
+          <p:cNvSpPr txBox="1"/>
+          <p:nvPr/>
+        </p:nvSpPr>
+        <p:spPr>
+          <a:xfrm>
+            <a:off x="461825" y="6092700"/>
+            <a:ext cx="8225099" cy="629700"/>
+          </a:xfrm>
+          <a:prstGeom prst="rect">
+            <a:avLst/>
+          </a:prstGeom>
+          <a:noFill/>
+          <a:ln>
+            <a:noFill/>
+          </a:ln>
+        </p:spPr>
+        <p:txBody>
+          <a:bodyPr anchorCtr="0" anchor="t" bIns="91425" lIns="91425" rIns="91425" tIns="91425">
+            <a:noAutofit/>
+          </a:bodyPr>
+          <a:lstStyle/>
+          <a:p>
+            <a:pPr lvl="0" rtl="0" algn="ctr">
+              <a:lnSpc>
+                <a:spcPct val="115000"/>
+              </a:lnSpc>
+              <a:spcBef>
+                <a:spcPts val="2400"/>
+              </a:spcBef>
+              <a:spcAft>
+                <a:spcPts val="600"/>
+              </a:spcAft>
+              <a:buNone/>
+            </a:pPr>
+            <a:r>
+              <a:rPr lang="en-GB">
+                <a:solidFill>
+                  <a:srgbClr val="A0A0A0"/>
+                </a:solidFill>
+                <a:latin typeface="Helvetica Neue"/>
+                <a:ea typeface="Helvetica Neue"/>
+                <a:cs typeface="Helvetica Neue"/>
+                <a:sym typeface="Helvetica Neue"/>
+              </a:rPr>
+              <a:t>Patterns and Anti Patterns - Behavioral Patterns - Malte Brockmann, Jun Heui Cho - WS 2015</a:t>
+            </a:r>
+          </a:p>
+        </p:txBody>
+      </p:sp>
+    </p:spTree>
+  </p:cSld>
+  <p:clrMapOvr>
+    <a:masterClrMapping/>
+  </p:clrMapOvr>
+  <p:transition spd="slow">
+    <p:cut/>
+  </p:transition>
+</p:sld>
+</file>
+
+<file path=ppt/slides/slide19.xml><?xml version="1.0" encoding="utf-8"?>
+<p:sld xmlns:a="http://schemas.openxmlformats.org/drawingml/2006/main" xmlns:r="http://schemas.openxmlformats.org/officeDocument/2006/relationships" xmlns:mc="http://schemas.openxmlformats.org/markup-compatibility/2006" xmlns:mv="urn:schemas-microsoft-com:mac:vml" xmlns:p="http://schemas.openxmlformats.org/presentationml/2006/main" xmlns:c="http://schemas.openxmlformats.org/drawingml/2006/chart" xmlns:dgm="http://schemas.openxmlformats.org/drawingml/2006/diagram" xmlns:o="urn:schemas-microsoft-com:office:office" xmlns:v="urn:schemas-microsoft-com:vml" xmlns:pvml="urn:schemas-microsoft-com:office:powerpoint" xmlns:com="http://schemas.openxmlformats.org/drawingml/2006/compatibility" xmlns:p14="http://schemas.microsoft.com/office/powerpoint/2010/main">
+  <p:cSld>
+    <p:spTree>
+      <p:nvGrpSpPr>
+        <p:cNvPr id="148" name="Shape 148"/>
+        <p:cNvGrpSpPr/>
+        <p:nvPr/>
+      </p:nvGrpSpPr>
+      <p:grpSpPr>
+        <a:xfrm>
+          <a:off x="0" y="0"/>
+          <a:ext cx="0" cy="0"/>
+          <a:chOff x="0" y="0"/>
+          <a:chExt cx="0" cy="0"/>
+        </a:xfrm>
+      </p:grpSpPr>
+      <p:sp>
+        <p:nvSpPr>
+          <p:cNvPr id="149" name="Shape 149"/>
+          <p:cNvSpPr txBox="1"/>
+          <p:nvPr>
+            <p:ph type="title"/>
+          </p:nvPr>
+        </p:nvSpPr>
+        <p:spPr>
+          <a:xfrm>
+            <a:off x="461825" y="757370"/>
+            <a:ext cx="8225099" cy="629700"/>
+          </a:xfrm>
+          <a:prstGeom prst="rect">
+            <a:avLst/>
+          </a:prstGeom>
+        </p:spPr>
+        <p:txBody>
+          <a:bodyPr anchorCtr="0" anchor="t" bIns="91425" lIns="91425" rIns="91425" tIns="91425">
+            <a:noAutofit/>
+          </a:bodyPr>
+          <a:lstStyle/>
+          <a:p>
+            <a:pPr lvl="0" rtl="0">
+              <a:lnSpc>
+                <a:spcPct val="150000"/>
+              </a:lnSpc>
+              <a:spcBef>
+                <a:spcPts val="0"/>
+              </a:spcBef>
+              <a:buNone/>
+            </a:pPr>
+            <a:r>
+              <a:rPr b="1" lang="en-GB" sz="3400">
+                <a:latin typeface="Helvetica Neue"/>
+                <a:ea typeface="Helvetica Neue"/>
+                <a:cs typeface="Helvetica Neue"/>
+                <a:sym typeface="Helvetica Neue"/>
+              </a:rPr>
+              <a:t>Chain of responsibility - Tic tac toe 3/4</a:t>
+            </a:r>
+          </a:p>
+        </p:txBody>
+      </p:sp>
+      <p:sp>
+        <p:nvSpPr>
+          <p:cNvPr id="150" name="Shape 150"/>
+          <p:cNvSpPr txBox="1"/>
+          <p:nvPr>
+            <p:ph idx="1" type="body"/>
+          </p:nvPr>
+        </p:nvSpPr>
+        <p:spPr>
+          <a:xfrm>
+            <a:off x="461825" y="1387075"/>
+            <a:ext cx="8183399" cy="4816199"/>
+          </a:xfrm>
+          <a:prstGeom prst="rect">
+            <a:avLst/>
+          </a:prstGeom>
+        </p:spPr>
+        <p:txBody>
+          <a:bodyPr anchorCtr="0" anchor="t" bIns="91425" lIns="91425" rIns="91425" tIns="91425">
+            <a:noAutofit/>
+          </a:bodyPr>
+          <a:lstStyle/>
+          <a:p>
+            <a:pPr rtl="0">
+              <a:lnSpc>
+                <a:spcPct val="150000"/>
+              </a:lnSpc>
+              <a:spcBef>
+                <a:spcPts val="0"/>
+              </a:spcBef>
+              <a:buNone/>
+            </a:pPr>
+            <a:r>
+              <a:rPr lang="en-GB" sz="2400">
+                <a:latin typeface="Helvetica Neue"/>
+                <a:ea typeface="Helvetica Neue"/>
+                <a:cs typeface="Helvetica Neue"/>
+                <a:sym typeface="Helvetica Neue"/>
+              </a:rPr>
+              <a:t>after:</a:t>
+            </a:r>
+          </a:p>
+          <a:p>
+            <a:pPr rtl="0">
+              <a:lnSpc>
+                <a:spcPct val="100000"/>
+              </a:lnSpc>
+              <a:spcBef>
+                <a:spcPts val="0"/>
+              </a:spcBef>
+              <a:buNone/>
+            </a:pPr>
+            <a:r>
+              <a:rPr lang="en-GB" sz="1800">
+                <a:latin typeface="Courier New"/>
+                <a:ea typeface="Courier New"/>
+                <a:cs typeface="Courier New"/>
+                <a:sym typeface="Courier New"/>
+              </a:rPr>
+              <a:t>function checkWinner() {</a:t>
+            </a:r>
+          </a:p>
+          <a:p>
+            <a:pPr rtl="0">
+              <a:lnSpc>
+                <a:spcPct val="100000"/>
+              </a:lnSpc>
+              <a:spcBef>
+                <a:spcPts val="0"/>
+              </a:spcBef>
+              <a:buNone/>
+            </a:pPr>
+            <a:r>
+              <a:rPr lang="en-GB" sz="1800">
+                <a:latin typeface="Courier New"/>
+                <a:ea typeface="Courier New"/>
+                <a:cs typeface="Courier New"/>
+                <a:sym typeface="Courier New"/>
+              </a:rPr>
+              <a:t>	</a:t>
+            </a:r>
+            <a:r>
+              <a:rPr lang="en-GB" sz="1800">
+                <a:latin typeface="Courier New"/>
+                <a:ea typeface="Courier New"/>
+                <a:cs typeface="Courier New"/>
+                <a:sym typeface="Courier New"/>
+              </a:rPr>
+              <a:t>checkRows();</a:t>
+            </a:r>
+          </a:p>
+          <a:p>
+            <a:pPr rtl="0">
+              <a:lnSpc>
+                <a:spcPct val="100000"/>
+              </a:lnSpc>
+              <a:spcBef>
+                <a:spcPts val="0"/>
+              </a:spcBef>
+              <a:buNone/>
+            </a:pPr>
+            <a:r>
+              <a:rPr lang="en-GB" sz="1800">
+                <a:latin typeface="Courier New"/>
+                <a:ea typeface="Courier New"/>
+                <a:cs typeface="Courier New"/>
+                <a:sym typeface="Courier New"/>
+              </a:rPr>
+              <a:t>	</a:t>
+            </a:r>
+          </a:p>
+          <a:p>
+            <a:pPr rtl="0">
+              <a:lnSpc>
+                <a:spcPct val="100000"/>
+              </a:lnSpc>
+              <a:spcBef>
+                <a:spcPts val="0"/>
+              </a:spcBef>
+              <a:buNone/>
+            </a:pPr>
+            <a:r>
+              <a:rPr lang="en-GB" sz="1800">
+                <a:latin typeface="Courier New"/>
+                <a:ea typeface="Courier New"/>
+                <a:cs typeface="Courier New"/>
+                <a:sym typeface="Courier New"/>
+              </a:rPr>
+              <a:t>}</a:t>
+            </a:r>
+          </a:p>
+          <a:p>
+            <a:pPr lvl="0" rtl="0">
+              <a:lnSpc>
+                <a:spcPct val="100000"/>
+              </a:lnSpc>
+              <a:spcBef>
+                <a:spcPts val="0"/>
+              </a:spcBef>
+              <a:buNone/>
+            </a:pPr>
+            <a:r>
+              <a:t/>
+            </a:r>
+            <a:endParaRPr sz="1800">
+              <a:latin typeface="Courier New"/>
+              <a:ea typeface="Courier New"/>
+              <a:cs typeface="Courier New"/>
+              <a:sym typeface="Courier New"/>
+            </a:endParaRPr>
+          </a:p>
+          <a:p>
+            <a:pPr lvl="0" rtl="0">
+              <a:lnSpc>
+                <a:spcPct val="100000"/>
+              </a:lnSpc>
+              <a:spcBef>
+                <a:spcPts val="0"/>
+              </a:spcBef>
+              <a:buNone/>
+            </a:pPr>
+            <a:r>
+              <a:t/>
+            </a:r>
+            <a:endParaRPr sz="1800">
+              <a:latin typeface="Courier New"/>
+              <a:ea typeface="Courier New"/>
+              <a:cs typeface="Courier New"/>
+              <a:sym typeface="Courier New"/>
+            </a:endParaRPr>
+          </a:p>
+          <a:p>
+            <a:pPr lvl="0" rtl="0">
+              <a:lnSpc>
+                <a:spcPct val="100000"/>
+              </a:lnSpc>
+              <a:spcBef>
+                <a:spcPts val="0"/>
+              </a:spcBef>
+              <a:buNone/>
+            </a:pPr>
+            <a:r>
+              <a:t/>
+            </a:r>
+            <a:endParaRPr sz="1800">
+              <a:latin typeface="Courier New"/>
+              <a:ea typeface="Courier New"/>
+              <a:cs typeface="Courier New"/>
+              <a:sym typeface="Courier New"/>
+            </a:endParaRPr>
+          </a:p>
+        </p:txBody>
+      </p:sp>
+      <p:sp>
+        <p:nvSpPr>
+          <p:cNvPr id="151" name="Shape 151"/>
           <p:cNvSpPr txBox="1"/>
           <p:nvPr/>
         </p:nvSpPr>
@@ -7548,6 +9732,871 @@
           <a:lstStyle/>
           <a:p>
             <a:pPr rtl="0" algn="ctr">
+              <a:lnSpc>
+                <a:spcPct val="115000"/>
+              </a:lnSpc>
+              <a:spcBef>
+                <a:spcPts val="2400"/>
+              </a:spcBef>
+              <a:spcAft>
+                <a:spcPts val="600"/>
+              </a:spcAft>
+              <a:buNone/>
+            </a:pPr>
+            <a:r>
+              <a:rPr lang="en-GB">
+                <a:solidFill>
+                  <a:srgbClr val="A0A0A0"/>
+                </a:solidFill>
+                <a:latin typeface="Helvetica Neue"/>
+                <a:ea typeface="Helvetica Neue"/>
+                <a:cs typeface="Helvetica Neue"/>
+                <a:sym typeface="Helvetica Neue"/>
+              </a:rPr>
+              <a:t>Patterns and Anti Patterns - Behavioral Patterns - Malte Brockmann, Jun Heui Cho - WS 2015</a:t>
+            </a:r>
+          </a:p>
+        </p:txBody>
+      </p:sp>
+    </p:spTree>
+  </p:cSld>
+  <p:clrMapOvr>
+    <a:masterClrMapping/>
+  </p:clrMapOvr>
+  <p:transition spd="slow">
+    <p:cut/>
+  </p:transition>
+</p:sld>
+</file>
+
+<file path=ppt/slides/slide20.xml><?xml version="1.0" encoding="utf-8"?>
+<p:sld xmlns:a="http://schemas.openxmlformats.org/drawingml/2006/main" xmlns:r="http://schemas.openxmlformats.org/officeDocument/2006/relationships" xmlns:mc="http://schemas.openxmlformats.org/markup-compatibility/2006" xmlns:mv="urn:schemas-microsoft-com:mac:vml" xmlns:p="http://schemas.openxmlformats.org/presentationml/2006/main" xmlns:c="http://schemas.openxmlformats.org/drawingml/2006/chart" xmlns:dgm="http://schemas.openxmlformats.org/drawingml/2006/diagram" xmlns:o="urn:schemas-microsoft-com:office:office" xmlns:v="urn:schemas-microsoft-com:vml" xmlns:pvml="urn:schemas-microsoft-com:office:powerpoint" xmlns:com="http://schemas.openxmlformats.org/drawingml/2006/compatibility" xmlns:p14="http://schemas.microsoft.com/office/powerpoint/2010/main">
+  <p:cSld>
+    <p:spTree>
+      <p:nvGrpSpPr>
+        <p:cNvPr id="155" name="Shape 155"/>
+        <p:cNvGrpSpPr/>
+        <p:nvPr/>
+      </p:nvGrpSpPr>
+      <p:grpSpPr>
+        <a:xfrm>
+          <a:off x="0" y="0"/>
+          <a:ext cx="0" cy="0"/>
+          <a:chOff x="0" y="0"/>
+          <a:chExt cx="0" cy="0"/>
+        </a:xfrm>
+      </p:grpSpPr>
+      <p:sp>
+        <p:nvSpPr>
+          <p:cNvPr id="156" name="Shape 156"/>
+          <p:cNvSpPr txBox="1"/>
+          <p:nvPr>
+            <p:ph type="title"/>
+          </p:nvPr>
+        </p:nvSpPr>
+        <p:spPr>
+          <a:xfrm>
+            <a:off x="461825" y="757370"/>
+            <a:ext cx="8225099" cy="629700"/>
+          </a:xfrm>
+          <a:prstGeom prst="rect">
+            <a:avLst/>
+          </a:prstGeom>
+        </p:spPr>
+        <p:txBody>
+          <a:bodyPr anchorCtr="0" anchor="t" bIns="91425" lIns="91425" rIns="91425" tIns="91425">
+            <a:noAutofit/>
+          </a:bodyPr>
+          <a:lstStyle/>
+          <a:p>
+            <a:pPr lvl="0" rtl="0">
+              <a:lnSpc>
+                <a:spcPct val="150000"/>
+              </a:lnSpc>
+              <a:spcBef>
+                <a:spcPts val="0"/>
+              </a:spcBef>
+              <a:buNone/>
+            </a:pPr>
+            <a:r>
+              <a:rPr b="1" lang="en-GB" sz="3400">
+                <a:latin typeface="Helvetica Neue"/>
+                <a:ea typeface="Helvetica Neue"/>
+                <a:cs typeface="Helvetica Neue"/>
+                <a:sym typeface="Helvetica Neue"/>
+              </a:rPr>
+              <a:t>Chain of responsibility - Tic tac toe 4/4</a:t>
+            </a:r>
+          </a:p>
+        </p:txBody>
+      </p:sp>
+      <p:sp>
+        <p:nvSpPr>
+          <p:cNvPr id="157" name="Shape 157"/>
+          <p:cNvSpPr txBox="1"/>
+          <p:nvPr>
+            <p:ph idx="1" type="body"/>
+          </p:nvPr>
+        </p:nvSpPr>
+        <p:spPr>
+          <a:xfrm>
+            <a:off x="461825" y="1387075"/>
+            <a:ext cx="8183399" cy="4816199"/>
+          </a:xfrm>
+          <a:prstGeom prst="rect">
+            <a:avLst/>
+          </a:prstGeom>
+        </p:spPr>
+        <p:txBody>
+          <a:bodyPr anchorCtr="0" anchor="t" bIns="91425" lIns="91425" rIns="91425" tIns="91425">
+            <a:noAutofit/>
+          </a:bodyPr>
+          <a:lstStyle/>
+          <a:p>
+            <a:pPr lvl="0" rtl="0">
+              <a:lnSpc>
+                <a:spcPct val="150000"/>
+              </a:lnSpc>
+              <a:spcBef>
+                <a:spcPts val="0"/>
+              </a:spcBef>
+              <a:buNone/>
+            </a:pPr>
+            <a:r>
+              <a:rPr lang="en-GB" sz="2400">
+                <a:latin typeface="Helvetica Neue"/>
+                <a:ea typeface="Helvetica Neue"/>
+                <a:cs typeface="Helvetica Neue"/>
+                <a:sym typeface="Helvetica Neue"/>
+              </a:rPr>
+              <a:t>after:</a:t>
+            </a:r>
+          </a:p>
+          <a:p>
+            <a:pPr rtl="0">
+              <a:lnSpc>
+                <a:spcPct val="100000"/>
+              </a:lnSpc>
+              <a:spcBef>
+                <a:spcPts val="0"/>
+              </a:spcBef>
+              <a:buNone/>
+            </a:pPr>
+            <a:r>
+              <a:rPr lang="en-GB" sz="1600">
+                <a:latin typeface="Courier New"/>
+                <a:ea typeface="Courier New"/>
+                <a:cs typeface="Courier New"/>
+                <a:sym typeface="Courier New"/>
+              </a:rPr>
+              <a:t>function checkRows() {</a:t>
+            </a:r>
+          </a:p>
+          <a:p>
+            <a:pPr rtl="0">
+              <a:lnSpc>
+                <a:spcPct val="100000"/>
+              </a:lnSpc>
+              <a:spcBef>
+                <a:spcPts val="0"/>
+              </a:spcBef>
+              <a:buNone/>
+            </a:pPr>
+            <a:r>
+              <a:rPr lang="en-GB" sz="1600">
+                <a:latin typeface="Courier New"/>
+                <a:ea typeface="Courier New"/>
+                <a:cs typeface="Courier New"/>
+                <a:sym typeface="Courier New"/>
+              </a:rPr>
+              <a:t>	for (i = 0; i &lt; board.length; i++) {</a:t>
+            </a:r>
+          </a:p>
+          <a:p>
+            <a:pPr rtl="0">
+              <a:lnSpc>
+                <a:spcPct val="100000"/>
+              </a:lnSpc>
+              <a:spcBef>
+                <a:spcPts val="0"/>
+              </a:spcBef>
+              <a:buNone/>
+            </a:pPr>
+            <a:r>
+              <a:rPr lang="en-GB" sz="1600">
+                <a:latin typeface="Courier New"/>
+                <a:ea typeface="Courier New"/>
+                <a:cs typeface="Courier New"/>
+                <a:sym typeface="Courier New"/>
+              </a:rPr>
+              <a:t>		var same = true;</a:t>
+            </a:r>
+          </a:p>
+          <a:p>
+            <a:pPr rtl="0">
+              <a:lnSpc>
+                <a:spcPct val="100000"/>
+              </a:lnSpc>
+              <a:spcBef>
+                <a:spcPts val="0"/>
+              </a:spcBef>
+              <a:buNone/>
+            </a:pPr>
+            <a:r>
+              <a:rPr lang="en-GB" sz="1600">
+                <a:latin typeface="Courier New"/>
+                <a:ea typeface="Courier New"/>
+                <a:cs typeface="Courier New"/>
+                <a:sym typeface="Courier New"/>
+              </a:rPr>
+              <a:t>		for (j = 0; j &lt; board[i].length; j++) {</a:t>
+            </a:r>
+          </a:p>
+          <a:p>
+            <a:pPr rtl="0">
+              <a:lnSpc>
+                <a:spcPct val="100000"/>
+              </a:lnSpc>
+              <a:spcBef>
+                <a:spcPts val="0"/>
+              </a:spcBef>
+              <a:buNone/>
+            </a:pPr>
+            <a:r>
+              <a:rPr lang="en-GB" sz="1600">
+                <a:latin typeface="Courier New"/>
+                <a:ea typeface="Courier New"/>
+                <a:cs typeface="Courier New"/>
+                <a:sym typeface="Courier New"/>
+              </a:rPr>
+              <a:t>			if (board[i][j] === 0 || board[i][j] !== board[i][0]) {</a:t>
+            </a:r>
+          </a:p>
+          <a:p>
+            <a:pPr rtl="0">
+              <a:lnSpc>
+                <a:spcPct val="100000"/>
+              </a:lnSpc>
+              <a:spcBef>
+                <a:spcPts val="0"/>
+              </a:spcBef>
+              <a:buNone/>
+            </a:pPr>
+            <a:r>
+              <a:rPr lang="en-GB" sz="1600">
+                <a:latin typeface="Courier New"/>
+                <a:ea typeface="Courier New"/>
+                <a:cs typeface="Courier New"/>
+                <a:sym typeface="Courier New"/>
+              </a:rPr>
+              <a:t>				same = false;</a:t>
+            </a:r>
+          </a:p>
+          <a:p>
+            <a:pPr rtl="0">
+              <a:lnSpc>
+                <a:spcPct val="100000"/>
+              </a:lnSpc>
+              <a:spcBef>
+                <a:spcPts val="0"/>
+              </a:spcBef>
+              <a:buNone/>
+            </a:pPr>
+            <a:r>
+              <a:rPr lang="en-GB" sz="1600">
+                <a:latin typeface="Courier New"/>
+                <a:ea typeface="Courier New"/>
+                <a:cs typeface="Courier New"/>
+                <a:sym typeface="Courier New"/>
+              </a:rPr>
+              <a:t>			}</a:t>
+            </a:r>
+          </a:p>
+          <a:p>
+            <a:pPr rtl="0">
+              <a:lnSpc>
+                <a:spcPct val="100000"/>
+              </a:lnSpc>
+              <a:spcBef>
+                <a:spcPts val="0"/>
+              </a:spcBef>
+              <a:buNone/>
+            </a:pPr>
+            <a:r>
+              <a:rPr lang="en-GB" sz="1600">
+                <a:latin typeface="Courier New"/>
+                <a:ea typeface="Courier New"/>
+                <a:cs typeface="Courier New"/>
+                <a:sym typeface="Courier New"/>
+              </a:rPr>
+              <a:t>		}</a:t>
+            </a:r>
+          </a:p>
+          <a:p>
+            <a:pPr rtl="0">
+              <a:lnSpc>
+                <a:spcPct val="100000"/>
+              </a:lnSpc>
+              <a:spcBef>
+                <a:spcPts val="0"/>
+              </a:spcBef>
+              <a:buNone/>
+            </a:pPr>
+            <a:r>
+              <a:rPr lang="en-GB" sz="1600">
+                <a:latin typeface="Courier New"/>
+                <a:ea typeface="Courier New"/>
+                <a:cs typeface="Courier New"/>
+                <a:sym typeface="Courier New"/>
+              </a:rPr>
+              <a:t>		</a:t>
+            </a:r>
+            <a:r>
+              <a:rPr lang="en-GB" sz="1600">
+                <a:latin typeface="Courier New"/>
+                <a:ea typeface="Courier New"/>
+                <a:cs typeface="Courier New"/>
+                <a:sym typeface="Courier New"/>
+              </a:rPr>
+              <a:t>if (same) {</a:t>
+            </a:r>
+          </a:p>
+          <a:p>
+            <a:pPr rtl="0">
+              <a:lnSpc>
+                <a:spcPct val="100000"/>
+              </a:lnSpc>
+              <a:spcBef>
+                <a:spcPts val="0"/>
+              </a:spcBef>
+              <a:buNone/>
+            </a:pPr>
+            <a:r>
+              <a:rPr lang="en-GB" sz="1600">
+                <a:latin typeface="Courier New"/>
+                <a:ea typeface="Courier New"/>
+                <a:cs typeface="Courier New"/>
+                <a:sym typeface="Courier New"/>
+              </a:rPr>
+              <a:t>			winningPlayer = turn.currentPlayerColor();</a:t>
+            </a:r>
+          </a:p>
+          <a:p>
+            <a:pPr rtl="0">
+              <a:lnSpc>
+                <a:spcPct val="100000"/>
+              </a:lnSpc>
+              <a:spcBef>
+                <a:spcPts val="0"/>
+              </a:spcBef>
+              <a:buNone/>
+            </a:pPr>
+            <a:r>
+              <a:rPr lang="en-GB" sz="1600">
+                <a:latin typeface="Courier New"/>
+                <a:ea typeface="Courier New"/>
+                <a:cs typeface="Courier New"/>
+                <a:sym typeface="Courier New"/>
+              </a:rPr>
+              <a:t>			// Alert winner</a:t>
+            </a:r>
+          </a:p>
+          <a:p>
+            <a:pPr rtl="0">
+              <a:lnSpc>
+                <a:spcPct val="100000"/>
+              </a:lnSpc>
+              <a:spcBef>
+                <a:spcPts val="0"/>
+              </a:spcBef>
+              <a:buNone/>
+            </a:pPr>
+            <a:r>
+              <a:rPr lang="en-GB" sz="1600">
+                <a:latin typeface="Courier New"/>
+                <a:ea typeface="Courier New"/>
+                <a:cs typeface="Courier New"/>
+                <a:sym typeface="Courier New"/>
+              </a:rPr>
+              <a:t>			endGame("Player " + winningPlayer + ", you win!");</a:t>
+            </a:r>
+          </a:p>
+          <a:p>
+            <a:pPr rtl="0">
+              <a:lnSpc>
+                <a:spcPct val="100000"/>
+              </a:lnSpc>
+              <a:spcBef>
+                <a:spcPts val="0"/>
+              </a:spcBef>
+              <a:buNone/>
+            </a:pPr>
+            <a:r>
+              <a:rPr lang="en-GB" sz="1600">
+                <a:latin typeface="Courier New"/>
+                <a:ea typeface="Courier New"/>
+                <a:cs typeface="Courier New"/>
+                <a:sym typeface="Courier New"/>
+              </a:rPr>
+              <a:t>		}</a:t>
+            </a:r>
+          </a:p>
+          <a:p>
+            <a:pPr rtl="0">
+              <a:lnSpc>
+                <a:spcPct val="100000"/>
+              </a:lnSpc>
+              <a:spcBef>
+                <a:spcPts val="0"/>
+              </a:spcBef>
+              <a:buNone/>
+            </a:pPr>
+            <a:r>
+              <a:rPr lang="en-GB" sz="1600">
+                <a:latin typeface="Courier New"/>
+                <a:ea typeface="Courier New"/>
+                <a:cs typeface="Courier New"/>
+                <a:sym typeface="Courier New"/>
+              </a:rPr>
+              <a:t>	}</a:t>
+            </a:r>
+          </a:p>
+          <a:p>
+            <a:pPr rtl="0">
+              <a:lnSpc>
+                <a:spcPct val="100000"/>
+              </a:lnSpc>
+              <a:spcBef>
+                <a:spcPts val="0"/>
+              </a:spcBef>
+              <a:buNone/>
+            </a:pPr>
+            <a:r>
+              <a:rPr lang="en-GB" sz="1600">
+                <a:latin typeface="Courier New"/>
+                <a:ea typeface="Courier New"/>
+                <a:cs typeface="Courier New"/>
+                <a:sym typeface="Courier New"/>
+              </a:rPr>
+              <a:t>	</a:t>
+            </a:r>
+            <a:r>
+              <a:rPr lang="en-GB" sz="1600">
+                <a:latin typeface="Courier New"/>
+                <a:ea typeface="Courier New"/>
+                <a:cs typeface="Courier New"/>
+                <a:sym typeface="Courier New"/>
+              </a:rPr>
+              <a:t>checkCols();</a:t>
+            </a:r>
+          </a:p>
+          <a:p>
+            <a:pPr rtl="0">
+              <a:lnSpc>
+                <a:spcPct val="100000"/>
+              </a:lnSpc>
+              <a:spcBef>
+                <a:spcPts val="0"/>
+              </a:spcBef>
+              <a:buNone/>
+            </a:pPr>
+            <a:r>
+              <a:rPr lang="en-GB" sz="1800">
+                <a:latin typeface="Courier New"/>
+                <a:ea typeface="Courier New"/>
+                <a:cs typeface="Courier New"/>
+                <a:sym typeface="Courier New"/>
+              </a:rPr>
+              <a:t>}</a:t>
+            </a:r>
+          </a:p>
+          <a:p>
+            <a:pPr lvl="0" rtl="0">
+              <a:lnSpc>
+                <a:spcPct val="100000"/>
+              </a:lnSpc>
+              <a:spcBef>
+                <a:spcPts val="0"/>
+              </a:spcBef>
+              <a:buNone/>
+            </a:pPr>
+            <a:r>
+              <a:t/>
+            </a:r>
+            <a:endParaRPr sz="1800">
+              <a:latin typeface="Courier New"/>
+              <a:ea typeface="Courier New"/>
+              <a:cs typeface="Courier New"/>
+              <a:sym typeface="Courier New"/>
+            </a:endParaRPr>
+          </a:p>
+          <a:p>
+            <a:pPr lvl="0" rtl="0">
+              <a:lnSpc>
+                <a:spcPct val="100000"/>
+              </a:lnSpc>
+              <a:spcBef>
+                <a:spcPts val="0"/>
+              </a:spcBef>
+              <a:buNone/>
+            </a:pPr>
+            <a:r>
+              <a:t/>
+            </a:r>
+            <a:endParaRPr sz="1800">
+              <a:latin typeface="Courier New"/>
+              <a:ea typeface="Courier New"/>
+              <a:cs typeface="Courier New"/>
+              <a:sym typeface="Courier New"/>
+            </a:endParaRPr>
+          </a:p>
+          <a:p>
+            <a:pPr lvl="0" rtl="0">
+              <a:lnSpc>
+                <a:spcPct val="100000"/>
+              </a:lnSpc>
+              <a:spcBef>
+                <a:spcPts val="0"/>
+              </a:spcBef>
+              <a:buNone/>
+            </a:pPr>
+            <a:r>
+              <a:t/>
+            </a:r>
+            <a:endParaRPr sz="1800">
+              <a:latin typeface="Courier New"/>
+              <a:ea typeface="Courier New"/>
+              <a:cs typeface="Courier New"/>
+              <a:sym typeface="Courier New"/>
+            </a:endParaRPr>
+          </a:p>
+          <a:p>
+            <a:pPr lvl="0" rtl="0">
+              <a:lnSpc>
+                <a:spcPct val="100000"/>
+              </a:lnSpc>
+              <a:spcBef>
+                <a:spcPts val="0"/>
+              </a:spcBef>
+              <a:buNone/>
+            </a:pPr>
+            <a:r>
+              <a:t/>
+            </a:r>
+            <a:endParaRPr sz="1800">
+              <a:latin typeface="Courier New"/>
+              <a:ea typeface="Courier New"/>
+              <a:cs typeface="Courier New"/>
+              <a:sym typeface="Courier New"/>
+            </a:endParaRPr>
+          </a:p>
+        </p:txBody>
+      </p:sp>
+      <p:sp>
+        <p:nvSpPr>
+          <p:cNvPr id="158" name="Shape 158"/>
+          <p:cNvSpPr txBox="1"/>
+          <p:nvPr/>
+        </p:nvSpPr>
+        <p:spPr>
+          <a:xfrm>
+            <a:off x="461825" y="6092700"/>
+            <a:ext cx="8225099" cy="629700"/>
+          </a:xfrm>
+          <a:prstGeom prst="rect">
+            <a:avLst/>
+          </a:prstGeom>
+          <a:noFill/>
+          <a:ln>
+            <a:noFill/>
+          </a:ln>
+        </p:spPr>
+        <p:txBody>
+          <a:bodyPr anchorCtr="0" anchor="t" bIns="91425" lIns="91425" rIns="91425" tIns="91425">
+            <a:noAutofit/>
+          </a:bodyPr>
+          <a:lstStyle/>
+          <a:p>
+            <a:pPr lvl="0" rtl="0" algn="ctr">
+              <a:lnSpc>
+                <a:spcPct val="115000"/>
+              </a:lnSpc>
+              <a:spcBef>
+                <a:spcPts val="2400"/>
+              </a:spcBef>
+              <a:spcAft>
+                <a:spcPts val="600"/>
+              </a:spcAft>
+              <a:buNone/>
+            </a:pPr>
+            <a:r>
+              <a:rPr lang="en-GB">
+                <a:solidFill>
+                  <a:srgbClr val="A0A0A0"/>
+                </a:solidFill>
+                <a:latin typeface="Helvetica Neue"/>
+                <a:ea typeface="Helvetica Neue"/>
+                <a:cs typeface="Helvetica Neue"/>
+                <a:sym typeface="Helvetica Neue"/>
+              </a:rPr>
+              <a:t>Patterns and Anti Patterns - Behavioral Patterns - Malte Brockmann, Jun Heui Cho - WS 2015</a:t>
+            </a:r>
+          </a:p>
+        </p:txBody>
+      </p:sp>
+    </p:spTree>
+  </p:cSld>
+  <p:clrMapOvr>
+    <a:masterClrMapping/>
+  </p:clrMapOvr>
+  <p:transition spd="slow">
+    <p:cut/>
+  </p:transition>
+</p:sld>
+</file>
+
+<file path=ppt/slides/slide21.xml><?xml version="1.0" encoding="utf-8"?>
+<p:sld xmlns:a="http://schemas.openxmlformats.org/drawingml/2006/main" xmlns:r="http://schemas.openxmlformats.org/officeDocument/2006/relationships" xmlns:mc="http://schemas.openxmlformats.org/markup-compatibility/2006" xmlns:mv="urn:schemas-microsoft-com:mac:vml" xmlns:p="http://schemas.openxmlformats.org/presentationml/2006/main" xmlns:c="http://schemas.openxmlformats.org/drawingml/2006/chart" xmlns:dgm="http://schemas.openxmlformats.org/drawingml/2006/diagram" xmlns:o="urn:schemas-microsoft-com:office:office" xmlns:v="urn:schemas-microsoft-com:vml" xmlns:pvml="urn:schemas-microsoft-com:office:powerpoint" xmlns:com="http://schemas.openxmlformats.org/drawingml/2006/compatibility" xmlns:p14="http://schemas.microsoft.com/office/powerpoint/2010/main">
+  <p:cSld>
+    <p:spTree>
+      <p:nvGrpSpPr>
+        <p:cNvPr id="162" name="Shape 162"/>
+        <p:cNvGrpSpPr/>
+        <p:nvPr/>
+      </p:nvGrpSpPr>
+      <p:grpSpPr>
+        <a:xfrm>
+          <a:off x="0" y="0"/>
+          <a:ext cx="0" cy="0"/>
+          <a:chOff x="0" y="0"/>
+          <a:chExt cx="0" cy="0"/>
+        </a:xfrm>
+      </p:grpSpPr>
+      <p:sp>
+        <p:nvSpPr>
+          <p:cNvPr id="163" name="Shape 163"/>
+          <p:cNvSpPr txBox="1"/>
+          <p:nvPr>
+            <p:ph type="title"/>
+          </p:nvPr>
+        </p:nvSpPr>
+        <p:spPr>
+          <a:xfrm>
+            <a:off x="461825" y="757370"/>
+            <a:ext cx="8225099" cy="629700"/>
+          </a:xfrm>
+          <a:prstGeom prst="rect">
+            <a:avLst/>
+          </a:prstGeom>
+        </p:spPr>
+        <p:txBody>
+          <a:bodyPr anchorCtr="0" anchor="t" bIns="91425" lIns="91425" rIns="91425" tIns="91425">
+            <a:noAutofit/>
+          </a:bodyPr>
+          <a:lstStyle/>
+          <a:p>
+            <a:pPr rtl="0">
+              <a:lnSpc>
+                <a:spcPct val="150000"/>
+              </a:lnSpc>
+              <a:spcBef>
+                <a:spcPts val="0"/>
+              </a:spcBef>
+              <a:buNone/>
+            </a:pPr>
+            <a:r>
+              <a:rPr b="1" lang="en-GB" sz="3600">
+                <a:latin typeface="Helvetica Neue"/>
+                <a:ea typeface="Helvetica Neue"/>
+                <a:cs typeface="Helvetica Neue"/>
+                <a:sym typeface="Helvetica Neue"/>
+              </a:rPr>
+              <a:t>Sources</a:t>
+            </a:r>
+          </a:p>
+          <a:p>
+            <a:pPr lvl="0" rtl="0">
+              <a:lnSpc>
+                <a:spcPct val="150000"/>
+              </a:lnSpc>
+              <a:spcBef>
+                <a:spcPts val="0"/>
+              </a:spcBef>
+              <a:buNone/>
+            </a:pPr>
+            <a:r>
+              <a:t/>
+            </a:r>
+            <a:endParaRPr b="1" sz="3600">
+              <a:latin typeface="Helvetica Neue"/>
+              <a:ea typeface="Helvetica Neue"/>
+              <a:cs typeface="Helvetica Neue"/>
+              <a:sym typeface="Helvetica Neue"/>
+            </a:endParaRPr>
+          </a:p>
+        </p:txBody>
+      </p:sp>
+      <p:sp>
+        <p:nvSpPr>
+          <p:cNvPr id="164" name="Shape 164"/>
+          <p:cNvSpPr txBox="1"/>
+          <p:nvPr>
+            <p:ph idx="1" type="body"/>
+          </p:nvPr>
+        </p:nvSpPr>
+        <p:spPr>
+          <a:xfrm>
+            <a:off x="471050" y="1427625"/>
+            <a:ext cx="8183399" cy="4816199"/>
+          </a:xfrm>
+          <a:prstGeom prst="rect">
+            <a:avLst/>
+          </a:prstGeom>
+        </p:spPr>
+        <p:txBody>
+          <a:bodyPr anchorCtr="0" anchor="t" bIns="91425" lIns="91425" rIns="91425" tIns="91425">
+            <a:noAutofit/>
+          </a:bodyPr>
+          <a:lstStyle/>
+          <a:p>
+            <a:pPr rtl="0">
+              <a:lnSpc>
+                <a:spcPct val="150000"/>
+              </a:lnSpc>
+              <a:spcBef>
+                <a:spcPts val="0"/>
+              </a:spcBef>
+              <a:buNone/>
+            </a:pPr>
+            <a:r>
+              <a:rPr lang="en-GB" u="sng">
+                <a:solidFill>
+                  <a:schemeClr val="hlink"/>
+                </a:solidFill>
+                <a:hlinkClick r:id="rId3"/>
+              </a:rPr>
+              <a:t>http://www.dofactory.com/javascript/design-patterns</a:t>
+            </a:r>
+          </a:p>
+          <a:p>
+            <a:pPr rtl="0">
+              <a:lnSpc>
+                <a:spcPct val="150000"/>
+              </a:lnSpc>
+              <a:spcBef>
+                <a:spcPts val="0"/>
+              </a:spcBef>
+              <a:buNone/>
+            </a:pPr>
+            <a:r>
+              <a:rPr lang="en-GB" u="sng">
+                <a:solidFill>
+                  <a:schemeClr val="hlink"/>
+                </a:solidFill>
+                <a:hlinkClick r:id="rId4"/>
+              </a:rPr>
+              <a:t>https://sourcemaking.com/design_patterns</a:t>
+            </a:r>
+          </a:p>
+          <a:p>
+            <a:pPr rtl="0">
+              <a:lnSpc>
+                <a:spcPct val="150000"/>
+              </a:lnSpc>
+              <a:spcBef>
+                <a:spcPts val="0"/>
+              </a:spcBef>
+              <a:buNone/>
+            </a:pPr>
+            <a:r>
+              <a:rPr lang="en-GB" u="sng">
+                <a:solidFill>
+                  <a:schemeClr val="hlink"/>
+                </a:solidFill>
+                <a:hlinkClick r:id="rId5"/>
+              </a:rPr>
+              <a:t>https://en.wikipedia.org/wiki/Command_pattern</a:t>
+            </a:r>
+          </a:p>
+          <a:p>
+            <a:pPr rtl="0">
+              <a:lnSpc>
+                <a:spcPct val="150000"/>
+              </a:lnSpc>
+              <a:spcBef>
+                <a:spcPts val="0"/>
+              </a:spcBef>
+              <a:buNone/>
+            </a:pPr>
+            <a:r>
+              <a:rPr lang="en-GB" u="sng">
+                <a:solidFill>
+                  <a:schemeClr val="hlink"/>
+                </a:solidFill>
+                <a:hlinkClick r:id="rId6"/>
+              </a:rPr>
+              <a:t>https://de.wikipedia.org/wiki/Memento_%28Entwurfsmuster%29</a:t>
+            </a:r>
+          </a:p>
+          <a:p>
+            <a:pPr lvl="0" rtl="0">
+              <a:lnSpc>
+                <a:spcPct val="150000"/>
+              </a:lnSpc>
+              <a:spcBef>
+                <a:spcPts val="0"/>
+              </a:spcBef>
+              <a:buNone/>
+            </a:pPr>
+            <a:r>
+              <a:rPr b="1" lang="en-GB"/>
+              <a:t>(Osmani, A. (2012).</a:t>
+            </a:r>
+            <a:r>
+              <a:rPr lang="en-GB"/>
+              <a:t> Learning JavaScript Design Patterns. O'Reilly Media, Inc.)</a:t>
+            </a:r>
+          </a:p>
+          <a:p>
+            <a:pPr lvl="0" rtl="0">
+              <a:spcBef>
+                <a:spcPts val="0"/>
+              </a:spcBef>
+              <a:buNone/>
+            </a:pPr>
+            <a:r>
+              <a:t/>
+            </a:r>
+            <a:endParaRPr sz="2400"/>
+          </a:p>
+        </p:txBody>
+      </p:sp>
+      <p:sp>
+        <p:nvSpPr>
+          <p:cNvPr id="165" name="Shape 165"/>
+          <p:cNvSpPr txBox="1"/>
+          <p:nvPr/>
+        </p:nvSpPr>
+        <p:spPr>
+          <a:xfrm>
+            <a:off x="461825" y="6092700"/>
+            <a:ext cx="8225099" cy="629700"/>
+          </a:xfrm>
+          <a:prstGeom prst="rect">
+            <a:avLst/>
+          </a:prstGeom>
+          <a:noFill/>
+          <a:ln>
+            <a:noFill/>
+          </a:ln>
+        </p:spPr>
+        <p:txBody>
+          <a:bodyPr anchorCtr="0" anchor="t" bIns="91425" lIns="91425" rIns="91425" tIns="91425">
+            <a:noAutofit/>
+          </a:bodyPr>
+          <a:lstStyle/>
+          <a:p>
+            <a:pPr lvl="0" rtl="0" algn="ctr">
               <a:lnSpc>
                 <a:spcPct val="115000"/>
               </a:lnSpc>
@@ -8876,7 +11925,7 @@
                 <a:cs typeface="Helvetica Neue"/>
                 <a:sym typeface="Helvetica Neue"/>
               </a:rPr>
-              <a:t>Command - Spaceinvader before  </a:t>
+              <a:t>Command - Spaceinvader 1/3  </a:t>
             </a:r>
           </a:p>
         </p:txBody>
@@ -9256,7 +12305,7 @@
                 <a:cs typeface="Helvetica Neue"/>
                 <a:sym typeface="Helvetica Neue"/>
               </a:rPr>
-              <a:t>Command - Spaceinvader after 1/2</a:t>
+              <a:t>Command - Spaceinvader 2/3</a:t>
             </a:r>
           </a:p>
         </p:txBody>
@@ -9759,7 +12808,7 @@
                 <a:cs typeface="Helvetica Neue"/>
                 <a:sym typeface="Helvetica Neue"/>
               </a:rPr>
-              <a:t>Command - Spaceinvader after 2/2</a:t>
+              <a:t>Command - Spaceinvader 3/3</a:t>
             </a:r>
           </a:p>
           <a:p>
@@ -9853,7 +12902,7 @@
             </a:r>
           </a:p>
           <a:p>
-            <a:pPr rtl="0">
+            <a:pPr lvl="0" rtl="0">
               <a:spcBef>
                 <a:spcPts val="0"/>
               </a:spcBef>
@@ -10100,285 +13149,6 @@
 </file>
 
 <file path=ppt/theme/theme1.xml><?xml version="1.0" encoding="utf-8"?>
-<a:theme xmlns:a="http://schemas.openxmlformats.org/drawingml/2006/main" xmlns:r="http://schemas.openxmlformats.org/officeDocument/2006/relationships" name="VT_Vorlage_Präsentation_Ma">
-  <a:themeElements>
-    <a:clrScheme name="">
-      <a:dk1>
-        <a:srgbClr val="333333"/>
-      </a:dk1>
-      <a:lt1>
-        <a:srgbClr val="FFFFFF"/>
-      </a:lt1>
-      <a:dk2>
-        <a:srgbClr val="333333"/>
-      </a:dk2>
-      <a:lt2>
-        <a:srgbClr val="808080"/>
-      </a:lt2>
-      <a:accent1>
-        <a:srgbClr val="CCCCCC"/>
-      </a:accent1>
-      <a:accent2>
-        <a:srgbClr val="074FB0"/>
-      </a:accent2>
-      <a:accent3>
-        <a:srgbClr val="FFFFFF"/>
-      </a:accent3>
-      <a:accent4>
-        <a:srgbClr val="2A2A2A"/>
-      </a:accent4>
-      <a:accent5>
-        <a:srgbClr val="E2E2E2"/>
-      </a:accent5>
-      <a:accent6>
-        <a:srgbClr val="06479F"/>
-      </a:accent6>
-      <a:hlink>
-        <a:srgbClr val="E53418"/>
-      </a:hlink>
-      <a:folHlink>
-        <a:srgbClr val="CA213F"/>
-      </a:folHlink>
-    </a:clrScheme>
-    <a:fontScheme name="Office">
-      <a:majorFont>
-        <a:latin typeface="Arial"/>
-        <a:ea typeface=""/>
-        <a:cs typeface=""/>
-        <a:font script="Jpan" typeface="ＭＳ Ｐゴシック"/>
-        <a:font script="Hang" typeface="맑은 고딕"/>
-        <a:font script="Hans" typeface="宋体"/>
-        <a:font script="Hant" typeface="新細明體"/>
-        <a:font script="Arab" typeface="Times New Roman"/>
-        <a:font script="Hebr" typeface="Times New Roman"/>
-        <a:font script="Thai" typeface="Angsana New"/>
-        <a:font script="Ethi" typeface="Nyala"/>
-        <a:font script="Beng" typeface="Vrinda"/>
-        <a:font script="Gujr" typeface="Shruti"/>
-        <a:font script="Khmr" typeface="MoolBoran"/>
-        <a:font script="Knda" typeface="Tunga"/>
-        <a:font script="Guru" typeface="Raavi"/>
-        <a:font script="Cans" typeface="Euphemia"/>
-        <a:font script="Cher" typeface="Plantagenet Cherokee"/>
-        <a:font script="Yiii" typeface="Microsoft Yi Baiti"/>
-        <a:font script="Tibt" typeface="Microsoft Himalaya"/>
-        <a:font script="Thaa" typeface="MV Boli"/>
-        <a:font script="Deva" typeface="Mangal"/>
-        <a:font script="Telu" typeface="Gautami"/>
-        <a:font script="Taml" typeface="Latha"/>
-        <a:font script="Syrc" typeface="Estrangelo Edessa"/>
-        <a:font script="Orya" typeface="Kalinga"/>
-        <a:font script="Mlym" typeface="Kartika"/>
-        <a:font script="Laoo" typeface="DokChampa"/>
-        <a:font script="Sinh" typeface="Iskoola Pota"/>
-        <a:font script="Mong" typeface="Mongolian Baiti"/>
-        <a:font script="Viet" typeface="Times New Roman"/>
-        <a:font script="Uigh" typeface="Microsoft Uighur"/>
-        <a:font script="Geor" typeface="Sylfaen"/>
-      </a:majorFont>
-      <a:minorFont>
-        <a:latin typeface="Arial"/>
-        <a:ea typeface=""/>
-        <a:cs typeface=""/>
-        <a:font script="Jpan" typeface="ＭＳ Ｐゴシック"/>
-        <a:font script="Hang" typeface="맑은 고딕"/>
-        <a:font script="Hans" typeface="宋体"/>
-        <a:font script="Hant" typeface="新細明體"/>
-        <a:font script="Arab" typeface="Arial"/>
-        <a:font script="Hebr" typeface="Arial"/>
-        <a:font script="Thai" typeface="Cordia New"/>
-        <a:font script="Ethi" typeface="Nyala"/>
-        <a:font script="Beng" typeface="Vrinda"/>
-        <a:font script="Gujr" typeface="Shruti"/>
-        <a:font script="Khmr" typeface="DaunPenh"/>
-        <a:font script="Knda" typeface="Tunga"/>
-        <a:font script="Guru" typeface="Raavi"/>
-        <a:font script="Cans" typeface="Euphemia"/>
-        <a:font script="Cher" typeface="Plantagenet Cherokee"/>
-        <a:font script="Yiii" typeface="Microsoft Yi Baiti"/>
-        <a:font script="Tibt" typeface="Microsoft Himalaya"/>
-        <a:font script="Thaa" typeface="MV Boli"/>
-        <a:font script="Deva" typeface="Mangal"/>
-        <a:font script="Telu" typeface="Gautami"/>
-        <a:font script="Taml" typeface="Latha"/>
-        <a:font script="Syrc" typeface="Estrangelo Edessa"/>
-        <a:font script="Orya" typeface="Kalinga"/>
-        <a:font script="Mlym" typeface="Kartika"/>
-        <a:font script="Laoo" typeface="DokChampa"/>
-        <a:font script="Sinh" typeface="Iskoola Pota"/>
-        <a:font script="Mong" typeface="Mongolian Baiti"/>
-        <a:font script="Viet" typeface="Arial"/>
-        <a:font script="Uigh" typeface="Microsoft Uighur"/>
-        <a:font script="Geor" typeface="Sylfaen"/>
-      </a:minorFont>
-    </a:fontScheme>
-    <a:fmtScheme name="Office">
-      <a:fillStyleLst>
-        <a:solidFill>
-          <a:schemeClr val="phClr"/>
-        </a:solidFill>
-        <a:gradFill rotWithShape="1">
-          <a:gsLst>
-            <a:gs pos="0">
-              <a:schemeClr val="phClr">
-                <a:tint val="50000"/>
-                <a:satMod val="300000"/>
-              </a:schemeClr>
-            </a:gs>
-            <a:gs pos="35000">
-              <a:schemeClr val="phClr">
-                <a:tint val="37000"/>
-                <a:satMod val="300000"/>
-              </a:schemeClr>
-            </a:gs>
-            <a:gs pos="100000">
-              <a:schemeClr val="phClr">
-                <a:tint val="15000"/>
-                <a:satMod val="350000"/>
-              </a:schemeClr>
-            </a:gs>
-          </a:gsLst>
-          <a:lin ang="16200000" scaled="1"/>
-        </a:gradFill>
-        <a:gradFill rotWithShape="1">
-          <a:gsLst>
-            <a:gs pos="0">
-              <a:schemeClr val="phClr">
-                <a:tint val="100000"/>
-                <a:shade val="100000"/>
-                <a:satMod val="130000"/>
-              </a:schemeClr>
-            </a:gs>
-            <a:gs pos="100000">
-              <a:schemeClr val="phClr">
-                <a:tint val="50000"/>
-                <a:shade val="100000"/>
-                <a:satMod val="350000"/>
-              </a:schemeClr>
-            </a:gs>
-          </a:gsLst>
-          <a:lin ang="16200000" scaled="0"/>
-        </a:gradFill>
-      </a:fillStyleLst>
-      <a:lnStyleLst>
-        <a:ln w="9525" cap="flat" cmpd="sng" algn="ctr">
-          <a:solidFill>
-            <a:schemeClr val="phClr">
-              <a:shade val="95000"/>
-              <a:satMod val="105000"/>
-            </a:schemeClr>
-          </a:solidFill>
-          <a:prstDash val="solid"/>
-        </a:ln>
-        <a:ln w="25400" cap="flat" cmpd="sng" algn="ctr">
-          <a:solidFill>
-            <a:schemeClr val="phClr"/>
-          </a:solidFill>
-          <a:prstDash val="solid"/>
-        </a:ln>
-        <a:ln w="38100" cap="flat" cmpd="sng" algn="ctr">
-          <a:solidFill>
-            <a:schemeClr val="phClr"/>
-          </a:solidFill>
-          <a:prstDash val="solid"/>
-        </a:ln>
-      </a:lnStyleLst>
-      <a:effectStyleLst>
-        <a:effectStyle>
-          <a:effectLst>
-            <a:outerShdw blurRad="40000" dist="20000" dir="5400000" rotWithShape="0">
-              <a:srgbClr val="000000">
-                <a:alpha val="38000"/>
-              </a:srgbClr>
-            </a:outerShdw>
-          </a:effectLst>
-        </a:effectStyle>
-        <a:effectStyle>
-          <a:effectLst>
-            <a:outerShdw blurRad="40000" dist="23000" dir="5400000" rotWithShape="0">
-              <a:srgbClr val="000000">
-                <a:alpha val="35000"/>
-              </a:srgbClr>
-            </a:outerShdw>
-          </a:effectLst>
-        </a:effectStyle>
-        <a:effectStyle>
-          <a:effectLst>
-            <a:outerShdw blurRad="40000" dist="23000" dir="5400000" rotWithShape="0">
-              <a:srgbClr val="000000">
-                <a:alpha val="35000"/>
-              </a:srgbClr>
-            </a:outerShdw>
-          </a:effectLst>
-          <a:scene3d>
-            <a:camera prst="orthographicFront">
-              <a:rot lat="0" lon="0" rev="0"/>
-            </a:camera>
-            <a:lightRig rig="threePt" dir="t">
-              <a:rot lat="0" lon="0" rev="1200000"/>
-            </a:lightRig>
-          </a:scene3d>
-          <a:sp3d>
-            <a:bevelT w="63500" h="25400"/>
-          </a:sp3d>
-        </a:effectStyle>
-      </a:effectStyleLst>
-      <a:bgFillStyleLst>
-        <a:solidFill>
-          <a:schemeClr val="phClr"/>
-        </a:solidFill>
-        <a:gradFill rotWithShape="1">
-          <a:gsLst>
-            <a:gs pos="0">
-              <a:schemeClr val="phClr">
-                <a:tint val="40000"/>
-                <a:satMod val="350000"/>
-              </a:schemeClr>
-            </a:gs>
-            <a:gs pos="40000">
-              <a:schemeClr val="phClr">
-                <a:tint val="45000"/>
-                <a:shade val="99000"/>
-                <a:satMod val="350000"/>
-              </a:schemeClr>
-            </a:gs>
-            <a:gs pos="100000">
-              <a:schemeClr val="phClr">
-                <a:shade val="20000"/>
-                <a:satMod val="255000"/>
-              </a:schemeClr>
-            </a:gs>
-          </a:gsLst>
-          <a:path path="circle">
-            <a:fillToRect l="50000" t="-80000" r="50000" b="180000"/>
-          </a:path>
-        </a:gradFill>
-        <a:gradFill rotWithShape="1">
-          <a:gsLst>
-            <a:gs pos="0">
-              <a:schemeClr val="phClr">
-                <a:tint val="80000"/>
-                <a:satMod val="300000"/>
-              </a:schemeClr>
-            </a:gs>
-            <a:gs pos="100000">
-              <a:schemeClr val="phClr">
-                <a:shade val="30000"/>
-                <a:satMod val="200000"/>
-              </a:schemeClr>
-            </a:gs>
-          </a:gsLst>
-          <a:path path="circle">
-            <a:fillToRect l="50000" t="50000" r="50000" b="50000"/>
-          </a:path>
-        </a:gradFill>
-      </a:bgFillStyleLst>
-    </a:fmtScheme>
-  </a:themeElements>
-</a:theme>
-</file>
-
-<file path=ppt/theme/theme2.xml><?xml version="1.0" encoding="utf-8"?>
 <a:theme xmlns:a="http://schemas.openxmlformats.org/drawingml/2006/main" xmlns:r="http://schemas.openxmlformats.org/officeDocument/2006/relationships" name="Custom Theme">
   <a:themeElements>
     <a:clrScheme name="Default">
@@ -10657,7 +13427,7 @@
 </a:theme>
 </file>
 
-<file path=ppt/theme/theme3.xml><?xml version="1.0" encoding="utf-8"?>
+<file path=ppt/theme/theme2.xml><?xml version="1.0" encoding="utf-8"?>
 <a:theme xmlns:a="http://schemas.openxmlformats.org/drawingml/2006/main" xmlns:r="http://schemas.openxmlformats.org/officeDocument/2006/relationships" name="simple-light">
   <a:themeElements>
     <a:clrScheme name="Custom 347">
@@ -10934,4 +13704,283 @@
     </a:fmtScheme>
   </a:themeElements>
 </a:theme>
+</file>
+
+<file path=ppt/theme/theme3.xml><?xml version="1.0" encoding="utf-8"?>
+<a:theme xmlns:a="http://schemas.openxmlformats.org/drawingml/2006/main" xmlns:r="http://schemas.openxmlformats.org/officeDocument/2006/relationships" name="VT_Vorlage_Präsentation_Ma">
+  <a:themeElements>
+    <a:clrScheme name="">
+      <a:dk1>
+        <a:srgbClr val="333333"/>
+      </a:dk1>
+      <a:lt1>
+        <a:srgbClr val="FFFFFF"/>
+      </a:lt1>
+      <a:dk2>
+        <a:srgbClr val="333333"/>
+      </a:dk2>
+      <a:lt2>
+        <a:srgbClr val="808080"/>
+      </a:lt2>
+      <a:accent1>
+        <a:srgbClr val="CCCCCC"/>
+      </a:accent1>
+      <a:accent2>
+        <a:srgbClr val="074FB0"/>
+      </a:accent2>
+      <a:accent3>
+        <a:srgbClr val="FFFFFF"/>
+      </a:accent3>
+      <a:accent4>
+        <a:srgbClr val="2A2A2A"/>
+      </a:accent4>
+      <a:accent5>
+        <a:srgbClr val="E2E2E2"/>
+      </a:accent5>
+      <a:accent6>
+        <a:srgbClr val="06479F"/>
+      </a:accent6>
+      <a:hlink>
+        <a:srgbClr val="E53418"/>
+      </a:hlink>
+      <a:folHlink>
+        <a:srgbClr val="CA213F"/>
+      </a:folHlink>
+    </a:clrScheme>
+    <a:fontScheme name="Office">
+      <a:majorFont>
+        <a:latin typeface="Arial"/>
+        <a:ea typeface=""/>
+        <a:cs typeface=""/>
+        <a:font script="Jpan" typeface="ＭＳ Ｐゴシック"/>
+        <a:font script="Hang" typeface="맑은 고딕"/>
+        <a:font script="Hans" typeface="宋体"/>
+        <a:font script="Hant" typeface="新細明體"/>
+        <a:font script="Arab" typeface="Times New Roman"/>
+        <a:font script="Hebr" typeface="Times New Roman"/>
+        <a:font script="Thai" typeface="Angsana New"/>
+        <a:font script="Ethi" typeface="Nyala"/>
+        <a:font script="Beng" typeface="Vrinda"/>
+        <a:font script="Gujr" typeface="Shruti"/>
+        <a:font script="Khmr" typeface="MoolBoran"/>
+        <a:font script="Knda" typeface="Tunga"/>
+        <a:font script="Guru" typeface="Raavi"/>
+        <a:font script="Cans" typeface="Euphemia"/>
+        <a:font script="Cher" typeface="Plantagenet Cherokee"/>
+        <a:font script="Yiii" typeface="Microsoft Yi Baiti"/>
+        <a:font script="Tibt" typeface="Microsoft Himalaya"/>
+        <a:font script="Thaa" typeface="MV Boli"/>
+        <a:font script="Deva" typeface="Mangal"/>
+        <a:font script="Telu" typeface="Gautami"/>
+        <a:font script="Taml" typeface="Latha"/>
+        <a:font script="Syrc" typeface="Estrangelo Edessa"/>
+        <a:font script="Orya" typeface="Kalinga"/>
+        <a:font script="Mlym" typeface="Kartika"/>
+        <a:font script="Laoo" typeface="DokChampa"/>
+        <a:font script="Sinh" typeface="Iskoola Pota"/>
+        <a:font script="Mong" typeface="Mongolian Baiti"/>
+        <a:font script="Viet" typeface="Times New Roman"/>
+        <a:font script="Uigh" typeface="Microsoft Uighur"/>
+        <a:font script="Geor" typeface="Sylfaen"/>
+      </a:majorFont>
+      <a:minorFont>
+        <a:latin typeface="Arial"/>
+        <a:ea typeface=""/>
+        <a:cs typeface=""/>
+        <a:font script="Jpan" typeface="ＭＳ Ｐゴシック"/>
+        <a:font script="Hang" typeface="맑은 고딕"/>
+        <a:font script="Hans" typeface="宋体"/>
+        <a:font script="Hant" typeface="新細明體"/>
+        <a:font script="Arab" typeface="Arial"/>
+        <a:font script="Hebr" typeface="Arial"/>
+        <a:font script="Thai" typeface="Cordia New"/>
+        <a:font script="Ethi" typeface="Nyala"/>
+        <a:font script="Beng" typeface="Vrinda"/>
+        <a:font script="Gujr" typeface="Shruti"/>
+        <a:font script="Khmr" typeface="DaunPenh"/>
+        <a:font script="Knda" typeface="Tunga"/>
+        <a:font script="Guru" typeface="Raavi"/>
+        <a:font script="Cans" typeface="Euphemia"/>
+        <a:font script="Cher" typeface="Plantagenet Cherokee"/>
+        <a:font script="Yiii" typeface="Microsoft Yi Baiti"/>
+        <a:font script="Tibt" typeface="Microsoft Himalaya"/>
+        <a:font script="Thaa" typeface="MV Boli"/>
+        <a:font script="Deva" typeface="Mangal"/>
+        <a:font script="Telu" typeface="Gautami"/>
+        <a:font script="Taml" typeface="Latha"/>
+        <a:font script="Syrc" typeface="Estrangelo Edessa"/>
+        <a:font script="Orya" typeface="Kalinga"/>
+        <a:font script="Mlym" typeface="Kartika"/>
+        <a:font script="Laoo" typeface="DokChampa"/>
+        <a:font script="Sinh" typeface="Iskoola Pota"/>
+        <a:font script="Mong" typeface="Mongolian Baiti"/>
+        <a:font script="Viet" typeface="Arial"/>
+        <a:font script="Uigh" typeface="Microsoft Uighur"/>
+        <a:font script="Geor" typeface="Sylfaen"/>
+      </a:minorFont>
+    </a:fontScheme>
+    <a:fmtScheme name="Office">
+      <a:fillStyleLst>
+        <a:solidFill>
+          <a:schemeClr val="phClr"/>
+        </a:solidFill>
+        <a:gradFill rotWithShape="1">
+          <a:gsLst>
+            <a:gs pos="0">
+              <a:schemeClr val="phClr">
+                <a:tint val="50000"/>
+                <a:satMod val="300000"/>
+              </a:schemeClr>
+            </a:gs>
+            <a:gs pos="35000">
+              <a:schemeClr val="phClr">
+                <a:tint val="37000"/>
+                <a:satMod val="300000"/>
+              </a:schemeClr>
+            </a:gs>
+            <a:gs pos="100000">
+              <a:schemeClr val="phClr">
+                <a:tint val="15000"/>
+                <a:satMod val="350000"/>
+              </a:schemeClr>
+            </a:gs>
+          </a:gsLst>
+          <a:lin ang="16200000" scaled="1"/>
+        </a:gradFill>
+        <a:gradFill rotWithShape="1">
+          <a:gsLst>
+            <a:gs pos="0">
+              <a:schemeClr val="phClr">
+                <a:tint val="100000"/>
+                <a:shade val="100000"/>
+                <a:satMod val="130000"/>
+              </a:schemeClr>
+            </a:gs>
+            <a:gs pos="100000">
+              <a:schemeClr val="phClr">
+                <a:tint val="50000"/>
+                <a:shade val="100000"/>
+                <a:satMod val="350000"/>
+              </a:schemeClr>
+            </a:gs>
+          </a:gsLst>
+          <a:lin ang="16200000" scaled="0"/>
+        </a:gradFill>
+      </a:fillStyleLst>
+      <a:lnStyleLst>
+        <a:ln w="9525" cap="flat" cmpd="sng" algn="ctr">
+          <a:solidFill>
+            <a:schemeClr val="phClr">
+              <a:shade val="95000"/>
+              <a:satMod val="105000"/>
+            </a:schemeClr>
+          </a:solidFill>
+          <a:prstDash val="solid"/>
+        </a:ln>
+        <a:ln w="25400" cap="flat" cmpd="sng" algn="ctr">
+          <a:solidFill>
+            <a:schemeClr val="phClr"/>
+          </a:solidFill>
+          <a:prstDash val="solid"/>
+        </a:ln>
+        <a:ln w="38100" cap="flat" cmpd="sng" algn="ctr">
+          <a:solidFill>
+            <a:schemeClr val="phClr"/>
+          </a:solidFill>
+          <a:prstDash val="solid"/>
+        </a:ln>
+      </a:lnStyleLst>
+      <a:effectStyleLst>
+        <a:effectStyle>
+          <a:effectLst>
+            <a:outerShdw blurRad="40000" dist="20000" dir="5400000" rotWithShape="0">
+              <a:srgbClr val="000000">
+                <a:alpha val="38000"/>
+              </a:srgbClr>
+            </a:outerShdw>
+          </a:effectLst>
+        </a:effectStyle>
+        <a:effectStyle>
+          <a:effectLst>
+            <a:outerShdw blurRad="40000" dist="23000" dir="5400000" rotWithShape="0">
+              <a:srgbClr val="000000">
+                <a:alpha val="35000"/>
+              </a:srgbClr>
+            </a:outerShdw>
+          </a:effectLst>
+        </a:effectStyle>
+        <a:effectStyle>
+          <a:effectLst>
+            <a:outerShdw blurRad="40000" dist="23000" dir="5400000" rotWithShape="0">
+              <a:srgbClr val="000000">
+                <a:alpha val="35000"/>
+              </a:srgbClr>
+            </a:outerShdw>
+          </a:effectLst>
+          <a:scene3d>
+            <a:camera prst="orthographicFront">
+              <a:rot lat="0" lon="0" rev="0"/>
+            </a:camera>
+            <a:lightRig rig="threePt" dir="t">
+              <a:rot lat="0" lon="0" rev="1200000"/>
+            </a:lightRig>
+          </a:scene3d>
+          <a:sp3d>
+            <a:bevelT w="63500" h="25400"/>
+          </a:sp3d>
+        </a:effectStyle>
+      </a:effectStyleLst>
+      <a:bgFillStyleLst>
+        <a:solidFill>
+          <a:schemeClr val="phClr"/>
+        </a:solidFill>
+        <a:gradFill rotWithShape="1">
+          <a:gsLst>
+            <a:gs pos="0">
+              <a:schemeClr val="phClr">
+                <a:tint val="40000"/>
+                <a:satMod val="350000"/>
+              </a:schemeClr>
+            </a:gs>
+            <a:gs pos="40000">
+              <a:schemeClr val="phClr">
+                <a:tint val="45000"/>
+                <a:shade val="99000"/>
+                <a:satMod val="350000"/>
+              </a:schemeClr>
+            </a:gs>
+            <a:gs pos="100000">
+              <a:schemeClr val="phClr">
+                <a:shade val="20000"/>
+                <a:satMod val="255000"/>
+              </a:schemeClr>
+            </a:gs>
+          </a:gsLst>
+          <a:path path="circle">
+            <a:fillToRect l="50000" t="-80000" r="50000" b="180000"/>
+          </a:path>
+        </a:gradFill>
+        <a:gradFill rotWithShape="1">
+          <a:gsLst>
+            <a:gs pos="0">
+              <a:schemeClr val="phClr">
+                <a:tint val="80000"/>
+                <a:satMod val="300000"/>
+              </a:schemeClr>
+            </a:gs>
+            <a:gs pos="100000">
+              <a:schemeClr val="phClr">
+                <a:shade val="30000"/>
+                <a:satMod val="200000"/>
+              </a:schemeClr>
+            </a:gs>
+          </a:gsLst>
+          <a:path path="circle">
+            <a:fillToRect l="50000" t="50000" r="50000" b="50000"/>
+          </a:path>
+        </a:gradFill>
+      </a:bgFillStyleLst>
+    </a:fmtScheme>
+  </a:themeElements>
+</a:theme>
 </file>
</xml_diff>

<commit_message>
added url for pacman
</commit_message>
<xml_diff>
--- a/Behavioral Patterns - JS Patterns and Anti Patterns.pptx
+++ b/Behavioral Patterns - JS Patterns and Anti Patterns.pptx
@@ -16929,7 +16929,16 @@
             </a:pPr>
             <a:r>
               <a:rPr lang="en-GB" sz="1400"/>
-              <a:t>Pacman:</a:t>
+              <a:t>Pacman: </a:t>
+            </a:r>
+            <a:r>
+              <a:rPr lang="en-GB" sz="1400" u="sng">
+                <a:solidFill>
+                  <a:schemeClr val="hlink"/>
+                </a:solidFill>
+                <a:hlinkClick r:id="rId7"/>
+              </a:rPr>
+              <a:t>https://github.com/daleharvey/pacman</a:t>
             </a:r>
           </a:p>
           <a:p>
@@ -19811,6 +19820,285 @@
 </file>
 
 <file path=ppt/theme/theme1.xml><?xml version="1.0" encoding="utf-8"?>
+<a:theme xmlns:a="http://schemas.openxmlformats.org/drawingml/2006/main" xmlns:r="http://schemas.openxmlformats.org/officeDocument/2006/relationships" name="VT_Vorlage_Präsentation_Ma">
+  <a:themeElements>
+    <a:clrScheme name="">
+      <a:dk1>
+        <a:srgbClr val="333333"/>
+      </a:dk1>
+      <a:lt1>
+        <a:srgbClr val="FFFFFF"/>
+      </a:lt1>
+      <a:dk2>
+        <a:srgbClr val="333333"/>
+      </a:dk2>
+      <a:lt2>
+        <a:srgbClr val="808080"/>
+      </a:lt2>
+      <a:accent1>
+        <a:srgbClr val="CCCCCC"/>
+      </a:accent1>
+      <a:accent2>
+        <a:srgbClr val="074FB0"/>
+      </a:accent2>
+      <a:accent3>
+        <a:srgbClr val="FFFFFF"/>
+      </a:accent3>
+      <a:accent4>
+        <a:srgbClr val="2A2A2A"/>
+      </a:accent4>
+      <a:accent5>
+        <a:srgbClr val="E2E2E2"/>
+      </a:accent5>
+      <a:accent6>
+        <a:srgbClr val="06479F"/>
+      </a:accent6>
+      <a:hlink>
+        <a:srgbClr val="E53418"/>
+      </a:hlink>
+      <a:folHlink>
+        <a:srgbClr val="CA213F"/>
+      </a:folHlink>
+    </a:clrScheme>
+    <a:fontScheme name="Office">
+      <a:majorFont>
+        <a:latin typeface="Arial"/>
+        <a:ea typeface=""/>
+        <a:cs typeface=""/>
+        <a:font script="Jpan" typeface="ＭＳ Ｐゴシック"/>
+        <a:font script="Hang" typeface="맑은 고딕"/>
+        <a:font script="Hans" typeface="宋体"/>
+        <a:font script="Hant" typeface="新細明體"/>
+        <a:font script="Arab" typeface="Times New Roman"/>
+        <a:font script="Hebr" typeface="Times New Roman"/>
+        <a:font script="Thai" typeface="Angsana New"/>
+        <a:font script="Ethi" typeface="Nyala"/>
+        <a:font script="Beng" typeface="Vrinda"/>
+        <a:font script="Gujr" typeface="Shruti"/>
+        <a:font script="Khmr" typeface="MoolBoran"/>
+        <a:font script="Knda" typeface="Tunga"/>
+        <a:font script="Guru" typeface="Raavi"/>
+        <a:font script="Cans" typeface="Euphemia"/>
+        <a:font script="Cher" typeface="Plantagenet Cherokee"/>
+        <a:font script="Yiii" typeface="Microsoft Yi Baiti"/>
+        <a:font script="Tibt" typeface="Microsoft Himalaya"/>
+        <a:font script="Thaa" typeface="MV Boli"/>
+        <a:font script="Deva" typeface="Mangal"/>
+        <a:font script="Telu" typeface="Gautami"/>
+        <a:font script="Taml" typeface="Latha"/>
+        <a:font script="Syrc" typeface="Estrangelo Edessa"/>
+        <a:font script="Orya" typeface="Kalinga"/>
+        <a:font script="Mlym" typeface="Kartika"/>
+        <a:font script="Laoo" typeface="DokChampa"/>
+        <a:font script="Sinh" typeface="Iskoola Pota"/>
+        <a:font script="Mong" typeface="Mongolian Baiti"/>
+        <a:font script="Viet" typeface="Times New Roman"/>
+        <a:font script="Uigh" typeface="Microsoft Uighur"/>
+        <a:font script="Geor" typeface="Sylfaen"/>
+      </a:majorFont>
+      <a:minorFont>
+        <a:latin typeface="Arial"/>
+        <a:ea typeface=""/>
+        <a:cs typeface=""/>
+        <a:font script="Jpan" typeface="ＭＳ Ｐゴシック"/>
+        <a:font script="Hang" typeface="맑은 고딕"/>
+        <a:font script="Hans" typeface="宋体"/>
+        <a:font script="Hant" typeface="新細明體"/>
+        <a:font script="Arab" typeface="Arial"/>
+        <a:font script="Hebr" typeface="Arial"/>
+        <a:font script="Thai" typeface="Cordia New"/>
+        <a:font script="Ethi" typeface="Nyala"/>
+        <a:font script="Beng" typeface="Vrinda"/>
+        <a:font script="Gujr" typeface="Shruti"/>
+        <a:font script="Khmr" typeface="DaunPenh"/>
+        <a:font script="Knda" typeface="Tunga"/>
+        <a:font script="Guru" typeface="Raavi"/>
+        <a:font script="Cans" typeface="Euphemia"/>
+        <a:font script="Cher" typeface="Plantagenet Cherokee"/>
+        <a:font script="Yiii" typeface="Microsoft Yi Baiti"/>
+        <a:font script="Tibt" typeface="Microsoft Himalaya"/>
+        <a:font script="Thaa" typeface="MV Boli"/>
+        <a:font script="Deva" typeface="Mangal"/>
+        <a:font script="Telu" typeface="Gautami"/>
+        <a:font script="Taml" typeface="Latha"/>
+        <a:font script="Syrc" typeface="Estrangelo Edessa"/>
+        <a:font script="Orya" typeface="Kalinga"/>
+        <a:font script="Mlym" typeface="Kartika"/>
+        <a:font script="Laoo" typeface="DokChampa"/>
+        <a:font script="Sinh" typeface="Iskoola Pota"/>
+        <a:font script="Mong" typeface="Mongolian Baiti"/>
+        <a:font script="Viet" typeface="Arial"/>
+        <a:font script="Uigh" typeface="Microsoft Uighur"/>
+        <a:font script="Geor" typeface="Sylfaen"/>
+      </a:minorFont>
+    </a:fontScheme>
+    <a:fmtScheme name="Office">
+      <a:fillStyleLst>
+        <a:solidFill>
+          <a:schemeClr val="phClr"/>
+        </a:solidFill>
+        <a:gradFill rotWithShape="1">
+          <a:gsLst>
+            <a:gs pos="0">
+              <a:schemeClr val="phClr">
+                <a:tint val="50000"/>
+                <a:satMod val="300000"/>
+              </a:schemeClr>
+            </a:gs>
+            <a:gs pos="35000">
+              <a:schemeClr val="phClr">
+                <a:tint val="37000"/>
+                <a:satMod val="300000"/>
+              </a:schemeClr>
+            </a:gs>
+            <a:gs pos="100000">
+              <a:schemeClr val="phClr">
+                <a:tint val="15000"/>
+                <a:satMod val="350000"/>
+              </a:schemeClr>
+            </a:gs>
+          </a:gsLst>
+          <a:lin ang="16200000" scaled="1"/>
+        </a:gradFill>
+        <a:gradFill rotWithShape="1">
+          <a:gsLst>
+            <a:gs pos="0">
+              <a:schemeClr val="phClr">
+                <a:tint val="100000"/>
+                <a:shade val="100000"/>
+                <a:satMod val="130000"/>
+              </a:schemeClr>
+            </a:gs>
+            <a:gs pos="100000">
+              <a:schemeClr val="phClr">
+                <a:tint val="50000"/>
+                <a:shade val="100000"/>
+                <a:satMod val="350000"/>
+              </a:schemeClr>
+            </a:gs>
+          </a:gsLst>
+          <a:lin ang="16200000" scaled="0"/>
+        </a:gradFill>
+      </a:fillStyleLst>
+      <a:lnStyleLst>
+        <a:ln w="9525" cap="flat" cmpd="sng" algn="ctr">
+          <a:solidFill>
+            <a:schemeClr val="phClr">
+              <a:shade val="95000"/>
+              <a:satMod val="105000"/>
+            </a:schemeClr>
+          </a:solidFill>
+          <a:prstDash val="solid"/>
+        </a:ln>
+        <a:ln w="25400" cap="flat" cmpd="sng" algn="ctr">
+          <a:solidFill>
+            <a:schemeClr val="phClr"/>
+          </a:solidFill>
+          <a:prstDash val="solid"/>
+        </a:ln>
+        <a:ln w="38100" cap="flat" cmpd="sng" algn="ctr">
+          <a:solidFill>
+            <a:schemeClr val="phClr"/>
+          </a:solidFill>
+          <a:prstDash val="solid"/>
+        </a:ln>
+      </a:lnStyleLst>
+      <a:effectStyleLst>
+        <a:effectStyle>
+          <a:effectLst>
+            <a:outerShdw blurRad="40000" dist="20000" dir="5400000" rotWithShape="0">
+              <a:srgbClr val="000000">
+                <a:alpha val="38000"/>
+              </a:srgbClr>
+            </a:outerShdw>
+          </a:effectLst>
+        </a:effectStyle>
+        <a:effectStyle>
+          <a:effectLst>
+            <a:outerShdw blurRad="40000" dist="23000" dir="5400000" rotWithShape="0">
+              <a:srgbClr val="000000">
+                <a:alpha val="35000"/>
+              </a:srgbClr>
+            </a:outerShdw>
+          </a:effectLst>
+        </a:effectStyle>
+        <a:effectStyle>
+          <a:effectLst>
+            <a:outerShdw blurRad="40000" dist="23000" dir="5400000" rotWithShape="0">
+              <a:srgbClr val="000000">
+                <a:alpha val="35000"/>
+              </a:srgbClr>
+            </a:outerShdw>
+          </a:effectLst>
+          <a:scene3d>
+            <a:camera prst="orthographicFront">
+              <a:rot lat="0" lon="0" rev="0"/>
+            </a:camera>
+            <a:lightRig rig="threePt" dir="t">
+              <a:rot lat="0" lon="0" rev="1200000"/>
+            </a:lightRig>
+          </a:scene3d>
+          <a:sp3d>
+            <a:bevelT w="63500" h="25400"/>
+          </a:sp3d>
+        </a:effectStyle>
+      </a:effectStyleLst>
+      <a:bgFillStyleLst>
+        <a:solidFill>
+          <a:schemeClr val="phClr"/>
+        </a:solidFill>
+        <a:gradFill rotWithShape="1">
+          <a:gsLst>
+            <a:gs pos="0">
+              <a:schemeClr val="phClr">
+                <a:tint val="40000"/>
+                <a:satMod val="350000"/>
+              </a:schemeClr>
+            </a:gs>
+            <a:gs pos="40000">
+              <a:schemeClr val="phClr">
+                <a:tint val="45000"/>
+                <a:shade val="99000"/>
+                <a:satMod val="350000"/>
+              </a:schemeClr>
+            </a:gs>
+            <a:gs pos="100000">
+              <a:schemeClr val="phClr">
+                <a:shade val="20000"/>
+                <a:satMod val="255000"/>
+              </a:schemeClr>
+            </a:gs>
+          </a:gsLst>
+          <a:path path="circle">
+            <a:fillToRect l="50000" t="-80000" r="50000" b="180000"/>
+          </a:path>
+        </a:gradFill>
+        <a:gradFill rotWithShape="1">
+          <a:gsLst>
+            <a:gs pos="0">
+              <a:schemeClr val="phClr">
+                <a:tint val="80000"/>
+                <a:satMod val="300000"/>
+              </a:schemeClr>
+            </a:gs>
+            <a:gs pos="100000">
+              <a:schemeClr val="phClr">
+                <a:shade val="30000"/>
+                <a:satMod val="200000"/>
+              </a:schemeClr>
+            </a:gs>
+          </a:gsLst>
+          <a:path path="circle">
+            <a:fillToRect l="50000" t="50000" r="50000" b="50000"/>
+          </a:path>
+        </a:gradFill>
+      </a:bgFillStyleLst>
+    </a:fmtScheme>
+  </a:themeElements>
+</a:theme>
+</file>
+
+<file path=ppt/theme/theme2.xml><?xml version="1.0" encoding="utf-8"?>
 <a:theme xmlns:a="http://schemas.openxmlformats.org/drawingml/2006/main" xmlns:r="http://schemas.openxmlformats.org/officeDocument/2006/relationships" name="Custom Theme">
   <a:themeElements>
     <a:clrScheme name="Default">
@@ -20087,283 +20375,4 @@
     </a:fmtScheme>
   </a:themeElements>
 </a:theme>
-</file>
-
-<file path=ppt/theme/theme2.xml><?xml version="1.0" encoding="utf-8"?>
-<a:theme xmlns:a="http://schemas.openxmlformats.org/drawingml/2006/main" xmlns:r="http://schemas.openxmlformats.org/officeDocument/2006/relationships" name="VT_Vorlage_Präsentation_Ma">
-  <a:themeElements>
-    <a:clrScheme name="">
-      <a:dk1>
-        <a:srgbClr val="333333"/>
-      </a:dk1>
-      <a:lt1>
-        <a:srgbClr val="FFFFFF"/>
-      </a:lt1>
-      <a:dk2>
-        <a:srgbClr val="333333"/>
-      </a:dk2>
-      <a:lt2>
-        <a:srgbClr val="808080"/>
-      </a:lt2>
-      <a:accent1>
-        <a:srgbClr val="CCCCCC"/>
-      </a:accent1>
-      <a:accent2>
-        <a:srgbClr val="074FB0"/>
-      </a:accent2>
-      <a:accent3>
-        <a:srgbClr val="FFFFFF"/>
-      </a:accent3>
-      <a:accent4>
-        <a:srgbClr val="2A2A2A"/>
-      </a:accent4>
-      <a:accent5>
-        <a:srgbClr val="E2E2E2"/>
-      </a:accent5>
-      <a:accent6>
-        <a:srgbClr val="06479F"/>
-      </a:accent6>
-      <a:hlink>
-        <a:srgbClr val="E53418"/>
-      </a:hlink>
-      <a:folHlink>
-        <a:srgbClr val="CA213F"/>
-      </a:folHlink>
-    </a:clrScheme>
-    <a:fontScheme name="Office">
-      <a:majorFont>
-        <a:latin typeface="Arial"/>
-        <a:ea typeface=""/>
-        <a:cs typeface=""/>
-        <a:font script="Jpan" typeface="ＭＳ Ｐゴシック"/>
-        <a:font script="Hang" typeface="맑은 고딕"/>
-        <a:font script="Hans" typeface="宋体"/>
-        <a:font script="Hant" typeface="新細明體"/>
-        <a:font script="Arab" typeface="Times New Roman"/>
-        <a:font script="Hebr" typeface="Times New Roman"/>
-        <a:font script="Thai" typeface="Angsana New"/>
-        <a:font script="Ethi" typeface="Nyala"/>
-        <a:font script="Beng" typeface="Vrinda"/>
-        <a:font script="Gujr" typeface="Shruti"/>
-        <a:font script="Khmr" typeface="MoolBoran"/>
-        <a:font script="Knda" typeface="Tunga"/>
-        <a:font script="Guru" typeface="Raavi"/>
-        <a:font script="Cans" typeface="Euphemia"/>
-        <a:font script="Cher" typeface="Plantagenet Cherokee"/>
-        <a:font script="Yiii" typeface="Microsoft Yi Baiti"/>
-        <a:font script="Tibt" typeface="Microsoft Himalaya"/>
-        <a:font script="Thaa" typeface="MV Boli"/>
-        <a:font script="Deva" typeface="Mangal"/>
-        <a:font script="Telu" typeface="Gautami"/>
-        <a:font script="Taml" typeface="Latha"/>
-        <a:font script="Syrc" typeface="Estrangelo Edessa"/>
-        <a:font script="Orya" typeface="Kalinga"/>
-        <a:font script="Mlym" typeface="Kartika"/>
-        <a:font script="Laoo" typeface="DokChampa"/>
-        <a:font script="Sinh" typeface="Iskoola Pota"/>
-        <a:font script="Mong" typeface="Mongolian Baiti"/>
-        <a:font script="Viet" typeface="Times New Roman"/>
-        <a:font script="Uigh" typeface="Microsoft Uighur"/>
-        <a:font script="Geor" typeface="Sylfaen"/>
-      </a:majorFont>
-      <a:minorFont>
-        <a:latin typeface="Arial"/>
-        <a:ea typeface=""/>
-        <a:cs typeface=""/>
-        <a:font script="Jpan" typeface="ＭＳ Ｐゴシック"/>
-        <a:font script="Hang" typeface="맑은 고딕"/>
-        <a:font script="Hans" typeface="宋体"/>
-        <a:font script="Hant" typeface="新細明體"/>
-        <a:font script="Arab" typeface="Arial"/>
-        <a:font script="Hebr" typeface="Arial"/>
-        <a:font script="Thai" typeface="Cordia New"/>
-        <a:font script="Ethi" typeface="Nyala"/>
-        <a:font script="Beng" typeface="Vrinda"/>
-        <a:font script="Gujr" typeface="Shruti"/>
-        <a:font script="Khmr" typeface="DaunPenh"/>
-        <a:font script="Knda" typeface="Tunga"/>
-        <a:font script="Guru" typeface="Raavi"/>
-        <a:font script="Cans" typeface="Euphemia"/>
-        <a:font script="Cher" typeface="Plantagenet Cherokee"/>
-        <a:font script="Yiii" typeface="Microsoft Yi Baiti"/>
-        <a:font script="Tibt" typeface="Microsoft Himalaya"/>
-        <a:font script="Thaa" typeface="MV Boli"/>
-        <a:font script="Deva" typeface="Mangal"/>
-        <a:font script="Telu" typeface="Gautami"/>
-        <a:font script="Taml" typeface="Latha"/>
-        <a:font script="Syrc" typeface="Estrangelo Edessa"/>
-        <a:font script="Orya" typeface="Kalinga"/>
-        <a:font script="Mlym" typeface="Kartika"/>
-        <a:font script="Laoo" typeface="DokChampa"/>
-        <a:font script="Sinh" typeface="Iskoola Pota"/>
-        <a:font script="Mong" typeface="Mongolian Baiti"/>
-        <a:font script="Viet" typeface="Arial"/>
-        <a:font script="Uigh" typeface="Microsoft Uighur"/>
-        <a:font script="Geor" typeface="Sylfaen"/>
-      </a:minorFont>
-    </a:fontScheme>
-    <a:fmtScheme name="Office">
-      <a:fillStyleLst>
-        <a:solidFill>
-          <a:schemeClr val="phClr"/>
-        </a:solidFill>
-        <a:gradFill rotWithShape="1">
-          <a:gsLst>
-            <a:gs pos="0">
-              <a:schemeClr val="phClr">
-                <a:tint val="50000"/>
-                <a:satMod val="300000"/>
-              </a:schemeClr>
-            </a:gs>
-            <a:gs pos="35000">
-              <a:schemeClr val="phClr">
-                <a:tint val="37000"/>
-                <a:satMod val="300000"/>
-              </a:schemeClr>
-            </a:gs>
-            <a:gs pos="100000">
-              <a:schemeClr val="phClr">
-                <a:tint val="15000"/>
-                <a:satMod val="350000"/>
-              </a:schemeClr>
-            </a:gs>
-          </a:gsLst>
-          <a:lin ang="16200000" scaled="1"/>
-        </a:gradFill>
-        <a:gradFill rotWithShape="1">
-          <a:gsLst>
-            <a:gs pos="0">
-              <a:schemeClr val="phClr">
-                <a:tint val="100000"/>
-                <a:shade val="100000"/>
-                <a:satMod val="130000"/>
-              </a:schemeClr>
-            </a:gs>
-            <a:gs pos="100000">
-              <a:schemeClr val="phClr">
-                <a:tint val="50000"/>
-                <a:shade val="100000"/>
-                <a:satMod val="350000"/>
-              </a:schemeClr>
-            </a:gs>
-          </a:gsLst>
-          <a:lin ang="16200000" scaled="0"/>
-        </a:gradFill>
-      </a:fillStyleLst>
-      <a:lnStyleLst>
-        <a:ln w="9525" cap="flat" cmpd="sng" algn="ctr">
-          <a:solidFill>
-            <a:schemeClr val="phClr">
-              <a:shade val="95000"/>
-              <a:satMod val="105000"/>
-            </a:schemeClr>
-          </a:solidFill>
-          <a:prstDash val="solid"/>
-        </a:ln>
-        <a:ln w="25400" cap="flat" cmpd="sng" algn="ctr">
-          <a:solidFill>
-            <a:schemeClr val="phClr"/>
-          </a:solidFill>
-          <a:prstDash val="solid"/>
-        </a:ln>
-        <a:ln w="38100" cap="flat" cmpd="sng" algn="ctr">
-          <a:solidFill>
-            <a:schemeClr val="phClr"/>
-          </a:solidFill>
-          <a:prstDash val="solid"/>
-        </a:ln>
-      </a:lnStyleLst>
-      <a:effectStyleLst>
-        <a:effectStyle>
-          <a:effectLst>
-            <a:outerShdw blurRad="40000" dist="20000" dir="5400000" rotWithShape="0">
-              <a:srgbClr val="000000">
-                <a:alpha val="38000"/>
-              </a:srgbClr>
-            </a:outerShdw>
-          </a:effectLst>
-        </a:effectStyle>
-        <a:effectStyle>
-          <a:effectLst>
-            <a:outerShdw blurRad="40000" dist="23000" dir="5400000" rotWithShape="0">
-              <a:srgbClr val="000000">
-                <a:alpha val="35000"/>
-              </a:srgbClr>
-            </a:outerShdw>
-          </a:effectLst>
-        </a:effectStyle>
-        <a:effectStyle>
-          <a:effectLst>
-            <a:outerShdw blurRad="40000" dist="23000" dir="5400000" rotWithShape="0">
-              <a:srgbClr val="000000">
-                <a:alpha val="35000"/>
-              </a:srgbClr>
-            </a:outerShdw>
-          </a:effectLst>
-          <a:scene3d>
-            <a:camera prst="orthographicFront">
-              <a:rot lat="0" lon="0" rev="0"/>
-            </a:camera>
-            <a:lightRig rig="threePt" dir="t">
-              <a:rot lat="0" lon="0" rev="1200000"/>
-            </a:lightRig>
-          </a:scene3d>
-          <a:sp3d>
-            <a:bevelT w="63500" h="25400"/>
-          </a:sp3d>
-        </a:effectStyle>
-      </a:effectStyleLst>
-      <a:bgFillStyleLst>
-        <a:solidFill>
-          <a:schemeClr val="phClr"/>
-        </a:solidFill>
-        <a:gradFill rotWithShape="1">
-          <a:gsLst>
-            <a:gs pos="0">
-              <a:schemeClr val="phClr">
-                <a:tint val="40000"/>
-                <a:satMod val="350000"/>
-              </a:schemeClr>
-            </a:gs>
-            <a:gs pos="40000">
-              <a:schemeClr val="phClr">
-                <a:tint val="45000"/>
-                <a:shade val="99000"/>
-                <a:satMod val="350000"/>
-              </a:schemeClr>
-            </a:gs>
-            <a:gs pos="100000">
-              <a:schemeClr val="phClr">
-                <a:shade val="20000"/>
-                <a:satMod val="255000"/>
-              </a:schemeClr>
-            </a:gs>
-          </a:gsLst>
-          <a:path path="circle">
-            <a:fillToRect l="50000" t="-80000" r="50000" b="180000"/>
-          </a:path>
-        </a:gradFill>
-        <a:gradFill rotWithShape="1">
-          <a:gsLst>
-            <a:gs pos="0">
-              <a:schemeClr val="phClr">
-                <a:tint val="80000"/>
-                <a:satMod val="300000"/>
-              </a:schemeClr>
-            </a:gs>
-            <a:gs pos="100000">
-              <a:schemeClr val="phClr">
-                <a:shade val="30000"/>
-                <a:satMod val="200000"/>
-              </a:schemeClr>
-            </a:gs>
-          </a:gsLst>
-          <a:path path="circle">
-            <a:fillToRect l="50000" t="50000" r="50000" b="50000"/>
-          </a:path>
-        </a:gradFill>
-      </a:bgFillStyleLst>
-    </a:fmtScheme>
-  </a:themeElements>
-</a:theme>
 </file>
</xml_diff>

<commit_message>
added slides for Iterator and Strategy
</commit_message>
<xml_diff>
--- a/Behavioral Patterns - JS Patterns and Anti Patterns.pptx
+++ b/Behavioral Patterns - JS Patterns and Anti Patterns.pptx
@@ -42,16 +42,20 @@
     <p:sldId id="287" r:id="rId37"/>
     <p:sldId id="288" r:id="rId38"/>
     <p:sldId id="289" r:id="rId39"/>
+    <p:sldId id="290" r:id="rId40"/>
+    <p:sldId id="291" r:id="rId41"/>
+    <p:sldId id="292" r:id="rId42"/>
+    <p:sldId id="293" r:id="rId43"/>
   </p:sldIdLst>
   <p:sldSz cy="6858000" cx="9144000"/>
   <p:notesSz cx="6858000" cy="9144000"/>
   <p:embeddedFontLst>
     <p:embeddedFont>
       <p:font typeface="Helvetica Neue"/>
-      <p:regular r:id="rId40"/>
-      <p:bold r:id="rId41"/>
-      <p:italic r:id="rId42"/>
-      <p:boldItalic r:id="rId43"/>
+      <p:regular r:id="rId44"/>
+      <p:bold r:id="rId45"/>
+      <p:italic r:id="rId46"/>
+      <p:boldItalic r:id="rId47"/>
     </p:embeddedFont>
   </p:embeddedFontLst>
   <p:defaultTextStyle>
@@ -3669,7 +3673,7 @@
         </p:nvSpPr>
         <p:spPr>
           <a:xfrm>
-            <a:off x="1143300" y="685800"/>
+            <a:off x="1143308" y="685800"/>
             <a:ext cx="4572000" cy="3429000"/>
           </a:xfrm>
           <a:custGeom>
@@ -3719,10 +3723,6 @@
           <a:prstGeom prst="rect">
             <a:avLst/>
           </a:prstGeom>
-          <a:noFill/>
-          <a:ln>
-            <a:noFill/>
-          </a:ln>
         </p:spPr>
         <p:txBody>
           <a:bodyPr anchorCtr="0" anchor="t" bIns="91425" lIns="91425" rIns="91425" tIns="91425">
@@ -3730,28 +3730,16 @@
           </a:bodyPr>
           <a:lstStyle/>
           <a:p>
-            <a:pPr indent="0" lvl="0" marL="0" marR="0" rtl="0" algn="l">
-              <a:spcBef>
-                <a:spcPts val="0"/>
-              </a:spcBef>
-              <a:buClr>
-                <a:schemeClr val="dk1"/>
-              </a:buClr>
-              <a:buFont typeface="Arial"/>
+            <a:pPr>
+              <a:spcBef>
+                <a:spcPts val="0"/>
+              </a:spcBef>
               <a:buNone/>
             </a:pPr>
             <a:r>
               <a:t/>
             </a:r>
-            <a:endParaRPr b="0" baseline="0" i="0" sz="1100" u="none" cap="none" strike="noStrike">
-              <a:solidFill>
-                <a:schemeClr val="dk1"/>
-              </a:solidFill>
-              <a:latin typeface="Arial"/>
-              <a:ea typeface="Arial"/>
-              <a:cs typeface="Arial"/>
-              <a:sym typeface="Arial"/>
-            </a:endParaRPr>
+            <a:endParaRPr/>
           </a:p>
         </p:txBody>
       </p:sp>
@@ -3768,7 +3756,7 @@
   <p:cSld>
     <p:spTree>
       <p:nvGrpSpPr>
-        <p:cNvPr id="228" name="Shape 228"/>
+        <p:cNvPr id="230" name="Shape 230"/>
         <p:cNvGrpSpPr/>
         <p:nvPr/>
       </p:nvGrpSpPr>
@@ -3782,7 +3770,7 @@
       </p:grpSpPr>
       <p:sp>
         <p:nvSpPr>
-          <p:cNvPr id="229" name="Shape 229"/>
+          <p:cNvPr id="231" name="Shape 231"/>
           <p:cNvSpPr/>
           <p:nvPr>
             <p:ph idx="2" type="sldImg"/>
@@ -3826,7 +3814,443 @@
       </p:sp>
       <p:sp>
         <p:nvSpPr>
-          <p:cNvPr id="230" name="Shape 230"/>
+          <p:cNvPr id="232" name="Shape 232"/>
+          <p:cNvSpPr txBox="1"/>
+          <p:nvPr>
+            <p:ph idx="1" type="body"/>
+          </p:nvPr>
+        </p:nvSpPr>
+        <p:spPr>
+          <a:xfrm>
+            <a:off x="685800" y="4343400"/>
+            <a:ext cx="5486399" cy="4114800"/>
+          </a:xfrm>
+          <a:prstGeom prst="rect">
+            <a:avLst/>
+          </a:prstGeom>
+        </p:spPr>
+        <p:txBody>
+          <a:bodyPr anchorCtr="0" anchor="t" bIns="91425" lIns="91425" rIns="91425" tIns="91425">
+            <a:noAutofit/>
+          </a:bodyPr>
+          <a:lstStyle/>
+          <a:p>
+            <a:pPr>
+              <a:spcBef>
+                <a:spcPts val="0"/>
+              </a:spcBef>
+              <a:buNone/>
+            </a:pPr>
+            <a:r>
+              <a:t/>
+            </a:r>
+            <a:endParaRPr/>
+          </a:p>
+        </p:txBody>
+      </p:sp>
+    </p:spTree>
+  </p:cSld>
+  <p:clrMapOvr>
+    <a:masterClrMapping/>
+  </p:clrMapOvr>
+</p:notes>
+</file>
+
+<file path=ppt/notesSlides/notesSlide35.xml><?xml version="1.0" encoding="utf-8"?>
+<p:notes xmlns:a="http://schemas.openxmlformats.org/drawingml/2006/main" xmlns:r="http://schemas.openxmlformats.org/officeDocument/2006/relationships" xmlns:mc="http://schemas.openxmlformats.org/markup-compatibility/2006" xmlns:mv="urn:schemas-microsoft-com:mac:vml" xmlns:p="http://schemas.openxmlformats.org/presentationml/2006/main" xmlns:c="http://schemas.openxmlformats.org/drawingml/2006/chart" xmlns:dgm="http://schemas.openxmlformats.org/drawingml/2006/diagram" xmlns:o="urn:schemas-microsoft-com:office:office" xmlns:v="urn:schemas-microsoft-com:vml" xmlns:pvml="urn:schemas-microsoft-com:office:powerpoint" xmlns:com="http://schemas.openxmlformats.org/drawingml/2006/compatibility" xmlns:p14="http://schemas.microsoft.com/office/powerpoint/2010/main" showMasterPhAnim="0" showMasterSp="0">
+  <p:cSld>
+    <p:spTree>
+      <p:nvGrpSpPr>
+        <p:cNvPr id="236" name="Shape 236"/>
+        <p:cNvGrpSpPr/>
+        <p:nvPr/>
+      </p:nvGrpSpPr>
+      <p:grpSpPr>
+        <a:xfrm>
+          <a:off x="0" y="0"/>
+          <a:ext cx="0" cy="0"/>
+          <a:chOff x="0" y="0"/>
+          <a:chExt cx="0" cy="0"/>
+        </a:xfrm>
+      </p:grpSpPr>
+      <p:sp>
+        <p:nvSpPr>
+          <p:cNvPr id="237" name="Shape 237"/>
+          <p:cNvSpPr/>
+          <p:nvPr>
+            <p:ph idx="2" type="sldImg"/>
+          </p:nvPr>
+        </p:nvSpPr>
+        <p:spPr>
+          <a:xfrm>
+            <a:off x="1143308" y="685800"/>
+            <a:ext cx="4572000" cy="3429000"/>
+          </a:xfrm>
+          <a:custGeom>
+            <a:pathLst>
+              <a:path extrusionOk="0" h="120000" w="120000">
+                <a:moveTo>
+                  <a:pt x="0" y="0"/>
+                </a:moveTo>
+                <a:lnTo>
+                  <a:pt x="120000" y="0"/>
+                </a:lnTo>
+                <a:lnTo>
+                  <a:pt x="120000" y="120000"/>
+                </a:lnTo>
+                <a:lnTo>
+                  <a:pt x="0" y="120000"/>
+                </a:lnTo>
+                <a:close/>
+              </a:path>
+            </a:pathLst>
+          </a:custGeom>
+          <a:noFill/>
+          <a:ln cap="flat" cmpd="sng" w="9525">
+            <a:solidFill>
+              <a:srgbClr val="000000"/>
+            </a:solidFill>
+            <a:prstDash val="solid"/>
+            <a:round/>
+            <a:headEnd len="med" w="med" type="none"/>
+            <a:tailEnd len="med" w="med" type="none"/>
+          </a:ln>
+        </p:spPr>
+      </p:sp>
+      <p:sp>
+        <p:nvSpPr>
+          <p:cNvPr id="238" name="Shape 238"/>
+          <p:cNvSpPr txBox="1"/>
+          <p:nvPr>
+            <p:ph idx="1" type="body"/>
+          </p:nvPr>
+        </p:nvSpPr>
+        <p:spPr>
+          <a:xfrm>
+            <a:off x="685800" y="4343400"/>
+            <a:ext cx="5486399" cy="4114800"/>
+          </a:xfrm>
+          <a:prstGeom prst="rect">
+            <a:avLst/>
+          </a:prstGeom>
+        </p:spPr>
+        <p:txBody>
+          <a:bodyPr anchorCtr="0" anchor="t" bIns="91425" lIns="91425" rIns="91425" tIns="91425">
+            <a:noAutofit/>
+          </a:bodyPr>
+          <a:lstStyle/>
+          <a:p>
+            <a:pPr>
+              <a:spcBef>
+                <a:spcPts val="0"/>
+              </a:spcBef>
+              <a:buNone/>
+            </a:pPr>
+            <a:r>
+              <a:t/>
+            </a:r>
+            <a:endParaRPr/>
+          </a:p>
+        </p:txBody>
+      </p:sp>
+    </p:spTree>
+  </p:cSld>
+  <p:clrMapOvr>
+    <a:masterClrMapping/>
+  </p:clrMapOvr>
+</p:notes>
+</file>
+
+<file path=ppt/notesSlides/notesSlide36.xml><?xml version="1.0" encoding="utf-8"?>
+<p:notes xmlns:a="http://schemas.openxmlformats.org/drawingml/2006/main" xmlns:r="http://schemas.openxmlformats.org/officeDocument/2006/relationships" xmlns:mc="http://schemas.openxmlformats.org/markup-compatibility/2006" xmlns:mv="urn:schemas-microsoft-com:mac:vml" xmlns:p="http://schemas.openxmlformats.org/presentationml/2006/main" xmlns:c="http://schemas.openxmlformats.org/drawingml/2006/chart" xmlns:dgm="http://schemas.openxmlformats.org/drawingml/2006/diagram" xmlns:o="urn:schemas-microsoft-com:office:office" xmlns:v="urn:schemas-microsoft-com:vml" xmlns:pvml="urn:schemas-microsoft-com:office:powerpoint" xmlns:com="http://schemas.openxmlformats.org/drawingml/2006/compatibility" xmlns:p14="http://schemas.microsoft.com/office/powerpoint/2010/main" showMasterPhAnim="0" showMasterSp="0">
+  <p:cSld>
+    <p:spTree>
+      <p:nvGrpSpPr>
+        <p:cNvPr id="244" name="Shape 244"/>
+        <p:cNvGrpSpPr/>
+        <p:nvPr/>
+      </p:nvGrpSpPr>
+      <p:grpSpPr>
+        <a:xfrm>
+          <a:off x="0" y="0"/>
+          <a:ext cx="0" cy="0"/>
+          <a:chOff x="0" y="0"/>
+          <a:chExt cx="0" cy="0"/>
+        </a:xfrm>
+      </p:grpSpPr>
+      <p:sp>
+        <p:nvSpPr>
+          <p:cNvPr id="245" name="Shape 245"/>
+          <p:cNvSpPr/>
+          <p:nvPr>
+            <p:ph idx="2" type="sldImg"/>
+          </p:nvPr>
+        </p:nvSpPr>
+        <p:spPr>
+          <a:xfrm>
+            <a:off x="1143308" y="685800"/>
+            <a:ext cx="4572000" cy="3429000"/>
+          </a:xfrm>
+          <a:custGeom>
+            <a:pathLst>
+              <a:path extrusionOk="0" h="120000" w="120000">
+                <a:moveTo>
+                  <a:pt x="0" y="0"/>
+                </a:moveTo>
+                <a:lnTo>
+                  <a:pt x="120000" y="0"/>
+                </a:lnTo>
+                <a:lnTo>
+                  <a:pt x="120000" y="120000"/>
+                </a:lnTo>
+                <a:lnTo>
+                  <a:pt x="0" y="120000"/>
+                </a:lnTo>
+                <a:close/>
+              </a:path>
+            </a:pathLst>
+          </a:custGeom>
+          <a:noFill/>
+          <a:ln cap="flat" cmpd="sng" w="9525">
+            <a:solidFill>
+              <a:srgbClr val="000000"/>
+            </a:solidFill>
+            <a:prstDash val="solid"/>
+            <a:round/>
+            <a:headEnd len="med" w="med" type="none"/>
+            <a:tailEnd len="med" w="med" type="none"/>
+          </a:ln>
+        </p:spPr>
+      </p:sp>
+      <p:sp>
+        <p:nvSpPr>
+          <p:cNvPr id="246" name="Shape 246"/>
+          <p:cNvSpPr txBox="1"/>
+          <p:nvPr>
+            <p:ph idx="1" type="body"/>
+          </p:nvPr>
+        </p:nvSpPr>
+        <p:spPr>
+          <a:xfrm>
+            <a:off x="685800" y="4343400"/>
+            <a:ext cx="5486399" cy="4114800"/>
+          </a:xfrm>
+          <a:prstGeom prst="rect">
+            <a:avLst/>
+          </a:prstGeom>
+        </p:spPr>
+        <p:txBody>
+          <a:bodyPr anchorCtr="0" anchor="t" bIns="91425" lIns="91425" rIns="91425" tIns="91425">
+            <a:noAutofit/>
+          </a:bodyPr>
+          <a:lstStyle/>
+          <a:p>
+            <a:pPr lvl="0" rtl="0">
+              <a:spcBef>
+                <a:spcPts val="0"/>
+              </a:spcBef>
+              <a:buNone/>
+            </a:pPr>
+            <a:r>
+              <a:t/>
+            </a:r>
+            <a:endParaRPr/>
+          </a:p>
+        </p:txBody>
+      </p:sp>
+    </p:spTree>
+  </p:cSld>
+  <p:clrMapOvr>
+    <a:masterClrMapping/>
+  </p:clrMapOvr>
+</p:notes>
+</file>
+
+<file path=ppt/notesSlides/notesSlide37.xml><?xml version="1.0" encoding="utf-8"?>
+<p:notes xmlns:a="http://schemas.openxmlformats.org/drawingml/2006/main" xmlns:r="http://schemas.openxmlformats.org/officeDocument/2006/relationships" xmlns:mc="http://schemas.openxmlformats.org/markup-compatibility/2006" xmlns:mv="urn:schemas-microsoft-com:mac:vml" xmlns:p="http://schemas.openxmlformats.org/presentationml/2006/main" xmlns:c="http://schemas.openxmlformats.org/drawingml/2006/chart" xmlns:dgm="http://schemas.openxmlformats.org/drawingml/2006/diagram" xmlns:o="urn:schemas-microsoft-com:office:office" xmlns:v="urn:schemas-microsoft-com:vml" xmlns:pvml="urn:schemas-microsoft-com:office:powerpoint" xmlns:com="http://schemas.openxmlformats.org/drawingml/2006/compatibility" xmlns:p14="http://schemas.microsoft.com/office/powerpoint/2010/main" showMasterPhAnim="0" showMasterSp="0">
+  <p:cSld>
+    <p:spTree>
+      <p:nvGrpSpPr>
+        <p:cNvPr id="250" name="Shape 250"/>
+        <p:cNvGrpSpPr/>
+        <p:nvPr/>
+      </p:nvGrpSpPr>
+      <p:grpSpPr>
+        <a:xfrm>
+          <a:off x="0" y="0"/>
+          <a:ext cx="0" cy="0"/>
+          <a:chOff x="0" y="0"/>
+          <a:chExt cx="0" cy="0"/>
+        </a:xfrm>
+      </p:grpSpPr>
+      <p:sp>
+        <p:nvSpPr>
+          <p:cNvPr id="251" name="Shape 251"/>
+          <p:cNvSpPr/>
+          <p:nvPr>
+            <p:ph idx="2" type="sldImg"/>
+          </p:nvPr>
+        </p:nvSpPr>
+        <p:spPr>
+          <a:xfrm>
+            <a:off x="1143300" y="685800"/>
+            <a:ext cx="4572000" cy="3429000"/>
+          </a:xfrm>
+          <a:custGeom>
+            <a:pathLst>
+              <a:path extrusionOk="0" h="120000" w="120000">
+                <a:moveTo>
+                  <a:pt x="0" y="0"/>
+                </a:moveTo>
+                <a:lnTo>
+                  <a:pt x="120000" y="0"/>
+                </a:lnTo>
+                <a:lnTo>
+                  <a:pt x="120000" y="120000"/>
+                </a:lnTo>
+                <a:lnTo>
+                  <a:pt x="0" y="120000"/>
+                </a:lnTo>
+                <a:close/>
+              </a:path>
+            </a:pathLst>
+          </a:custGeom>
+          <a:noFill/>
+          <a:ln cap="flat" cmpd="sng" w="9525">
+            <a:solidFill>
+              <a:srgbClr val="000000"/>
+            </a:solidFill>
+            <a:prstDash val="solid"/>
+            <a:round/>
+            <a:headEnd len="med" w="med" type="none"/>
+            <a:tailEnd len="med" w="med" type="none"/>
+          </a:ln>
+        </p:spPr>
+      </p:sp>
+      <p:sp>
+        <p:nvSpPr>
+          <p:cNvPr id="252" name="Shape 252"/>
+          <p:cNvSpPr txBox="1"/>
+          <p:nvPr>
+            <p:ph idx="1" type="body"/>
+          </p:nvPr>
+        </p:nvSpPr>
+        <p:spPr>
+          <a:xfrm>
+            <a:off x="685800" y="4343400"/>
+            <a:ext cx="5486399" cy="4114800"/>
+          </a:xfrm>
+          <a:prstGeom prst="rect">
+            <a:avLst/>
+          </a:prstGeom>
+          <a:noFill/>
+          <a:ln>
+            <a:noFill/>
+          </a:ln>
+        </p:spPr>
+        <p:txBody>
+          <a:bodyPr anchorCtr="0" anchor="t" bIns="91425" lIns="91425" rIns="91425" tIns="91425">
+            <a:noAutofit/>
+          </a:bodyPr>
+          <a:lstStyle/>
+          <a:p>
+            <a:pPr indent="0" lvl="0" marL="0" marR="0" rtl="0" algn="l">
+              <a:spcBef>
+                <a:spcPts val="0"/>
+              </a:spcBef>
+              <a:buClr>
+                <a:schemeClr val="dk1"/>
+              </a:buClr>
+              <a:buFont typeface="Arial"/>
+              <a:buNone/>
+            </a:pPr>
+            <a:r>
+              <a:t/>
+            </a:r>
+            <a:endParaRPr b="0" baseline="0" i="0" sz="1100" u="none" cap="none" strike="noStrike">
+              <a:solidFill>
+                <a:schemeClr val="dk1"/>
+              </a:solidFill>
+              <a:latin typeface="Arial"/>
+              <a:ea typeface="Arial"/>
+              <a:cs typeface="Arial"/>
+              <a:sym typeface="Arial"/>
+            </a:endParaRPr>
+          </a:p>
+        </p:txBody>
+      </p:sp>
+    </p:spTree>
+  </p:cSld>
+  <p:clrMapOvr>
+    <a:masterClrMapping/>
+  </p:clrMapOvr>
+</p:notes>
+</file>
+
+<file path=ppt/notesSlides/notesSlide38.xml><?xml version="1.0" encoding="utf-8"?>
+<p:notes xmlns:a="http://schemas.openxmlformats.org/drawingml/2006/main" xmlns:r="http://schemas.openxmlformats.org/officeDocument/2006/relationships" xmlns:mc="http://schemas.openxmlformats.org/markup-compatibility/2006" xmlns:mv="urn:schemas-microsoft-com:mac:vml" xmlns:p="http://schemas.openxmlformats.org/presentationml/2006/main" xmlns:c="http://schemas.openxmlformats.org/drawingml/2006/chart" xmlns:dgm="http://schemas.openxmlformats.org/drawingml/2006/diagram" xmlns:o="urn:schemas-microsoft-com:office:office" xmlns:v="urn:schemas-microsoft-com:vml" xmlns:pvml="urn:schemas-microsoft-com:office:powerpoint" xmlns:com="http://schemas.openxmlformats.org/drawingml/2006/compatibility" xmlns:p14="http://schemas.microsoft.com/office/powerpoint/2010/main" showMasterPhAnim="0" showMasterSp="0">
+  <p:cSld>
+    <p:spTree>
+      <p:nvGrpSpPr>
+        <p:cNvPr id="256" name="Shape 256"/>
+        <p:cNvGrpSpPr/>
+        <p:nvPr/>
+      </p:nvGrpSpPr>
+      <p:grpSpPr>
+        <a:xfrm>
+          <a:off x="0" y="0"/>
+          <a:ext cx="0" cy="0"/>
+          <a:chOff x="0" y="0"/>
+          <a:chExt cx="0" cy="0"/>
+        </a:xfrm>
+      </p:grpSpPr>
+      <p:sp>
+        <p:nvSpPr>
+          <p:cNvPr id="257" name="Shape 257"/>
+          <p:cNvSpPr/>
+          <p:nvPr>
+            <p:ph idx="2" type="sldImg"/>
+          </p:nvPr>
+        </p:nvSpPr>
+        <p:spPr>
+          <a:xfrm>
+            <a:off x="1143308" y="685800"/>
+            <a:ext cx="4572000" cy="3429000"/>
+          </a:xfrm>
+          <a:custGeom>
+            <a:pathLst>
+              <a:path extrusionOk="0" h="120000" w="120000">
+                <a:moveTo>
+                  <a:pt x="0" y="0"/>
+                </a:moveTo>
+                <a:lnTo>
+                  <a:pt x="120000" y="0"/>
+                </a:lnTo>
+                <a:lnTo>
+                  <a:pt x="120000" y="120000"/>
+                </a:lnTo>
+                <a:lnTo>
+                  <a:pt x="0" y="120000"/>
+                </a:lnTo>
+                <a:close/>
+              </a:path>
+            </a:pathLst>
+          </a:custGeom>
+          <a:noFill/>
+          <a:ln cap="flat" cmpd="sng" w="9525">
+            <a:solidFill>
+              <a:srgbClr val="000000"/>
+            </a:solidFill>
+            <a:prstDash val="solid"/>
+            <a:round/>
+            <a:headEnd len="med" w="med" type="none"/>
+            <a:tailEnd len="med" w="med" type="none"/>
+          </a:ln>
+        </p:spPr>
+      </p:sp>
+      <p:sp>
+        <p:nvSpPr>
+          <p:cNvPr id="258" name="Shape 258"/>
           <p:cNvSpPr txBox="1"/>
           <p:nvPr>
             <p:ph idx="1" type="body"/>
@@ -5125,6 +5549,9 @@
           <a:bodyPr anchorCtr="0" anchor="t" bIns="91425" lIns="91425" rIns="91425" tIns="91425"/>
           <a:lstStyle>
             <a:lvl1pPr rtl="0">
+              <a:lnSpc>
+                <a:spcPct val="150000"/>
+              </a:lnSpc>
               <a:spcBef>
                 <a:spcPts val="0"/>
               </a:spcBef>
@@ -5138,6 +5565,9 @@
               </a:defRPr>
             </a:lvl1pPr>
             <a:lvl2pPr rtl="0">
+              <a:lnSpc>
+                <a:spcPct val="150000"/>
+              </a:lnSpc>
               <a:spcBef>
                 <a:spcPts val="0"/>
               </a:spcBef>
@@ -5151,6 +5581,9 @@
               </a:defRPr>
             </a:lvl2pPr>
             <a:lvl3pPr rtl="0">
+              <a:lnSpc>
+                <a:spcPct val="150000"/>
+              </a:lnSpc>
               <a:spcBef>
                 <a:spcPts val="0"/>
               </a:spcBef>
@@ -5164,6 +5597,9 @@
               </a:defRPr>
             </a:lvl3pPr>
             <a:lvl4pPr rtl="0">
+              <a:lnSpc>
+                <a:spcPct val="150000"/>
+              </a:lnSpc>
               <a:spcBef>
                 <a:spcPts val="0"/>
               </a:spcBef>
@@ -5177,6 +5613,9 @@
               </a:defRPr>
             </a:lvl4pPr>
             <a:lvl5pPr rtl="0">
+              <a:lnSpc>
+                <a:spcPct val="150000"/>
+              </a:lnSpc>
               <a:spcBef>
                 <a:spcPts val="0"/>
               </a:spcBef>
@@ -5190,6 +5629,9 @@
               </a:defRPr>
             </a:lvl5pPr>
             <a:lvl6pPr rtl="0">
+              <a:lnSpc>
+                <a:spcPct val="150000"/>
+              </a:lnSpc>
               <a:spcBef>
                 <a:spcPts val="0"/>
               </a:spcBef>
@@ -5201,6 +5643,9 @@
               </a:defRPr>
             </a:lvl6pPr>
             <a:lvl7pPr rtl="0">
+              <a:lnSpc>
+                <a:spcPct val="150000"/>
+              </a:lnSpc>
               <a:spcBef>
                 <a:spcPts val="0"/>
               </a:spcBef>
@@ -5212,6 +5657,9 @@
               </a:defRPr>
             </a:lvl7pPr>
             <a:lvl8pPr rtl="0">
+              <a:lnSpc>
+                <a:spcPct val="150000"/>
+              </a:lnSpc>
               <a:spcBef>
                 <a:spcPts val="0"/>
               </a:spcBef>
@@ -5223,6 +5671,9 @@
               </a:defRPr>
             </a:lvl8pPr>
             <a:lvl9pPr rtl="0">
+              <a:lnSpc>
+                <a:spcPct val="150000"/>
+              </a:lnSpc>
               <a:spcBef>
                 <a:spcPts val="0"/>
               </a:spcBef>
@@ -18348,6 +18799,105 @@
           <p:cNvPr id="220" name="Shape 220"/>
           <p:cNvSpPr txBox="1"/>
           <p:nvPr>
+            <p:ph idx="1" type="body"/>
+          </p:nvPr>
+        </p:nvSpPr>
+        <p:spPr>
+          <a:xfrm>
+            <a:off x="471050" y="1544587"/>
+            <a:ext cx="8176500" cy="4699200"/>
+          </a:xfrm>
+          <a:prstGeom prst="rect">
+            <a:avLst/>
+          </a:prstGeom>
+        </p:spPr>
+        <p:txBody>
+          <a:bodyPr anchorCtr="0" anchor="t" bIns="91425" lIns="91425" rIns="91425" tIns="91425">
+            <a:noAutofit/>
+          </a:bodyPr>
+          <a:lstStyle/>
+          <a:p>
+            <a:pPr indent="-228600" lvl="0" marL="457200" rtl="0">
+              <a:lnSpc>
+                <a:spcPct val="150000"/>
+              </a:lnSpc>
+              <a:spcBef>
+                <a:spcPts val="0"/>
+              </a:spcBef>
+              <a:buChar char="●"/>
+            </a:pPr>
+            <a:r>
+              <a:rPr lang="en-GB"/>
+              <a:t>access elements without knowing the underlying structure of the object</a:t>
+            </a:r>
+          </a:p>
+          <a:p>
+            <a:pPr indent="-228600" lvl="0" marL="457200" rtl="0">
+              <a:lnSpc>
+                <a:spcPct val="150000"/>
+              </a:lnSpc>
+              <a:spcBef>
+                <a:spcPts val="0"/>
+              </a:spcBef>
+              <a:buChar char="●"/>
+            </a:pPr>
+            <a:r>
+              <a:rPr lang="en-GB"/>
+              <a:t>effectively loop over a object collection  </a:t>
+            </a:r>
+          </a:p>
+          <a:p>
+            <a:pPr indent="-228600" lvl="0" marL="457200" rtl="0">
+              <a:lnSpc>
+                <a:spcPct val="150000"/>
+              </a:lnSpc>
+              <a:spcBef>
+                <a:spcPts val="0"/>
+              </a:spcBef>
+              <a:buChar char="●"/>
+            </a:pPr>
+            <a:r>
+              <a:rPr lang="en-GB"/>
+              <a:t>object store as list, trees or more complex structures</a:t>
+            </a:r>
+          </a:p>
+          <a:p>
+            <a:pPr indent="-228600" lvl="0" marL="457200" rtl="0">
+              <a:lnSpc>
+                <a:spcPct val="150000"/>
+              </a:lnSpc>
+              <a:spcBef>
+                <a:spcPts val="0"/>
+              </a:spcBef>
+              <a:buChar char="●"/>
+            </a:pPr>
+            <a:r>
+              <a:rPr lang="en-GB"/>
+              <a:t>many language have build in iterator, but not JavaScript</a:t>
+            </a:r>
+          </a:p>
+          <a:p>
+            <a:pPr indent="-228600" lvl="0" marL="457200">
+              <a:lnSpc>
+                <a:spcPct val="150000"/>
+              </a:lnSpc>
+              <a:spcBef>
+                <a:spcPts val="0"/>
+              </a:spcBef>
+              <a:buChar char="●"/>
+            </a:pPr>
+            <a:r>
+              <a:rPr lang="en-GB"/>
+              <a:t>Iterator is the “secretary” </a:t>
+            </a:r>
+          </a:p>
+        </p:txBody>
+      </p:sp>
+      <p:sp>
+        <p:nvSpPr>
+          <p:cNvPr id="221" name="Shape 221"/>
+          <p:cNvSpPr txBox="1"/>
+          <p:nvPr>
             <p:ph type="title"/>
           </p:nvPr>
         </p:nvSpPr>
@@ -18359,10 +18909,6 @@
           <a:prstGeom prst="rect">
             <a:avLst/>
           </a:prstGeom>
-          <a:noFill/>
-          <a:ln>
-            <a:noFill/>
-          </a:ln>
         </p:spPr>
         <p:txBody>
           <a:bodyPr anchorCtr="0" anchor="t" bIns="91425" lIns="91425" rIns="91425" tIns="91425">
@@ -18370,356 +18916,16 @@
           </a:bodyPr>
           <a:lstStyle/>
           <a:p>
-            <a:pPr indent="0" lvl="0" marL="0" marR="0" rtl="0" algn="l">
-              <a:lnSpc>
-                <a:spcPct val="150000"/>
-              </a:lnSpc>
-              <a:spcBef>
-                <a:spcPts val="0"/>
-              </a:spcBef>
-              <a:spcAft>
-                <a:spcPts val="0"/>
-              </a:spcAft>
-              <a:buClr>
-                <a:srgbClr val="000000"/>
-              </a:buClr>
-              <a:buSzPct val="25000"/>
-              <a:buFont typeface="Helvetica Neue"/>
-              <a:buNone/>
-            </a:pPr>
-            <a:r>
-              <a:rPr b="1" baseline="0" i="0" lang="en-GB" sz="3600" u="none" cap="none" strike="noStrike">
-                <a:solidFill>
-                  <a:srgbClr val="000000"/>
-                </a:solidFill>
-                <a:latin typeface="Helvetica Neue"/>
-                <a:ea typeface="Helvetica Neue"/>
-                <a:cs typeface="Helvetica Neue"/>
-                <a:sym typeface="Helvetica Neue"/>
-                <a:rtl val="0"/>
-              </a:rPr>
-              <a:t>Sources</a:t>
-            </a:r>
-          </a:p>
-          <a:p>
-            <a:pPr indent="0" lvl="0" marL="0" marR="0" rtl="0" algn="l">
-              <a:lnSpc>
-                <a:spcPct val="150000"/>
-              </a:lnSpc>
-              <a:spcBef>
-                <a:spcPts val="0"/>
-              </a:spcBef>
-              <a:spcAft>
-                <a:spcPts val="0"/>
-              </a:spcAft>
-              <a:buClr>
-                <a:srgbClr val="000000"/>
-              </a:buClr>
-              <a:buFont typeface="Arial"/>
-              <a:buNone/>
-            </a:pPr>
-            <a:r>
-              <a:t/>
-            </a:r>
-            <a:endParaRPr b="1" baseline="0" i="0" sz="3600" u="none" cap="none" strike="noStrike">
-              <a:solidFill>
-                <a:srgbClr val="000000"/>
-              </a:solidFill>
-              <a:latin typeface="Helvetica Neue"/>
-              <a:ea typeface="Helvetica Neue"/>
-              <a:cs typeface="Helvetica Neue"/>
-              <a:sym typeface="Helvetica Neue"/>
-              <a:rtl val="0"/>
-            </a:endParaRPr>
-          </a:p>
-        </p:txBody>
-      </p:sp>
-      <p:sp>
-        <p:nvSpPr>
-          <p:cNvPr id="221" name="Shape 221"/>
-          <p:cNvSpPr txBox="1"/>
-          <p:nvPr>
-            <p:ph idx="1" type="body"/>
-          </p:nvPr>
-        </p:nvSpPr>
-        <p:spPr>
-          <a:xfrm>
-            <a:off x="471050" y="1544587"/>
-            <a:ext cx="8176500" cy="4699200"/>
-          </a:xfrm>
-          <a:prstGeom prst="rect">
-            <a:avLst/>
-          </a:prstGeom>
-          <a:noFill/>
-          <a:ln>
-            <a:noFill/>
-          </a:ln>
-        </p:spPr>
-        <p:txBody>
-          <a:bodyPr anchorCtr="0" anchor="t" bIns="91425" lIns="91425" rIns="91425" tIns="91425">
-            <a:noAutofit/>
-          </a:bodyPr>
-          <a:lstStyle/>
-          <a:p>
-            <a:pPr indent="0" lvl="0" marL="0" marR="0" rtl="0" algn="l">
-              <a:lnSpc>
-                <a:spcPct val="180000"/>
-              </a:lnSpc>
-              <a:spcBef>
-                <a:spcPts val="0"/>
-              </a:spcBef>
-              <a:spcAft>
-                <a:spcPts val="0"/>
-              </a:spcAft>
-              <a:buClr>
-                <a:srgbClr val="000000"/>
-              </a:buClr>
-              <a:buSzPct val="25000"/>
-              <a:buFont typeface="Arial"/>
-              <a:buNone/>
-            </a:pPr>
-            <a:r>
-              <a:rPr b="0" baseline="0" i="0" lang="en-GB" sz="1400" u="sng" cap="none" strike="noStrike">
-                <a:solidFill>
-                  <a:schemeClr val="hlink"/>
-                </a:solidFill>
-                <a:latin typeface="Helvetica Neue"/>
-                <a:ea typeface="Helvetica Neue"/>
-                <a:cs typeface="Helvetica Neue"/>
-                <a:sym typeface="Helvetica Neue"/>
-                <a:hlinkClick r:id="rId3"/>
-                <a:rtl val="0"/>
-              </a:rPr>
-              <a:t>http://www.dofactory.com/javascript/design-patterns</a:t>
-            </a:r>
-          </a:p>
-          <a:p>
-            <a:pPr indent="0" lvl="0" marL="0" marR="0" rtl="0" algn="l">
-              <a:lnSpc>
-                <a:spcPct val="180000"/>
-              </a:lnSpc>
-              <a:spcBef>
-                <a:spcPts val="0"/>
-              </a:spcBef>
-              <a:spcAft>
-                <a:spcPts val="0"/>
-              </a:spcAft>
-              <a:buClr>
-                <a:srgbClr val="000000"/>
-              </a:buClr>
-              <a:buSzPct val="25000"/>
-              <a:buFont typeface="Arial"/>
-              <a:buNone/>
-            </a:pPr>
-            <a:r>
-              <a:rPr b="0" baseline="0" i="0" lang="en-GB" sz="1400" u="sng" cap="none" strike="noStrike">
-                <a:solidFill>
-                  <a:schemeClr val="hlink"/>
-                </a:solidFill>
-                <a:latin typeface="Helvetica Neue"/>
-                <a:ea typeface="Helvetica Neue"/>
-                <a:cs typeface="Helvetica Neue"/>
-                <a:sym typeface="Helvetica Neue"/>
-                <a:hlinkClick r:id="rId4"/>
-                <a:rtl val="0"/>
-              </a:rPr>
-              <a:t>https://sourcemaking.com/design_patterns</a:t>
-            </a:r>
-          </a:p>
-          <a:p>
-            <a:pPr indent="0" lvl="0" marL="0" marR="0" rtl="0" algn="l">
-              <a:lnSpc>
-                <a:spcPct val="180000"/>
-              </a:lnSpc>
-              <a:spcBef>
-                <a:spcPts val="0"/>
-              </a:spcBef>
-              <a:spcAft>
-                <a:spcPts val="0"/>
-              </a:spcAft>
-              <a:buClr>
-                <a:srgbClr val="000000"/>
-              </a:buClr>
-              <a:buSzPct val="25000"/>
-              <a:buFont typeface="Arial"/>
-              <a:buNone/>
-            </a:pPr>
-            <a:r>
-              <a:rPr b="0" baseline="0" i="0" lang="en-GB" sz="1400" u="sng" cap="none" strike="noStrike">
-                <a:solidFill>
-                  <a:schemeClr val="hlink"/>
-                </a:solidFill>
-                <a:latin typeface="Helvetica Neue"/>
-                <a:ea typeface="Helvetica Neue"/>
-                <a:cs typeface="Helvetica Neue"/>
-                <a:sym typeface="Helvetica Neue"/>
-                <a:hlinkClick r:id="rId5"/>
-                <a:rtl val="0"/>
-              </a:rPr>
-              <a:t>https://en.wikipedia.org/wiki/Command_pattern</a:t>
-            </a:r>
-          </a:p>
-          <a:p>
-            <a:pPr indent="0" lvl="0" marL="0" marR="0" rtl="0" algn="l">
-              <a:lnSpc>
-                <a:spcPct val="180000"/>
-              </a:lnSpc>
-              <a:spcBef>
-                <a:spcPts val="0"/>
-              </a:spcBef>
-              <a:spcAft>
-                <a:spcPts val="0"/>
-              </a:spcAft>
-              <a:buClr>
-                <a:srgbClr val="000000"/>
-              </a:buClr>
-              <a:buSzPct val="25000"/>
-              <a:buFont typeface="Arial"/>
-              <a:buNone/>
-            </a:pPr>
-            <a:r>
-              <a:rPr b="0" baseline="0" i="0" lang="en-GB" sz="1400" u="sng" cap="none" strike="noStrike">
-                <a:solidFill>
-                  <a:schemeClr val="hlink"/>
-                </a:solidFill>
-                <a:latin typeface="Helvetica Neue"/>
-                <a:ea typeface="Helvetica Neue"/>
-                <a:cs typeface="Helvetica Neue"/>
-                <a:sym typeface="Helvetica Neue"/>
-                <a:hlinkClick r:id="rId6"/>
-                <a:rtl val="0"/>
-              </a:rPr>
-              <a:t>https://de.wikipedia.org/wiki/Memento_%28Entwurfsmuster%29</a:t>
-            </a:r>
-          </a:p>
-          <a:p>
-            <a:pPr indent="0" lvl="0" marL="0" marR="0" rtl="0" algn="l">
-              <a:lnSpc>
-                <a:spcPct val="180000"/>
-              </a:lnSpc>
-              <a:spcBef>
-                <a:spcPts val="0"/>
-              </a:spcBef>
-              <a:spcAft>
-                <a:spcPts val="0"/>
-              </a:spcAft>
-              <a:buClr>
-                <a:srgbClr val="000000"/>
-              </a:buClr>
-              <a:buSzPct val="25000"/>
-              <a:buFont typeface="Arial"/>
-              <a:buNone/>
-            </a:pPr>
-            <a:r>
-              <a:rPr b="0" baseline="0" i="0" lang="en-GB" sz="1400" u="sng" cap="none" strike="noStrike">
-                <a:solidFill>
-                  <a:schemeClr val="hlink"/>
-                </a:solidFill>
-                <a:latin typeface="Helvetica Neue"/>
-                <a:ea typeface="Helvetica Neue"/>
-                <a:cs typeface="Helvetica Neue"/>
-                <a:sym typeface="Helvetica Neue"/>
-                <a:hlinkClick r:id="rId7"/>
-                <a:rtl val="0"/>
-              </a:rPr>
-              <a:t>https://en.wikipedia.org/wiki/Chain-of-responsibility_pattern</a:t>
-            </a:r>
-          </a:p>
-          <a:p>
-            <a:pPr indent="0" lvl="0" marL="0" marR="0" rtl="0" algn="l">
-              <a:lnSpc>
-                <a:spcPct val="180000"/>
-              </a:lnSpc>
-              <a:spcBef>
-                <a:spcPts val="0"/>
-              </a:spcBef>
-              <a:spcAft>
-                <a:spcPts val="0"/>
-              </a:spcAft>
-              <a:buClr>
-                <a:srgbClr val="000000"/>
-              </a:buClr>
-              <a:buSzPct val="25000"/>
-              <a:buFont typeface="Arial"/>
-              <a:buNone/>
-            </a:pPr>
-            <a:r>
-              <a:rPr b="0" baseline="0" i="0" lang="en-GB" sz="1400" u="sng" cap="none" strike="noStrike">
-                <a:solidFill>
-                  <a:schemeClr val="hlink"/>
-                </a:solidFill>
-                <a:latin typeface="Helvetica Neue"/>
-                <a:ea typeface="Helvetica Neue"/>
-                <a:cs typeface="Helvetica Neue"/>
-                <a:sym typeface="Helvetica Neue"/>
-                <a:hlinkClick r:id="rId8"/>
-                <a:rtl val="0"/>
-              </a:rPr>
-              <a:t>http://www.blackwasp.co.uk/DesignPatternsArticles.aspx</a:t>
-            </a:r>
-          </a:p>
-          <a:p>
-            <a:pPr indent="0" lvl="0" marL="0" marR="0" rtl="0" algn="l">
-              <a:lnSpc>
-                <a:spcPct val="180000"/>
-              </a:lnSpc>
-              <a:spcBef>
-                <a:spcPts val="0"/>
-              </a:spcBef>
-              <a:spcAft>
-                <a:spcPts val="0"/>
-              </a:spcAft>
-              <a:buClr>
-                <a:srgbClr val="000000"/>
-              </a:buClr>
-              <a:buSzPct val="25000"/>
-              <a:buFont typeface="Arial"/>
-              <a:buNone/>
-            </a:pPr>
-            <a:r>
-              <a:rPr b="0" baseline="0" i="0" lang="en-GB" sz="1400" u="none" cap="none" strike="noStrike">
-                <a:solidFill>
-                  <a:srgbClr val="000000"/>
-                </a:solidFill>
-                <a:latin typeface="Helvetica Neue"/>
-                <a:ea typeface="Helvetica Neue"/>
-                <a:cs typeface="Helvetica Neue"/>
-                <a:sym typeface="Helvetica Neue"/>
-                <a:rtl val="0"/>
-              </a:rPr>
-              <a:t>(Osmani, A. (2012). Learning JavaScript Design Patterns. O'Reilly Media, Inc.)</a:t>
-            </a:r>
-          </a:p>
-          <a:p>
-            <a:pPr indent="0" lvl="0" marL="0" marR="0" rtl="0" algn="l">
-              <a:lnSpc>
-                <a:spcPct val="100000"/>
-              </a:lnSpc>
-              <a:spcBef>
-                <a:spcPts val="0"/>
-              </a:spcBef>
-              <a:spcAft>
-                <a:spcPts val="0"/>
-              </a:spcAft>
-              <a:buClr>
-                <a:srgbClr val="000000"/>
-              </a:buClr>
-              <a:buFont typeface="Arial"/>
-              <a:buNone/>
-            </a:pPr>
-            <a:r>
-              <a:t/>
-            </a:r>
-            <a:endParaRPr b="0" baseline="0" i="0" sz="1400" u="none" cap="none" strike="noStrike">
-              <a:solidFill>
-                <a:srgbClr val="000000"/>
-              </a:solidFill>
-              <a:latin typeface="Arial"/>
-              <a:ea typeface="Arial"/>
-              <a:cs typeface="Arial"/>
-              <a:sym typeface="Arial"/>
-              <a:rtl val="0"/>
-            </a:endParaRPr>
+            <a:pPr>
+              <a:spcBef>
+                <a:spcPts val="0"/>
+              </a:spcBef>
+              <a:buNone/>
+            </a:pPr>
+            <a:r>
+              <a:rPr lang="en-GB"/>
+              <a:t>Iterator  </a:t>
+            </a:r>
           </a:p>
         </p:txBody>
       </p:sp>
@@ -18767,6 +18973,100 @@
           <a:prstGeom prst="rect">
             <a:avLst/>
           </a:prstGeom>
+        </p:spPr>
+        <p:txBody>
+          <a:bodyPr anchorCtr="0" anchor="t" bIns="91425" lIns="91425" rIns="91425" tIns="91425">
+            <a:noAutofit/>
+          </a:bodyPr>
+          <a:lstStyle/>
+          <a:p>
+            <a:pPr rtl="0">
+              <a:spcBef>
+                <a:spcPts val="0"/>
+              </a:spcBef>
+              <a:buNone/>
+            </a:pPr>
+            <a:r>
+              <a:rPr lang="en-GB"/>
+              <a:t>Client: </a:t>
+            </a:r>
+          </a:p>
+          <a:p>
+            <a:pPr rtl="0">
+              <a:spcBef>
+                <a:spcPts val="0"/>
+              </a:spcBef>
+              <a:buNone/>
+            </a:pPr>
+            <a:r>
+              <a:rPr lang="en-GB"/>
+              <a:t>Iterator: Interface with methods like first(), next(), hasNext()</a:t>
+            </a:r>
+          </a:p>
+          <a:p>
+            <a:pPr>
+              <a:spcBef>
+                <a:spcPts val="0"/>
+              </a:spcBef>
+              <a:buNone/>
+            </a:pPr>
+            <a:r>
+              <a:rPr lang="en-GB"/>
+              <a:t>Items: individual objects </a:t>
+            </a:r>
+          </a:p>
+        </p:txBody>
+      </p:sp>
+      <p:sp>
+        <p:nvSpPr>
+          <p:cNvPr id="227" name="Shape 227"/>
+          <p:cNvSpPr txBox="1"/>
+          <p:nvPr>
+            <p:ph type="title"/>
+          </p:nvPr>
+        </p:nvSpPr>
+        <p:spPr>
+          <a:xfrm>
+            <a:off x="461825" y="757368"/>
+            <a:ext cx="8344199" cy="723600"/>
+          </a:xfrm>
+          <a:prstGeom prst="rect">
+            <a:avLst/>
+          </a:prstGeom>
+        </p:spPr>
+        <p:txBody>
+          <a:bodyPr anchorCtr="0" anchor="t" bIns="91425" lIns="91425" rIns="91425" tIns="91425">
+            <a:noAutofit/>
+          </a:bodyPr>
+          <a:lstStyle/>
+          <a:p>
+            <a:pPr>
+              <a:spcBef>
+                <a:spcPts val="0"/>
+              </a:spcBef>
+              <a:buNone/>
+            </a:pPr>
+            <a:r>
+              <a:rPr lang="en-GB"/>
+              <a:t>Iterator - Participants</a:t>
+            </a:r>
+          </a:p>
+        </p:txBody>
+      </p:sp>
+      <p:sp>
+        <p:nvSpPr>
+          <p:cNvPr id="228" name="Shape 228"/>
+          <p:cNvSpPr txBox="1"/>
+          <p:nvPr/>
+        </p:nvSpPr>
+        <p:spPr>
+          <a:xfrm rot="-5400000">
+            <a:off x="6366274" y="3515542"/>
+            <a:ext cx="4856100" cy="298199"/>
+          </a:xfrm>
+          <a:prstGeom prst="rect">
+            <a:avLst/>
+          </a:prstGeom>
           <a:noFill/>
           <a:ln>
             <a:noFill/>
@@ -18780,6 +19080,438 @@
           <a:p>
             <a:pPr indent="0" lvl="0" marL="0" marR="0" rtl="0" algn="l">
               <a:lnSpc>
+                <a:spcPct val="100000"/>
+              </a:lnSpc>
+              <a:spcBef>
+                <a:spcPts val="0"/>
+              </a:spcBef>
+              <a:spcAft>
+                <a:spcPts val="0"/>
+              </a:spcAft>
+              <a:buClr>
+                <a:srgbClr val="000000"/>
+              </a:buClr>
+              <a:buSzPct val="25000"/>
+              <a:buFont typeface="Arial"/>
+              <a:buNone/>
+            </a:pPr>
+            <a:r>
+              <a:rPr lang="en-GB" sz="1000"/>
+              <a:t>http://www.dofactory.com/images/diagrams/javascript/javascript-iterator.jpg</a:t>
+            </a:r>
+          </a:p>
+        </p:txBody>
+      </p:sp>
+      <p:pic>
+        <p:nvPicPr>
+          <p:cNvPr id="229" name="Shape 229"/>
+          <p:cNvPicPr preferRelativeResize="0"/>
+          <p:nvPr/>
+        </p:nvPicPr>
+        <p:blipFill>
+          <a:blip r:embed="rId3">
+            <a:alphaModFix/>
+          </a:blip>
+          <a:stretch>
+            <a:fillRect/>
+          </a:stretch>
+        </p:blipFill>
+        <p:spPr>
+          <a:xfrm>
+            <a:off x="1973953" y="3273549"/>
+            <a:ext cx="5170700" cy="2819149"/>
+          </a:xfrm>
+          <a:prstGeom prst="rect">
+            <a:avLst/>
+          </a:prstGeom>
+          <a:noFill/>
+          <a:ln>
+            <a:noFill/>
+          </a:ln>
+        </p:spPr>
+      </p:pic>
+    </p:spTree>
+  </p:cSld>
+  <p:clrMapOvr>
+    <a:masterClrMapping/>
+  </p:clrMapOvr>
+  <p:transition spd="slow">
+    <p:cut/>
+  </p:transition>
+</p:sld>
+</file>
+
+<file path=ppt/slides/slide35.xml><?xml version="1.0" encoding="utf-8"?>
+<p:sld xmlns:a="http://schemas.openxmlformats.org/drawingml/2006/main" xmlns:r="http://schemas.openxmlformats.org/officeDocument/2006/relationships" xmlns:mc="http://schemas.openxmlformats.org/markup-compatibility/2006" xmlns:mv="urn:schemas-microsoft-com:mac:vml" xmlns:p="http://schemas.openxmlformats.org/presentationml/2006/main" xmlns:c="http://schemas.openxmlformats.org/drawingml/2006/chart" xmlns:dgm="http://schemas.openxmlformats.org/drawingml/2006/diagram" xmlns:o="urn:schemas-microsoft-com:office:office" xmlns:v="urn:schemas-microsoft-com:vml" xmlns:pvml="urn:schemas-microsoft-com:office:powerpoint" xmlns:com="http://schemas.openxmlformats.org/drawingml/2006/compatibility" xmlns:p14="http://schemas.microsoft.com/office/powerpoint/2010/main">
+  <p:cSld>
+    <p:spTree>
+      <p:nvGrpSpPr>
+        <p:cNvPr id="233" name="Shape 233"/>
+        <p:cNvGrpSpPr/>
+        <p:nvPr/>
+      </p:nvGrpSpPr>
+      <p:grpSpPr>
+        <a:xfrm>
+          <a:off x="0" y="0"/>
+          <a:ext cx="0" cy="0"/>
+          <a:chOff x="0" y="0"/>
+          <a:chExt cx="0" cy="0"/>
+        </a:xfrm>
+      </p:grpSpPr>
+      <p:sp>
+        <p:nvSpPr>
+          <p:cNvPr id="234" name="Shape 234"/>
+          <p:cNvSpPr txBox="1"/>
+          <p:nvPr>
+            <p:ph idx="1" type="body"/>
+          </p:nvPr>
+        </p:nvSpPr>
+        <p:spPr>
+          <a:xfrm>
+            <a:off x="471050" y="1544587"/>
+            <a:ext cx="8176500" cy="4699200"/>
+          </a:xfrm>
+          <a:prstGeom prst="rect">
+            <a:avLst/>
+          </a:prstGeom>
+        </p:spPr>
+        <p:txBody>
+          <a:bodyPr anchorCtr="0" anchor="t" bIns="91425" lIns="91425" rIns="91425" tIns="91425">
+            <a:noAutofit/>
+          </a:bodyPr>
+          <a:lstStyle/>
+          <a:p>
+            <a:pPr indent="-228600" lvl="0" marL="457200" rtl="0">
+              <a:spcBef>
+                <a:spcPts val="0"/>
+              </a:spcBef>
+              <a:buChar char="●"/>
+            </a:pPr>
+            <a:r>
+              <a:rPr lang="en-GB"/>
+              <a:t>Interchangeable set of algorithms </a:t>
+            </a:r>
+          </a:p>
+          <a:p>
+            <a:pPr indent="-228600" lvl="0" marL="457200" rtl="0">
+              <a:spcBef>
+                <a:spcPts val="0"/>
+              </a:spcBef>
+              <a:buChar char="●"/>
+            </a:pPr>
+            <a:r>
+              <a:rPr lang="en-GB"/>
+              <a:t>swapped out at runtime</a:t>
+            </a:r>
+          </a:p>
+          <a:p>
+            <a:pPr indent="-228600" lvl="0" marL="457200" rtl="0">
+              <a:spcBef>
+                <a:spcPts val="0"/>
+              </a:spcBef>
+              <a:buChar char="●"/>
+            </a:pPr>
+            <a:r>
+              <a:rPr lang="en-GB"/>
+              <a:t>minimizing coupling</a:t>
+            </a:r>
+          </a:p>
+          <a:p>
+            <a:pPr indent="-228600" lvl="0" marL="457200">
+              <a:spcBef>
+                <a:spcPts val="0"/>
+              </a:spcBef>
+              <a:buChar char="●"/>
+            </a:pPr>
+            <a:r>
+              <a:rPr lang="en-GB"/>
+              <a:t>option to hide implementation </a:t>
+            </a:r>
+          </a:p>
+        </p:txBody>
+      </p:sp>
+      <p:sp>
+        <p:nvSpPr>
+          <p:cNvPr id="235" name="Shape 235"/>
+          <p:cNvSpPr txBox="1"/>
+          <p:nvPr>
+            <p:ph type="title"/>
+          </p:nvPr>
+        </p:nvSpPr>
+        <p:spPr>
+          <a:xfrm>
+            <a:off x="461825" y="757368"/>
+            <a:ext cx="8344199" cy="723600"/>
+          </a:xfrm>
+          <a:prstGeom prst="rect">
+            <a:avLst/>
+          </a:prstGeom>
+        </p:spPr>
+        <p:txBody>
+          <a:bodyPr anchorCtr="0" anchor="t" bIns="91425" lIns="91425" rIns="91425" tIns="91425">
+            <a:noAutofit/>
+          </a:bodyPr>
+          <a:lstStyle/>
+          <a:p>
+            <a:pPr>
+              <a:spcBef>
+                <a:spcPts val="0"/>
+              </a:spcBef>
+              <a:buNone/>
+            </a:pPr>
+            <a:r>
+              <a:rPr lang="en-GB"/>
+              <a:t>Strategie </a:t>
+            </a:r>
+          </a:p>
+        </p:txBody>
+      </p:sp>
+    </p:spTree>
+  </p:cSld>
+  <p:clrMapOvr>
+    <a:masterClrMapping/>
+  </p:clrMapOvr>
+  <p:transition spd="slow">
+    <p:cut/>
+  </p:transition>
+</p:sld>
+</file>
+
+<file path=ppt/slides/slide36.xml><?xml version="1.0" encoding="utf-8"?>
+<p:sld xmlns:a="http://schemas.openxmlformats.org/drawingml/2006/main" xmlns:r="http://schemas.openxmlformats.org/officeDocument/2006/relationships" xmlns:mc="http://schemas.openxmlformats.org/markup-compatibility/2006" xmlns:mv="urn:schemas-microsoft-com:mac:vml" xmlns:p="http://schemas.openxmlformats.org/presentationml/2006/main" xmlns:c="http://schemas.openxmlformats.org/drawingml/2006/chart" xmlns:dgm="http://schemas.openxmlformats.org/drawingml/2006/diagram" xmlns:o="urn:schemas-microsoft-com:office:office" xmlns:v="urn:schemas-microsoft-com:vml" xmlns:pvml="urn:schemas-microsoft-com:office:powerpoint" xmlns:com="http://schemas.openxmlformats.org/drawingml/2006/compatibility" xmlns:p14="http://schemas.microsoft.com/office/powerpoint/2010/main">
+  <p:cSld>
+    <p:spTree>
+      <p:nvGrpSpPr>
+        <p:cNvPr id="239" name="Shape 239"/>
+        <p:cNvGrpSpPr/>
+        <p:nvPr/>
+      </p:nvGrpSpPr>
+      <p:grpSpPr>
+        <a:xfrm>
+          <a:off x="0" y="0"/>
+          <a:ext cx="0" cy="0"/>
+          <a:chOff x="0" y="0"/>
+          <a:chExt cx="0" cy="0"/>
+        </a:xfrm>
+      </p:grpSpPr>
+      <p:sp>
+        <p:nvSpPr>
+          <p:cNvPr id="240" name="Shape 240"/>
+          <p:cNvSpPr txBox="1"/>
+          <p:nvPr>
+            <p:ph idx="1" type="body"/>
+          </p:nvPr>
+        </p:nvSpPr>
+        <p:spPr>
+          <a:xfrm>
+            <a:off x="471050" y="1544587"/>
+            <a:ext cx="8176500" cy="4699200"/>
+          </a:xfrm>
+          <a:prstGeom prst="rect">
+            <a:avLst/>
+          </a:prstGeom>
+        </p:spPr>
+        <p:txBody>
+          <a:bodyPr anchorCtr="0" anchor="t" bIns="91425" lIns="91425" rIns="91425" tIns="91425">
+            <a:noAutofit/>
+          </a:bodyPr>
+          <a:lstStyle/>
+          <a:p>
+            <a:pPr rtl="0">
+              <a:spcBef>
+                <a:spcPts val="0"/>
+              </a:spcBef>
+              <a:buNone/>
+            </a:pPr>
+            <a:r>
+              <a:rPr lang="en-GB"/>
+              <a:t>Context: reference to the current Strategy, the option to change it and to calculate the “cost” of each strategy </a:t>
+            </a:r>
+          </a:p>
+          <a:p>
+            <a:pPr lvl="0" rtl="0">
+              <a:spcBef>
+                <a:spcPts val="0"/>
+              </a:spcBef>
+              <a:buNone/>
+            </a:pPr>
+            <a:r>
+              <a:rPr lang="en-GB"/>
+              <a:t>Strategy: implementation of different option for a task</a:t>
+            </a:r>
+          </a:p>
+        </p:txBody>
+      </p:sp>
+      <p:sp>
+        <p:nvSpPr>
+          <p:cNvPr id="241" name="Shape 241"/>
+          <p:cNvSpPr txBox="1"/>
+          <p:nvPr>
+            <p:ph type="title"/>
+          </p:nvPr>
+        </p:nvSpPr>
+        <p:spPr>
+          <a:xfrm>
+            <a:off x="461825" y="757368"/>
+            <a:ext cx="8344199" cy="723600"/>
+          </a:xfrm>
+          <a:prstGeom prst="rect">
+            <a:avLst/>
+          </a:prstGeom>
+        </p:spPr>
+        <p:txBody>
+          <a:bodyPr anchorCtr="0" anchor="t" bIns="91425" lIns="91425" rIns="91425" tIns="91425">
+            <a:noAutofit/>
+          </a:bodyPr>
+          <a:lstStyle/>
+          <a:p>
+            <a:pPr lvl="0" rtl="0">
+              <a:spcBef>
+                <a:spcPts val="0"/>
+              </a:spcBef>
+              <a:buNone/>
+            </a:pPr>
+            <a:r>
+              <a:rPr lang="en-GB"/>
+              <a:t>Strategie - Participants  </a:t>
+            </a:r>
+          </a:p>
+        </p:txBody>
+      </p:sp>
+      <p:sp>
+        <p:nvSpPr>
+          <p:cNvPr id="242" name="Shape 242"/>
+          <p:cNvSpPr txBox="1"/>
+          <p:nvPr/>
+        </p:nvSpPr>
+        <p:spPr>
+          <a:xfrm rot="-5400000">
+            <a:off x="6366274" y="3515542"/>
+            <a:ext cx="4856100" cy="298199"/>
+          </a:xfrm>
+          <a:prstGeom prst="rect">
+            <a:avLst/>
+          </a:prstGeom>
+          <a:noFill/>
+          <a:ln>
+            <a:noFill/>
+          </a:ln>
+        </p:spPr>
+        <p:txBody>
+          <a:bodyPr anchorCtr="0" anchor="t" bIns="91425" lIns="91425" rIns="91425" tIns="91425">
+            <a:noAutofit/>
+          </a:bodyPr>
+          <a:lstStyle/>
+          <a:p>
+            <a:pPr indent="0" lvl="0" marL="0" marR="0" rtl="0" algn="l">
+              <a:lnSpc>
+                <a:spcPct val="100000"/>
+              </a:lnSpc>
+              <a:spcBef>
+                <a:spcPts val="0"/>
+              </a:spcBef>
+              <a:spcAft>
+                <a:spcPts val="0"/>
+              </a:spcAft>
+              <a:buClr>
+                <a:srgbClr val="000000"/>
+              </a:buClr>
+              <a:buSzPct val="25000"/>
+              <a:buFont typeface="Arial"/>
+              <a:buNone/>
+            </a:pPr>
+            <a:r>
+              <a:rPr lang="en-GB" sz="1000"/>
+              <a:t>http://www.dofactory.com/images/diagrams/javascript/javascript-strategy.jpg</a:t>
+            </a:r>
+          </a:p>
+        </p:txBody>
+      </p:sp>
+      <p:pic>
+        <p:nvPicPr>
+          <p:cNvPr id="243" name="Shape 243"/>
+          <p:cNvPicPr preferRelativeResize="0"/>
+          <p:nvPr/>
+        </p:nvPicPr>
+        <p:blipFill>
+          <a:blip r:embed="rId3">
+            <a:alphaModFix/>
+          </a:blip>
+          <a:stretch>
+            <a:fillRect/>
+          </a:stretch>
+        </p:blipFill>
+        <p:spPr>
+          <a:xfrm>
+            <a:off x="2613154" y="3080079"/>
+            <a:ext cx="3917705" cy="3012624"/>
+          </a:xfrm>
+          <a:prstGeom prst="rect">
+            <a:avLst/>
+          </a:prstGeom>
+          <a:noFill/>
+          <a:ln>
+            <a:noFill/>
+          </a:ln>
+        </p:spPr>
+      </p:pic>
+    </p:spTree>
+  </p:cSld>
+  <p:clrMapOvr>
+    <a:masterClrMapping/>
+  </p:clrMapOvr>
+  <p:transition spd="slow">
+    <p:cut/>
+  </p:transition>
+</p:sld>
+</file>
+
+<file path=ppt/slides/slide37.xml><?xml version="1.0" encoding="utf-8"?>
+<p:sld xmlns:a="http://schemas.openxmlformats.org/drawingml/2006/main" xmlns:r="http://schemas.openxmlformats.org/officeDocument/2006/relationships" xmlns:mc="http://schemas.openxmlformats.org/markup-compatibility/2006" xmlns:mv="urn:schemas-microsoft-com:mac:vml" xmlns:p="http://schemas.openxmlformats.org/presentationml/2006/main" xmlns:c="http://schemas.openxmlformats.org/drawingml/2006/chart" xmlns:dgm="http://schemas.openxmlformats.org/drawingml/2006/diagram" xmlns:o="urn:schemas-microsoft-com:office:office" xmlns:v="urn:schemas-microsoft-com:vml" xmlns:pvml="urn:schemas-microsoft-com:office:powerpoint" xmlns:com="http://schemas.openxmlformats.org/drawingml/2006/compatibility" xmlns:p14="http://schemas.microsoft.com/office/powerpoint/2010/main">
+  <p:cSld>
+    <p:spTree>
+      <p:nvGrpSpPr>
+        <p:cNvPr id="247" name="Shape 247"/>
+        <p:cNvGrpSpPr/>
+        <p:nvPr/>
+      </p:nvGrpSpPr>
+      <p:grpSpPr>
+        <a:xfrm>
+          <a:off x="0" y="0"/>
+          <a:ext cx="0" cy="0"/>
+          <a:chOff x="0" y="0"/>
+          <a:chExt cx="0" cy="0"/>
+        </a:xfrm>
+      </p:grpSpPr>
+      <p:sp>
+        <p:nvSpPr>
+          <p:cNvPr id="248" name="Shape 248"/>
+          <p:cNvSpPr txBox="1"/>
+          <p:nvPr>
+            <p:ph type="title"/>
+          </p:nvPr>
+        </p:nvSpPr>
+        <p:spPr>
+          <a:xfrm>
+            <a:off x="461825" y="757368"/>
+            <a:ext cx="8344199" cy="723600"/>
+          </a:xfrm>
+          <a:prstGeom prst="rect">
+            <a:avLst/>
+          </a:prstGeom>
+          <a:noFill/>
+          <a:ln>
+            <a:noFill/>
+          </a:ln>
+        </p:spPr>
+        <p:txBody>
+          <a:bodyPr anchorCtr="0" anchor="t" bIns="91425" lIns="91425" rIns="91425" tIns="91425">
+            <a:noAutofit/>
+          </a:bodyPr>
+          <a:lstStyle/>
+          <a:p>
+            <a:pPr indent="0" lvl="0" marL="0" marR="0" rtl="0" algn="l">
+              <a:lnSpc>
                 <a:spcPct val="150000"/>
               </a:lnSpc>
               <a:spcBef>
@@ -18796,7 +19528,7 @@
               <a:buNone/>
             </a:pPr>
             <a:r>
-              <a:rPr b="0" baseline="0" i="0" lang="en-GB" sz="1400" u="none" cap="none" strike="noStrike">
+              <a:rPr b="1" baseline="0" i="0" lang="en-GB" sz="3600" u="none" cap="none" strike="noStrike">
                 <a:solidFill>
                   <a:srgbClr val="000000"/>
                 </a:solidFill>
@@ -18806,21 +19538,7 @@
                 <a:sym typeface="Helvetica Neue"/>
                 <a:rtl val="0"/>
               </a:rPr>
-              <a:t>Spaceinvader:</a:t>
-            </a:r>
-            <a:r>
-              <a:rPr b="0" baseline="0" i="0" lang="en-GB" sz="1400" u="sng" cap="none" strike="noStrike">
-                <a:solidFill>
-                  <a:schemeClr val="hlink"/>
-                </a:solidFill>
-                <a:latin typeface="Helvetica Neue"/>
-                <a:ea typeface="Helvetica Neue"/>
-                <a:cs typeface="Helvetica Neue"/>
-                <a:sym typeface="Helvetica Neue"/>
-                <a:hlinkClick r:id="rId3"/>
-                <a:rtl val="0"/>
-              </a:rPr>
-              <a:t> https://github.com/dwmkerr/spaceinvaders</a:t>
+              <a:t>Sources</a:t>
             </a:r>
           </a:p>
           <a:p>
@@ -18837,105 +19555,13 @@
               <a:buClr>
                 <a:srgbClr val="000000"/>
               </a:buClr>
-              <a:buSzPct val="25000"/>
-              <a:buFont typeface="Helvetica Neue"/>
-              <a:buNone/>
-            </a:pPr>
-            <a:r>
-              <a:rPr b="0" baseline="0" i="0" lang="en-GB" sz="1400" u="none" cap="none" strike="noStrike">
-                <a:solidFill>
-                  <a:srgbClr val="000000"/>
-                </a:solidFill>
-                <a:latin typeface="Helvetica Neue"/>
-                <a:ea typeface="Helvetica Neue"/>
-                <a:cs typeface="Helvetica Neue"/>
-                <a:sym typeface="Helvetica Neue"/>
-                <a:rtl val="0"/>
-              </a:rPr>
-              <a:t>Tic Tac Toe:</a:t>
-            </a:r>
-            <a:r>
-              <a:rPr b="0" baseline="0" i="0" lang="en-GB" sz="1400" u="sng" cap="none" strike="noStrike">
-                <a:solidFill>
-                  <a:schemeClr val="hlink"/>
-                </a:solidFill>
-                <a:latin typeface="Helvetica Neue"/>
-                <a:ea typeface="Helvetica Neue"/>
-                <a:cs typeface="Helvetica Neue"/>
-                <a:sym typeface="Helvetica Neue"/>
-                <a:hlinkClick r:id="rId4"/>
-                <a:rtl val="0"/>
-              </a:rPr>
-              <a:t> https://github.com/negomi/tic-tac-toe</a:t>
-            </a:r>
-          </a:p>
-          <a:p>
-            <a:pPr indent="0" lvl="0" marL="0" marR="0" rtl="0" algn="l">
-              <a:lnSpc>
-                <a:spcPct val="150000"/>
-              </a:lnSpc>
-              <a:spcBef>
-                <a:spcPts val="0"/>
-              </a:spcBef>
-              <a:spcAft>
-                <a:spcPts val="0"/>
-              </a:spcAft>
-              <a:buClr>
-                <a:srgbClr val="000000"/>
-              </a:buClr>
-              <a:buSzPct val="25000"/>
-              <a:buFont typeface="Helvetica Neue"/>
-              <a:buNone/>
-            </a:pPr>
-            <a:r>
-              <a:rPr b="0" baseline="0" i="0" lang="en-GB" sz="1400" u="none" cap="none" strike="noStrike">
-                <a:solidFill>
-                  <a:srgbClr val="000000"/>
-                </a:solidFill>
-                <a:latin typeface="Helvetica Neue"/>
-                <a:ea typeface="Helvetica Neue"/>
-                <a:cs typeface="Helvetica Neue"/>
-                <a:sym typeface="Helvetica Neue"/>
-                <a:rtl val="0"/>
-              </a:rPr>
-              <a:t>Pacman: </a:t>
-            </a:r>
-            <a:r>
-              <a:rPr b="0" baseline="0" i="0" lang="en-GB" sz="1400" u="sng" cap="none" strike="noStrike">
-                <a:solidFill>
-                  <a:schemeClr val="hlink"/>
-                </a:solidFill>
-                <a:latin typeface="Helvetica Neue"/>
-                <a:ea typeface="Helvetica Neue"/>
-                <a:cs typeface="Helvetica Neue"/>
-                <a:sym typeface="Helvetica Neue"/>
-                <a:hlinkClick r:id="rId5"/>
-                <a:rtl val="0"/>
-              </a:rPr>
-              <a:t>https://github.com/daleharvey/pacman</a:t>
-            </a:r>
-          </a:p>
-          <a:p>
-            <a:pPr indent="0" lvl="0" marL="0" marR="0" rtl="0" algn="l">
-              <a:lnSpc>
-                <a:spcPct val="100000"/>
-              </a:lnSpc>
-              <a:spcBef>
-                <a:spcPts val="0"/>
-              </a:spcBef>
-              <a:spcAft>
-                <a:spcPts val="0"/>
-              </a:spcAft>
-              <a:buClr>
-                <a:srgbClr val="000000"/>
-              </a:buClr>
-              <a:buFont typeface="Helvetica Neue"/>
+              <a:buFont typeface="Arial"/>
               <a:buNone/>
             </a:pPr>
             <a:r>
               <a:t/>
             </a:r>
-            <a:endParaRPr b="0" baseline="0" i="0" sz="2400" u="none" cap="none" strike="noStrike">
+            <a:endParaRPr b="1" baseline="0" i="0" sz="3600" u="none" cap="none" strike="noStrike">
               <a:solidFill>
                 <a:srgbClr val="000000"/>
               </a:solidFill>
@@ -18950,7 +19576,504 @@
       </p:sp>
       <p:sp>
         <p:nvSpPr>
-          <p:cNvPr id="227" name="Shape 227"/>
+          <p:cNvPr id="249" name="Shape 249"/>
+          <p:cNvSpPr txBox="1"/>
+          <p:nvPr>
+            <p:ph idx="1" type="body"/>
+          </p:nvPr>
+        </p:nvSpPr>
+        <p:spPr>
+          <a:xfrm>
+            <a:off x="471050" y="1544587"/>
+            <a:ext cx="8176500" cy="4699200"/>
+          </a:xfrm>
+          <a:prstGeom prst="rect">
+            <a:avLst/>
+          </a:prstGeom>
+          <a:noFill/>
+          <a:ln>
+            <a:noFill/>
+          </a:ln>
+        </p:spPr>
+        <p:txBody>
+          <a:bodyPr anchorCtr="0" anchor="t" bIns="91425" lIns="91425" rIns="91425" tIns="91425">
+            <a:noAutofit/>
+          </a:bodyPr>
+          <a:lstStyle/>
+          <a:p>
+            <a:pPr indent="0" lvl="0" marL="0" marR="0" rtl="0" algn="l">
+              <a:lnSpc>
+                <a:spcPct val="180000"/>
+              </a:lnSpc>
+              <a:spcBef>
+                <a:spcPts val="0"/>
+              </a:spcBef>
+              <a:spcAft>
+                <a:spcPts val="0"/>
+              </a:spcAft>
+              <a:buClr>
+                <a:srgbClr val="000000"/>
+              </a:buClr>
+              <a:buSzPct val="25000"/>
+              <a:buFont typeface="Arial"/>
+              <a:buNone/>
+            </a:pPr>
+            <a:r>
+              <a:rPr b="0" baseline="0" i="0" lang="en-GB" sz="1400" u="sng" cap="none" strike="noStrike">
+                <a:solidFill>
+                  <a:schemeClr val="hlink"/>
+                </a:solidFill>
+                <a:latin typeface="Helvetica Neue"/>
+                <a:ea typeface="Helvetica Neue"/>
+                <a:cs typeface="Helvetica Neue"/>
+                <a:sym typeface="Helvetica Neue"/>
+                <a:hlinkClick r:id="rId3"/>
+                <a:rtl val="0"/>
+              </a:rPr>
+              <a:t>http://www.dofactory.com/javascript/design-patterns</a:t>
+            </a:r>
+          </a:p>
+          <a:p>
+            <a:pPr indent="0" lvl="0" marL="0" marR="0" rtl="0" algn="l">
+              <a:lnSpc>
+                <a:spcPct val="180000"/>
+              </a:lnSpc>
+              <a:spcBef>
+                <a:spcPts val="0"/>
+              </a:spcBef>
+              <a:spcAft>
+                <a:spcPts val="0"/>
+              </a:spcAft>
+              <a:buClr>
+                <a:srgbClr val="000000"/>
+              </a:buClr>
+              <a:buSzPct val="25000"/>
+              <a:buFont typeface="Arial"/>
+              <a:buNone/>
+            </a:pPr>
+            <a:r>
+              <a:rPr b="0" baseline="0" i="0" lang="en-GB" sz="1400" u="sng" cap="none" strike="noStrike">
+                <a:solidFill>
+                  <a:schemeClr val="hlink"/>
+                </a:solidFill>
+                <a:latin typeface="Helvetica Neue"/>
+                <a:ea typeface="Helvetica Neue"/>
+                <a:cs typeface="Helvetica Neue"/>
+                <a:sym typeface="Helvetica Neue"/>
+                <a:hlinkClick r:id="rId4"/>
+                <a:rtl val="0"/>
+              </a:rPr>
+              <a:t>https://sourcemaking.com/design_patterns</a:t>
+            </a:r>
+          </a:p>
+          <a:p>
+            <a:pPr lvl="0" rtl="0">
+              <a:lnSpc>
+                <a:spcPct val="180000"/>
+              </a:lnSpc>
+              <a:spcBef>
+                <a:spcPts val="0"/>
+              </a:spcBef>
+              <a:buClr>
+                <a:srgbClr val="000000"/>
+              </a:buClr>
+              <a:buSzPct val="25000"/>
+              <a:buFont typeface="Arial"/>
+              <a:buNone/>
+            </a:pPr>
+            <a:r>
+              <a:rPr lang="en-GB" sz="1400" u="sng">
+                <a:solidFill>
+                  <a:schemeClr val="hlink"/>
+                </a:solidFill>
+                <a:hlinkClick r:id="rId5"/>
+                <a:rtl val="0"/>
+              </a:rPr>
+              <a:t>http://www.blackwasp.co.uk/DesignPatternsArticles.aspx</a:t>
+            </a:r>
+          </a:p>
+          <a:p>
+            <a:pPr indent="0" lvl="0" marL="0" marR="0" rtl="0" algn="l">
+              <a:lnSpc>
+                <a:spcPct val="180000"/>
+              </a:lnSpc>
+              <a:spcBef>
+                <a:spcPts val="0"/>
+              </a:spcBef>
+              <a:spcAft>
+                <a:spcPts val="0"/>
+              </a:spcAft>
+              <a:buClr>
+                <a:srgbClr val="000000"/>
+              </a:buClr>
+              <a:buSzPct val="25000"/>
+              <a:buFont typeface="Arial"/>
+              <a:buNone/>
+            </a:pPr>
+            <a:r>
+              <a:rPr b="0" baseline="0" i="0" lang="en-GB" sz="1400" u="sng" cap="none" strike="noStrike">
+                <a:solidFill>
+                  <a:schemeClr val="hlink"/>
+                </a:solidFill>
+                <a:latin typeface="Helvetica Neue"/>
+                <a:ea typeface="Helvetica Neue"/>
+                <a:cs typeface="Helvetica Neue"/>
+                <a:sym typeface="Helvetica Neue"/>
+                <a:hlinkClick r:id="rId6"/>
+                <a:rtl val="0"/>
+              </a:rPr>
+              <a:t>https://en.wikipedia.org/wiki/Command_pattern</a:t>
+            </a:r>
+          </a:p>
+          <a:p>
+            <a:pPr indent="0" lvl="0" marL="0" marR="0" rtl="0" algn="l">
+              <a:lnSpc>
+                <a:spcPct val="180000"/>
+              </a:lnSpc>
+              <a:spcBef>
+                <a:spcPts val="0"/>
+              </a:spcBef>
+              <a:spcAft>
+                <a:spcPts val="0"/>
+              </a:spcAft>
+              <a:buClr>
+                <a:srgbClr val="000000"/>
+              </a:buClr>
+              <a:buSzPct val="25000"/>
+              <a:buFont typeface="Arial"/>
+              <a:buNone/>
+            </a:pPr>
+            <a:r>
+              <a:rPr b="0" baseline="0" i="0" lang="en-GB" sz="1400" u="sng" cap="none" strike="noStrike">
+                <a:solidFill>
+                  <a:schemeClr val="hlink"/>
+                </a:solidFill>
+                <a:latin typeface="Helvetica Neue"/>
+                <a:ea typeface="Helvetica Neue"/>
+                <a:cs typeface="Helvetica Neue"/>
+                <a:sym typeface="Helvetica Neue"/>
+                <a:hlinkClick r:id="rId7"/>
+                <a:rtl val="0"/>
+              </a:rPr>
+              <a:t>https://de.wikipedia.org/wiki/Memento_%28Entwurfsmuster%29</a:t>
+            </a:r>
+          </a:p>
+          <a:p>
+            <a:pPr indent="0" lvl="0" marL="0" marR="0" rtl="0" algn="l">
+              <a:lnSpc>
+                <a:spcPct val="180000"/>
+              </a:lnSpc>
+              <a:spcBef>
+                <a:spcPts val="0"/>
+              </a:spcBef>
+              <a:spcAft>
+                <a:spcPts val="0"/>
+              </a:spcAft>
+              <a:buClr>
+                <a:srgbClr val="000000"/>
+              </a:buClr>
+              <a:buSzPct val="25000"/>
+              <a:buFont typeface="Arial"/>
+              <a:buNone/>
+            </a:pPr>
+            <a:r>
+              <a:rPr b="0" baseline="0" i="0" lang="en-GB" sz="1400" u="sng" cap="none" strike="noStrike">
+                <a:solidFill>
+                  <a:schemeClr val="hlink"/>
+                </a:solidFill>
+                <a:latin typeface="Helvetica Neue"/>
+                <a:ea typeface="Helvetica Neue"/>
+                <a:cs typeface="Helvetica Neue"/>
+                <a:sym typeface="Helvetica Neue"/>
+                <a:hlinkClick r:id="rId8"/>
+                <a:rtl val="0"/>
+              </a:rPr>
+              <a:t>https://en.wikipedia.org/wiki/Chain-of-responsibility_pattern</a:t>
+            </a:r>
+          </a:p>
+          <a:p>
+            <a:pPr indent="0" lvl="0" marL="0" marR="0" rtl="0" algn="l">
+              <a:lnSpc>
+                <a:spcPct val="180000"/>
+              </a:lnSpc>
+              <a:spcBef>
+                <a:spcPts val="0"/>
+              </a:spcBef>
+              <a:spcAft>
+                <a:spcPts val="0"/>
+              </a:spcAft>
+              <a:buClr>
+                <a:srgbClr val="000000"/>
+              </a:buClr>
+              <a:buFont typeface="Arial"/>
+              <a:buNone/>
+            </a:pPr>
+            <a:r>
+              <a:t/>
+            </a:r>
+            <a:endParaRPr/>
+          </a:p>
+          <a:p>
+            <a:pPr indent="0" lvl="0" marL="0" marR="0" rtl="0" algn="l">
+              <a:lnSpc>
+                <a:spcPct val="100000"/>
+              </a:lnSpc>
+              <a:spcBef>
+                <a:spcPts val="0"/>
+              </a:spcBef>
+              <a:spcAft>
+                <a:spcPts val="0"/>
+              </a:spcAft>
+              <a:buClr>
+                <a:srgbClr val="000000"/>
+              </a:buClr>
+              <a:buFont typeface="Arial"/>
+              <a:buNone/>
+            </a:pPr>
+            <a:r>
+              <a:t/>
+            </a:r>
+            <a:endParaRPr b="0" baseline="0" i="0" sz="1400" u="none" cap="none" strike="noStrike">
+              <a:solidFill>
+                <a:srgbClr val="000000"/>
+              </a:solidFill>
+              <a:latin typeface="Arial"/>
+              <a:ea typeface="Arial"/>
+              <a:cs typeface="Arial"/>
+              <a:sym typeface="Arial"/>
+              <a:rtl val="0"/>
+            </a:endParaRPr>
+          </a:p>
+        </p:txBody>
+      </p:sp>
+    </p:spTree>
+  </p:cSld>
+  <p:clrMapOvr>
+    <a:masterClrMapping/>
+  </p:clrMapOvr>
+  <p:transition spd="slow">
+    <p:cut/>
+  </p:transition>
+</p:sld>
+</file>
+
+<file path=ppt/slides/slide38.xml><?xml version="1.0" encoding="utf-8"?>
+<p:sld xmlns:a="http://schemas.openxmlformats.org/drawingml/2006/main" xmlns:r="http://schemas.openxmlformats.org/officeDocument/2006/relationships" xmlns:mc="http://schemas.openxmlformats.org/markup-compatibility/2006" xmlns:mv="urn:schemas-microsoft-com:mac:vml" xmlns:p="http://schemas.openxmlformats.org/presentationml/2006/main" xmlns:c="http://schemas.openxmlformats.org/drawingml/2006/chart" xmlns:dgm="http://schemas.openxmlformats.org/drawingml/2006/diagram" xmlns:o="urn:schemas-microsoft-com:office:office" xmlns:v="urn:schemas-microsoft-com:vml" xmlns:pvml="urn:schemas-microsoft-com:office:powerpoint" xmlns:com="http://schemas.openxmlformats.org/drawingml/2006/compatibility" xmlns:p14="http://schemas.microsoft.com/office/powerpoint/2010/main">
+  <p:cSld>
+    <p:spTree>
+      <p:nvGrpSpPr>
+        <p:cNvPr id="253" name="Shape 253"/>
+        <p:cNvGrpSpPr/>
+        <p:nvPr/>
+      </p:nvGrpSpPr>
+      <p:grpSpPr>
+        <a:xfrm>
+          <a:off x="0" y="0"/>
+          <a:ext cx="0" cy="0"/>
+          <a:chOff x="0" y="0"/>
+          <a:chExt cx="0" cy="0"/>
+        </a:xfrm>
+      </p:grpSpPr>
+      <p:sp>
+        <p:nvSpPr>
+          <p:cNvPr id="254" name="Shape 254"/>
+          <p:cNvSpPr txBox="1"/>
+          <p:nvPr>
+            <p:ph idx="1" type="body"/>
+          </p:nvPr>
+        </p:nvSpPr>
+        <p:spPr>
+          <a:xfrm>
+            <a:off x="471050" y="1544587"/>
+            <a:ext cx="8176500" cy="4699200"/>
+          </a:xfrm>
+          <a:prstGeom prst="rect">
+            <a:avLst/>
+          </a:prstGeom>
+          <a:noFill/>
+          <a:ln>
+            <a:noFill/>
+          </a:ln>
+        </p:spPr>
+        <p:txBody>
+          <a:bodyPr anchorCtr="0" anchor="t" bIns="91425" lIns="91425" rIns="91425" tIns="91425">
+            <a:noAutofit/>
+          </a:bodyPr>
+          <a:lstStyle/>
+          <a:p>
+            <a:pPr indent="0" lvl="0" marL="0" marR="0" rtl="0" algn="l">
+              <a:lnSpc>
+                <a:spcPct val="150000"/>
+              </a:lnSpc>
+              <a:spcBef>
+                <a:spcPts val="0"/>
+              </a:spcBef>
+              <a:spcAft>
+                <a:spcPts val="0"/>
+              </a:spcAft>
+              <a:buClr>
+                <a:srgbClr val="000000"/>
+              </a:buClr>
+              <a:buSzPct val="25000"/>
+              <a:buFont typeface="Helvetica Neue"/>
+              <a:buNone/>
+            </a:pPr>
+            <a:r>
+              <a:rPr b="0" baseline="0" i="0" lang="en-GB" sz="1400" u="none" cap="none" strike="noStrike">
+                <a:solidFill>
+                  <a:srgbClr val="000000"/>
+                </a:solidFill>
+                <a:latin typeface="Helvetica Neue"/>
+                <a:ea typeface="Helvetica Neue"/>
+                <a:cs typeface="Helvetica Neue"/>
+                <a:sym typeface="Helvetica Neue"/>
+                <a:rtl val="0"/>
+              </a:rPr>
+              <a:t>Spaceinvader:</a:t>
+            </a:r>
+            <a:r>
+              <a:rPr b="0" baseline="0" i="0" lang="en-GB" sz="1400" u="sng" cap="none" strike="noStrike">
+                <a:solidFill>
+                  <a:schemeClr val="hlink"/>
+                </a:solidFill>
+                <a:latin typeface="Helvetica Neue"/>
+                <a:ea typeface="Helvetica Neue"/>
+                <a:cs typeface="Helvetica Neue"/>
+                <a:sym typeface="Helvetica Neue"/>
+                <a:hlinkClick r:id="rId3"/>
+                <a:rtl val="0"/>
+              </a:rPr>
+              <a:t> https://github.com/dwmkerr/spaceinvaders</a:t>
+            </a:r>
+          </a:p>
+          <a:p>
+            <a:pPr indent="0" lvl="0" marL="0" marR="0" rtl="0" algn="l">
+              <a:lnSpc>
+                <a:spcPct val="150000"/>
+              </a:lnSpc>
+              <a:spcBef>
+                <a:spcPts val="0"/>
+              </a:spcBef>
+              <a:spcAft>
+                <a:spcPts val="0"/>
+              </a:spcAft>
+              <a:buClr>
+                <a:srgbClr val="000000"/>
+              </a:buClr>
+              <a:buSzPct val="25000"/>
+              <a:buFont typeface="Helvetica Neue"/>
+              <a:buNone/>
+            </a:pPr>
+            <a:r>
+              <a:rPr b="0" baseline="0" i="0" lang="en-GB" sz="1400" u="none" cap="none" strike="noStrike">
+                <a:solidFill>
+                  <a:srgbClr val="000000"/>
+                </a:solidFill>
+                <a:latin typeface="Helvetica Neue"/>
+                <a:ea typeface="Helvetica Neue"/>
+                <a:cs typeface="Helvetica Neue"/>
+                <a:sym typeface="Helvetica Neue"/>
+                <a:rtl val="0"/>
+              </a:rPr>
+              <a:t>Tic Tac Toe:</a:t>
+            </a:r>
+            <a:r>
+              <a:rPr b="0" baseline="0" i="0" lang="en-GB" sz="1400" u="sng" cap="none" strike="noStrike">
+                <a:solidFill>
+                  <a:schemeClr val="hlink"/>
+                </a:solidFill>
+                <a:latin typeface="Helvetica Neue"/>
+                <a:ea typeface="Helvetica Neue"/>
+                <a:cs typeface="Helvetica Neue"/>
+                <a:sym typeface="Helvetica Neue"/>
+                <a:hlinkClick r:id="rId4"/>
+                <a:rtl val="0"/>
+              </a:rPr>
+              <a:t> https://github.com/negomi/tic-tac-toe</a:t>
+            </a:r>
+          </a:p>
+          <a:p>
+            <a:pPr indent="0" lvl="0" marL="0" marR="0" rtl="0" algn="l">
+              <a:lnSpc>
+                <a:spcPct val="150000"/>
+              </a:lnSpc>
+              <a:spcBef>
+                <a:spcPts val="0"/>
+              </a:spcBef>
+              <a:spcAft>
+                <a:spcPts val="0"/>
+              </a:spcAft>
+              <a:buClr>
+                <a:srgbClr val="000000"/>
+              </a:buClr>
+              <a:buSzPct val="25000"/>
+              <a:buFont typeface="Helvetica Neue"/>
+              <a:buNone/>
+            </a:pPr>
+            <a:r>
+              <a:rPr b="0" baseline="0" i="0" lang="en-GB" sz="1400" u="none" cap="none" strike="noStrike">
+                <a:solidFill>
+                  <a:srgbClr val="000000"/>
+                </a:solidFill>
+                <a:latin typeface="Helvetica Neue"/>
+                <a:ea typeface="Helvetica Neue"/>
+                <a:cs typeface="Helvetica Neue"/>
+                <a:sym typeface="Helvetica Neue"/>
+                <a:rtl val="0"/>
+              </a:rPr>
+              <a:t>Pacman: </a:t>
+            </a:r>
+            <a:r>
+              <a:rPr b="0" baseline="0" i="0" lang="en-GB" sz="1400" u="sng" cap="none" strike="noStrike">
+                <a:solidFill>
+                  <a:schemeClr val="hlink"/>
+                </a:solidFill>
+                <a:latin typeface="Helvetica Neue"/>
+                <a:ea typeface="Helvetica Neue"/>
+                <a:cs typeface="Helvetica Neue"/>
+                <a:sym typeface="Helvetica Neue"/>
+                <a:hlinkClick r:id="rId5"/>
+                <a:rtl val="0"/>
+              </a:rPr>
+              <a:t>https://github.com/daleharvey/pacman</a:t>
+            </a:r>
+          </a:p>
+          <a:p>
+            <a:pPr indent="0" lvl="0" marL="0" marR="0" rtl="0" algn="l">
+              <a:lnSpc>
+                <a:spcPct val="100000"/>
+              </a:lnSpc>
+              <a:spcBef>
+                <a:spcPts val="0"/>
+              </a:spcBef>
+              <a:spcAft>
+                <a:spcPts val="0"/>
+              </a:spcAft>
+              <a:buClr>
+                <a:srgbClr val="000000"/>
+              </a:buClr>
+              <a:buFont typeface="Helvetica Neue"/>
+              <a:buNone/>
+            </a:pPr>
+            <a:r>
+              <a:t/>
+            </a:r>
+            <a:endParaRPr b="0" baseline="0" i="0" sz="2400" u="none" cap="none" strike="noStrike">
+              <a:solidFill>
+                <a:srgbClr val="000000"/>
+              </a:solidFill>
+              <a:latin typeface="Helvetica Neue"/>
+              <a:ea typeface="Helvetica Neue"/>
+              <a:cs typeface="Helvetica Neue"/>
+              <a:sym typeface="Helvetica Neue"/>
+              <a:rtl val="0"/>
+            </a:endParaRPr>
+          </a:p>
+        </p:txBody>
+      </p:sp>
+      <p:sp>
+        <p:nvSpPr>
+          <p:cNvPr id="255" name="Shape 255"/>
           <p:cNvSpPr txBox="1"/>
           <p:nvPr>
             <p:ph type="title"/>

</xml_diff>

<commit_message>
fixed formatting in powerpoint
</commit_message>
<xml_diff>
--- a/Behavioral Patterns - JS Patterns and Anti Patterns.pptx
+++ b/Behavioral Patterns - JS Patterns and Anti Patterns.pptx
@@ -58,15 +58,6 @@
   </p:sldIdLst>
   <p:sldSz cx="9144000" cy="6858000" type="screen4x3"/>
   <p:notesSz cx="6858000" cy="9144000"/>
-  <p:embeddedFontLst>
-    <p:embeddedFont>
-      <p:font typeface="Helvetica Neue" panose="020B0604020202020204" charset="0"/>
-      <p:regular r:id="rId50"/>
-      <p:bold r:id="rId51"/>
-      <p:italic r:id="rId52"/>
-      <p:boldItalic r:id="rId53"/>
-    </p:embeddedFont>
-  </p:embeddedFontLst>
   <p:defaultTextStyle>
     <a:defPPr marR="0" algn="l" rtl="0">
       <a:lnSpc>
@@ -7604,7 +7595,7 @@
           <a:p>
             <a:fld id="{5CBAB822-13DF-44ED-A775-0A2D9DB8A94D}" type="slidenum">
               <a:rPr lang="de-DE" smtClean="0"/>
-              <a:t>‹#›</a:t>
+              <a:t>‹Nr.›</a:t>
             </a:fld>
             <a:endParaRPr lang="de-DE"/>
           </a:p>
@@ -8404,7 +8395,7 @@
   <p:clrMapOvr>
     <a:masterClrMapping/>
   </p:clrMapOvr>
-  <p:transition spd="slow">
+  <p:transition xmlns:p14="http://schemas.microsoft.com/office/powerpoint/2010/main" spd="slow">
     <p:cut/>
   </p:transition>
 </p:sld>
@@ -8457,9 +8448,6 @@
           <a:lstStyle/>
           <a:p>
             <a:pPr marL="0" marR="0" lvl="0" indent="0" algn="l" rtl="0">
-              <a:lnSpc>
-                <a:spcPct val="150000"/>
-              </a:lnSpc>
               <a:spcBef>
                 <a:spcPts val="0"/>
               </a:spcBef>
@@ -9600,7 +9588,7 @@
   <p:clrMapOvr>
     <a:masterClrMapping/>
   </p:clrMapOvr>
-  <p:transition spd="slow">
+  <p:transition xmlns:p14="http://schemas.microsoft.com/office/powerpoint/2010/main" spd="slow">
     <p:cut/>
   </p:transition>
 </p:sld>
@@ -9653,9 +9641,6 @@
           <a:lstStyle/>
           <a:p>
             <a:pPr marL="0" marR="0" lvl="0" indent="0" algn="l" rtl="0">
-              <a:lnSpc>
-                <a:spcPct val="150000"/>
-              </a:lnSpc>
               <a:spcBef>
                 <a:spcPts val="0"/>
               </a:spcBef>
@@ -9932,7 +9917,7 @@
   <p:clrMapOvr>
     <a:masterClrMapping/>
   </p:clrMapOvr>
-  <p:transition spd="slow">
+  <p:transition xmlns:p14="http://schemas.microsoft.com/office/powerpoint/2010/main" spd="slow">
     <p:cut/>
   </p:transition>
 </p:sld>
@@ -9985,9 +9970,6 @@
           <a:lstStyle/>
           <a:p>
             <a:pPr marL="0" marR="0" lvl="0" indent="0" algn="l" rtl="0">
-              <a:lnSpc>
-                <a:spcPct val="150000"/>
-              </a:lnSpc>
               <a:spcBef>
                 <a:spcPts val="0"/>
               </a:spcBef>
@@ -10439,7 +10421,7 @@
   <p:clrMapOvr>
     <a:masterClrMapping/>
   </p:clrMapOvr>
-  <p:transition spd="slow">
+  <p:transition xmlns:p14="http://schemas.microsoft.com/office/powerpoint/2010/main" spd="slow">
     <p:cut/>
   </p:transition>
 </p:sld>
@@ -10492,9 +10474,6 @@
           <a:lstStyle/>
           <a:p>
             <a:pPr marL="0" marR="0" lvl="0" indent="0" algn="l" rtl="0">
-              <a:lnSpc>
-                <a:spcPct val="150000"/>
-              </a:lnSpc>
               <a:spcBef>
                 <a:spcPts val="0"/>
               </a:spcBef>
@@ -11338,7 +11317,7 @@
   <p:clrMapOvr>
     <a:masterClrMapping/>
   </p:clrMapOvr>
-  <p:transition spd="slow">
+  <p:transition xmlns:p14="http://schemas.microsoft.com/office/powerpoint/2010/main" spd="slow">
     <p:cut/>
   </p:transition>
 </p:sld>
@@ -11391,9 +11370,6 @@
           <a:lstStyle/>
           <a:p>
             <a:pPr marL="0" marR="0" lvl="0" indent="0" algn="l" rtl="0">
-              <a:lnSpc>
-                <a:spcPct val="150000"/>
-              </a:lnSpc>
               <a:spcBef>
                 <a:spcPts val="0"/>
               </a:spcBef>
@@ -12407,7 +12383,7 @@
   <p:clrMapOvr>
     <a:masterClrMapping/>
   </p:clrMapOvr>
-  <p:transition spd="slow">
+  <p:transition xmlns:p14="http://schemas.microsoft.com/office/powerpoint/2010/main" spd="slow">
     <p:cut/>
   </p:transition>
 </p:sld>
@@ -12460,9 +12436,6 @@
           <a:lstStyle/>
           <a:p>
             <a:pPr marL="0" marR="0" lvl="0" indent="0" algn="l" rtl="0">
-              <a:lnSpc>
-                <a:spcPct val="150000"/>
-              </a:lnSpc>
               <a:spcBef>
                 <a:spcPts val="0"/>
               </a:spcBef>
@@ -13632,7 +13605,7 @@
   <p:clrMapOvr>
     <a:masterClrMapping/>
   </p:clrMapOvr>
-  <p:transition spd="slow">
+  <p:transition xmlns:p14="http://schemas.microsoft.com/office/powerpoint/2010/main" spd="slow">
     <p:cut/>
   </p:transition>
 </p:sld>
@@ -14890,7 +14863,7 @@
   <p:clrMapOvr>
     <a:masterClrMapping/>
   </p:clrMapOvr>
-  <p:transition spd="slow">
+  <p:transition xmlns:p14="http://schemas.microsoft.com/office/powerpoint/2010/main" spd="slow">
     <p:cut/>
   </p:transition>
 </p:sld>
@@ -14943,9 +14916,6 @@
           <a:lstStyle/>
           <a:p>
             <a:pPr marL="0" marR="0" lvl="0" indent="0" algn="l" rtl="0">
-              <a:lnSpc>
-                <a:spcPct val="150000"/>
-              </a:lnSpc>
               <a:spcBef>
                 <a:spcPts val="0"/>
               </a:spcBef>
@@ -15260,7 +15230,7 @@
   <p:clrMapOvr>
     <a:masterClrMapping/>
   </p:clrMapOvr>
-  <p:transition spd="slow">
+  <p:transition xmlns:p14="http://schemas.microsoft.com/office/powerpoint/2010/main" spd="slow">
     <p:cut/>
   </p:transition>
 </p:sld>
@@ -15313,9 +15283,6 @@
           <a:lstStyle/>
           <a:p>
             <a:pPr marL="0" marR="0" lvl="0" indent="0" algn="l" rtl="0">
-              <a:lnSpc>
-                <a:spcPct val="150000"/>
-              </a:lnSpc>
               <a:spcBef>
                 <a:spcPts val="0"/>
               </a:spcBef>
@@ -15671,7 +15638,7 @@
   <p:clrMapOvr>
     <a:masterClrMapping/>
   </p:clrMapOvr>
-  <p:transition spd="slow">
+  <p:transition xmlns:p14="http://schemas.microsoft.com/office/powerpoint/2010/main" spd="slow">
     <p:cut/>
   </p:transition>
 </p:sld>
@@ -15724,9 +15691,6 @@
           <a:lstStyle/>
           <a:p>
             <a:pPr marL="0" marR="0" lvl="0" indent="0" algn="l" rtl="0">
-              <a:lnSpc>
-                <a:spcPct val="150000"/>
-              </a:lnSpc>
               <a:spcBef>
                 <a:spcPts val="0"/>
               </a:spcBef>
@@ -16043,7 +16007,7 @@
   <p:clrMapOvr>
     <a:masterClrMapping/>
   </p:clrMapOvr>
-  <p:transition spd="slow">
+  <p:transition xmlns:p14="http://schemas.microsoft.com/office/powerpoint/2010/main" spd="slow">
     <p:cut/>
   </p:transition>
 </p:sld>
@@ -16159,7 +16123,7 @@
           <a:p>
             <a:pPr marL="457200" marR="0" lvl="0" indent="-381000" algn="l" rtl="0">
               <a:lnSpc>
-                <a:spcPct val="150000"/>
+                <a:spcPct val="100000"/>
               </a:lnSpc>
               <a:spcBef>
                 <a:spcPts val="0"/>
@@ -16315,6 +16279,39 @@
               </a:rPr>
               <a:t>Observer</a:t>
             </a:r>
+          </a:p>
+          <a:p>
+            <a:pPr marL="457200" marR="0" lvl="0" indent="-381000" algn="l" rtl="0">
+              <a:lnSpc>
+                <a:spcPct val="150000"/>
+              </a:lnSpc>
+              <a:spcBef>
+                <a:spcPts val="0"/>
+              </a:spcBef>
+              <a:spcAft>
+                <a:spcPts val="0"/>
+              </a:spcAft>
+              <a:buClr>
+                <a:srgbClr val="000000"/>
+              </a:buClr>
+              <a:buSzPct val="100000"/>
+              <a:buFont typeface="Helvetica Neue"/>
+              <a:buChar char="●"/>
+            </a:pPr>
+            <a:r>
+              <a:rPr lang="en-GB"/>
+              <a:t>Summary</a:t>
+            </a:r>
+            <a:endParaRPr lang="en-GB" sz="2400" b="0" i="0" u="none" strike="noStrike" cap="none" baseline="0">
+              <a:solidFill>
+                <a:srgbClr val="000000"/>
+              </a:solidFill>
+              <a:latin typeface="Helvetica Neue"/>
+              <a:ea typeface="Helvetica Neue"/>
+              <a:cs typeface="Helvetica Neue"/>
+              <a:sym typeface="Helvetica Neue"/>
+              <a:rtl val="0"/>
+            </a:endParaRPr>
           </a:p>
           <a:p>
             <a:pPr marR="0" lvl="0" algn="l" rtl="0">
@@ -16472,7 +16469,7 @@
   <p:clrMapOvr>
     <a:masterClrMapping/>
   </p:clrMapOvr>
-  <p:transition spd="slow">
+  <p:transition xmlns:p14="http://schemas.microsoft.com/office/powerpoint/2010/main" spd="slow">
     <p:cut/>
   </p:transition>
 </p:sld>
@@ -16525,9 +16522,6 @@
           <a:lstStyle/>
           <a:p>
             <a:pPr marL="0" marR="0" lvl="0" indent="0" algn="l" rtl="0">
-              <a:lnSpc>
-                <a:spcPct val="150000"/>
-              </a:lnSpc>
               <a:spcBef>
                 <a:spcPts val="0"/>
               </a:spcBef>
@@ -17555,7 +17549,7 @@
   <p:clrMapOvr>
     <a:masterClrMapping/>
   </p:clrMapOvr>
-  <p:transition spd="slow">
+  <p:transition xmlns:p14="http://schemas.microsoft.com/office/powerpoint/2010/main" spd="slow">
     <p:cut/>
   </p:transition>
 </p:sld>
@@ -17608,9 +17602,6 @@
           <a:lstStyle/>
           <a:p>
             <a:pPr marL="0" marR="0" lvl="0" indent="0" algn="l" rtl="0">
-              <a:lnSpc>
-                <a:spcPct val="150000"/>
-              </a:lnSpc>
               <a:spcBef>
                 <a:spcPts val="0"/>
               </a:spcBef>
@@ -18625,7 +18616,7 @@
   <p:clrMapOvr>
     <a:masterClrMapping/>
   </p:clrMapOvr>
-  <p:transition spd="slow">
+  <p:transition xmlns:p14="http://schemas.microsoft.com/office/powerpoint/2010/main" spd="slow">
     <p:cut/>
   </p:transition>
 </p:sld>
@@ -18678,9 +18669,6 @@
           <a:lstStyle/>
           <a:p>
             <a:pPr marL="0" marR="0" lvl="0" indent="0" algn="l" rtl="0">
-              <a:lnSpc>
-                <a:spcPct val="150000"/>
-              </a:lnSpc>
               <a:spcBef>
                 <a:spcPts val="0"/>
               </a:spcBef>
@@ -19612,7 +19600,7 @@
   <p:clrMapOvr>
     <a:masterClrMapping/>
   </p:clrMapOvr>
-  <p:transition spd="slow">
+  <p:transition xmlns:p14="http://schemas.microsoft.com/office/powerpoint/2010/main" spd="slow">
     <p:cut/>
   </p:transition>
 </p:sld>
@@ -19665,9 +19653,6 @@
           <a:lstStyle/>
           <a:p>
             <a:pPr marL="0" marR="0" lvl="0" indent="0" algn="l" rtl="0">
-              <a:lnSpc>
-                <a:spcPct val="150000"/>
-              </a:lnSpc>
               <a:spcBef>
                 <a:spcPts val="0"/>
               </a:spcBef>
@@ -20175,7 +20160,7 @@
   <p:clrMapOvr>
     <a:masterClrMapping/>
   </p:clrMapOvr>
-  <p:transition spd="slow">
+  <p:transition xmlns:p14="http://schemas.microsoft.com/office/powerpoint/2010/main" spd="slow">
     <p:cut/>
   </p:transition>
 </p:sld>
@@ -20228,9 +20213,6 @@
           <a:lstStyle/>
           <a:p>
             <a:pPr marL="0" marR="0" lvl="0" indent="0" algn="l" rtl="0">
-              <a:lnSpc>
-                <a:spcPct val="150000"/>
-              </a:lnSpc>
               <a:spcBef>
                 <a:spcPts val="0"/>
               </a:spcBef>
@@ -21508,7 +21490,7 @@
   <p:clrMapOvr>
     <a:masterClrMapping/>
   </p:clrMapOvr>
-  <p:transition spd="slow">
+  <p:transition xmlns:p14="http://schemas.microsoft.com/office/powerpoint/2010/main" spd="slow">
     <p:cut/>
   </p:transition>
 </p:sld>
@@ -21561,9 +21543,6 @@
           <a:lstStyle/>
           <a:p>
             <a:pPr marL="0" marR="0" lvl="0" indent="0" algn="l" rtl="0">
-              <a:lnSpc>
-                <a:spcPct val="150000"/>
-              </a:lnSpc>
               <a:spcBef>
                 <a:spcPts val="0"/>
               </a:spcBef>
@@ -22650,7 +22629,7 @@
   <p:clrMapOvr>
     <a:masterClrMapping/>
   </p:clrMapOvr>
-  <p:transition spd="slow">
+  <p:transition xmlns:p14="http://schemas.microsoft.com/office/powerpoint/2010/main" spd="slow">
     <p:cut/>
   </p:transition>
 </p:sld>
@@ -22737,9 +22716,6 @@
           <a:lstStyle/>
           <a:p>
             <a:pPr lvl="0" rtl="0">
-              <a:lnSpc>
-                <a:spcPct val="150000"/>
-              </a:lnSpc>
               <a:spcBef>
                 <a:spcPts val="0"/>
               </a:spcBef>
@@ -24505,7 +24481,7 @@
   <p:clrMapOvr>
     <a:masterClrMapping/>
   </p:clrMapOvr>
-  <p:transition spd="slow">
+  <p:transition xmlns:p14="http://schemas.microsoft.com/office/powerpoint/2010/main" spd="slow">
     <p:cut/>
   </p:transition>
 </p:sld>
@@ -24558,9 +24534,6 @@
           <a:lstStyle/>
           <a:p>
             <a:pPr marL="0" marR="0" lvl="0" indent="0" algn="l" rtl="0">
-              <a:lnSpc>
-                <a:spcPct val="150000"/>
-              </a:lnSpc>
               <a:spcBef>
                 <a:spcPts val="0"/>
               </a:spcBef>
@@ -24649,7 +24622,7 @@
           <a:p>
             <a:pPr marL="457200" marR="0" lvl="0" indent="-381000" algn="l" rtl="0">
               <a:lnSpc>
-                <a:spcPct val="150000"/>
+                <a:spcPct val="100000"/>
               </a:lnSpc>
               <a:spcBef>
                 <a:spcPts val="0"/>
@@ -24846,7 +24819,7 @@
   <p:clrMapOvr>
     <a:masterClrMapping/>
   </p:clrMapOvr>
-  <p:transition spd="slow">
+  <p:transition xmlns:p14="http://schemas.microsoft.com/office/powerpoint/2010/main" spd="slow">
     <p:cut/>
   </p:transition>
 </p:sld>
@@ -24899,9 +24872,6 @@
           <a:lstStyle/>
           <a:p>
             <a:pPr marL="0" marR="0" lvl="0" indent="0" algn="l" rtl="0">
-              <a:lnSpc>
-                <a:spcPct val="150000"/>
-              </a:lnSpc>
               <a:spcBef>
                 <a:spcPts val="0"/>
               </a:spcBef>
@@ -24989,9 +24959,6 @@
           <a:lstStyle/>
           <a:p>
             <a:pPr marL="457200" marR="0" lvl="0" indent="-381000" algn="l" rtl="0">
-              <a:lnSpc>
-                <a:spcPct val="150000"/>
-              </a:lnSpc>
               <a:spcBef>
                 <a:spcPts val="0"/>
               </a:spcBef>
@@ -25190,7 +25157,7 @@
         </p:blipFill>
         <p:spPr>
           <a:xfrm>
-            <a:off x="2715891" y="3870187"/>
+            <a:off x="2715891" y="3879323"/>
             <a:ext cx="3031798" cy="2373599"/>
           </a:xfrm>
           <a:prstGeom prst="rect">
@@ -25276,7 +25243,7 @@
   <p:clrMapOvr>
     <a:masterClrMapping/>
   </p:clrMapOvr>
-  <p:transition spd="slow">
+  <p:transition xmlns:p14="http://schemas.microsoft.com/office/powerpoint/2010/main" spd="slow">
     <p:cut/>
   </p:transition>
 </p:sld>
@@ -25329,9 +25296,6 @@
           <a:lstStyle/>
           <a:p>
             <a:pPr marL="0" marR="0" lvl="0" indent="0" algn="l" rtl="0">
-              <a:lnSpc>
-                <a:spcPct val="150000"/>
-              </a:lnSpc>
               <a:spcBef>
                 <a:spcPts val="0"/>
               </a:spcBef>
@@ -25680,7 +25644,7 @@
   <p:clrMapOvr>
     <a:masterClrMapping/>
   </p:clrMapOvr>
-  <p:transition spd="slow">
+  <p:transition xmlns:p14="http://schemas.microsoft.com/office/powerpoint/2010/main" spd="slow">
     <p:cut/>
   </p:transition>
 </p:sld>
@@ -25705,19 +25669,15 @@
       </p:grpSpPr>
       <p:sp>
         <p:nvSpPr>
-          <p:cNvPr id="28" name="Shape 28"/>
+          <p:cNvPr id="29" name="Shape 29"/>
           <p:cNvSpPr txBox="1">
             <a:spLocks noGrp="1"/>
           </p:cNvSpPr>
           <p:nvPr>
-            <p:ph type="title"/>
+            <p:ph type="body" idx="1"/>
           </p:nvPr>
         </p:nvSpPr>
         <p:spPr>
-          <a:xfrm>
-            <a:off x="461825" y="757368"/>
-            <a:ext cx="8344199" cy="723600"/>
-          </a:xfrm>
           <a:prstGeom prst="rect">
             <a:avLst/>
           </a:prstGeom>
@@ -25732,7 +25692,7 @@
           </a:bodyPr>
           <a:lstStyle/>
           <a:p>
-            <a:pPr marL="0" marR="0" lvl="0" indent="0" algn="l" rtl="0">
+            <a:pPr marL="457200" marR="0" lvl="0" indent="-381000" algn="l" rtl="0">
               <a:lnSpc>
                 <a:spcPct val="150000"/>
               </a:lnSpc>
@@ -25745,12 +25705,12 @@
               <a:buClr>
                 <a:srgbClr val="000000"/>
               </a:buClr>
-              <a:buSzPct val="25000"/>
+              <a:buSzPct val="100000"/>
               <a:buFont typeface="Helvetica Neue"/>
-              <a:buNone/>
-            </a:pPr>
-            <a:r>
-              <a:rPr lang="en-GB" sz="3600" b="1" i="0" u="none" strike="noStrike" cap="none" baseline="0">
+              <a:buChar char="●"/>
+            </a:pPr>
+            <a:r>
+              <a:rPr lang="en-GB" sz="2400" b="0" i="0" u="none" strike="noStrike" cap="none" baseline="0">
                 <a:solidFill>
                   <a:srgbClr val="000000"/>
                 </a:solidFill>
@@ -25760,26 +25720,123 @@
                 <a:sym typeface="Helvetica Neue"/>
                 <a:rtl val="0"/>
               </a:rPr>
-              <a:t>Behavior Pattern in general</a:t>
-            </a:r>
+              <a:t>Mainly concerned with the communication between objects.</a:t>
+            </a:r>
+          </a:p>
+          <a:p>
+            <a:pPr marL="457200" marR="0" lvl="0" indent="-381000" algn="l" rtl="0">
+              <a:lnSpc>
+                <a:spcPct val="100000"/>
+              </a:lnSpc>
+              <a:spcBef>
+                <a:spcPts val="0"/>
+              </a:spcBef>
+              <a:spcAft>
+                <a:spcPts val="0"/>
+              </a:spcAft>
+              <a:buClr>
+                <a:srgbClr val="000000"/>
+              </a:buClr>
+              <a:buSzPct val="100000"/>
+              <a:buFont typeface="Helvetica Neue"/>
+              <a:buChar char="●"/>
+            </a:pPr>
+            <a:r>
+              <a:rPr lang="en-GB">
+                <a:rtl val="0"/>
+              </a:rPr>
+              <a:t>Describe a process or a flow</a:t>
+            </a:r>
+          </a:p>
+          <a:p>
+            <a:pPr marL="457200" marR="0" lvl="0" indent="-381000" algn="l" rtl="0">
+              <a:lnSpc>
+                <a:spcPct val="150000"/>
+              </a:lnSpc>
+              <a:spcBef>
+                <a:spcPts val="0"/>
+              </a:spcBef>
+              <a:spcAft>
+                <a:spcPts val="0"/>
+              </a:spcAft>
+              <a:buClr>
+                <a:srgbClr val="000000"/>
+              </a:buClr>
+              <a:buSzPct val="100000"/>
+              <a:buFont typeface="Helvetica Neue"/>
+              <a:buChar char="●"/>
+            </a:pPr>
+            <a:r>
+              <a:rPr lang="en-GB">
+                <a:rtl val="0"/>
+              </a:rPr>
+              <a:t>encapsulating behavior and delegating of requests</a:t>
+            </a:r>
+          </a:p>
+          <a:p>
+            <a:pPr marL="457200" marR="0" lvl="0" indent="-381000" algn="l" rtl="0">
+              <a:lnSpc>
+                <a:spcPct val="115000"/>
+              </a:lnSpc>
+              <a:spcBef>
+                <a:spcPts val="0"/>
+              </a:spcBef>
+              <a:spcAft>
+                <a:spcPts val="0"/>
+              </a:spcAft>
+              <a:buClr>
+                <a:srgbClr val="000000"/>
+              </a:buClr>
+              <a:buSzPct val="100000"/>
+              <a:buFont typeface="Helvetica Neue"/>
+              <a:buChar char="●"/>
+            </a:pPr>
+            <a:r>
+              <a:rPr lang="en-GB"/>
+              <a:t>increases flexibility </a:t>
+            </a:r>
+          </a:p>
+          <a:p>
+            <a:pPr marL="0" marR="0" lvl="0" indent="0" algn="l" rtl="0">
+              <a:lnSpc>
+                <a:spcPct val="100000"/>
+              </a:lnSpc>
+              <a:spcBef>
+                <a:spcPts val="0"/>
+              </a:spcBef>
+              <a:spcAft>
+                <a:spcPts val="0"/>
+              </a:spcAft>
+              <a:buClr>
+                <a:srgbClr val="000000"/>
+              </a:buClr>
+              <a:buFont typeface="Arial"/>
+              <a:buNone/>
+            </a:pPr>
+            <a:endParaRPr sz="2400" b="0" i="0" u="none" strike="noStrike" cap="none" baseline="0">
+              <a:solidFill>
+                <a:srgbClr val="000000"/>
+              </a:solidFill>
+              <a:latin typeface="Arial"/>
+              <a:ea typeface="Arial"/>
+              <a:cs typeface="Arial"/>
+              <a:sym typeface="Arial"/>
+              <a:rtl val="0"/>
+            </a:endParaRPr>
           </a:p>
         </p:txBody>
       </p:sp>
       <p:sp>
         <p:nvSpPr>
-          <p:cNvPr id="29" name="Shape 29"/>
+          <p:cNvPr id="28" name="Shape 28"/>
           <p:cNvSpPr txBox="1">
             <a:spLocks noGrp="1"/>
           </p:cNvSpPr>
           <p:nvPr>
-            <p:ph type="body" idx="1"/>
+            <p:ph type="title"/>
           </p:nvPr>
         </p:nvSpPr>
         <p:spPr>
-          <a:xfrm>
-            <a:off x="471050" y="1544587"/>
-            <a:ext cx="8176500" cy="4699200"/>
-          </a:xfrm>
           <a:prstGeom prst="rect">
             <a:avLst/>
           </a:prstGeom>
@@ -25794,25 +25851,22 @@
           </a:bodyPr>
           <a:lstStyle/>
           <a:p>
-            <a:pPr marL="457200" marR="0" lvl="0" indent="-381000" algn="l" rtl="0">
-              <a:lnSpc>
-                <a:spcPct val="150000"/>
-              </a:lnSpc>
-              <a:spcBef>
-                <a:spcPts val="0"/>
-              </a:spcBef>
-              <a:spcAft>
-                <a:spcPts val="0"/>
-              </a:spcAft>
-              <a:buClr>
-                <a:srgbClr val="000000"/>
-              </a:buClr>
-              <a:buSzPct val="100000"/>
+            <a:pPr marL="0" marR="0" lvl="0" indent="0" algn="l" rtl="0">
+              <a:spcBef>
+                <a:spcPts val="0"/>
+              </a:spcBef>
+              <a:spcAft>
+                <a:spcPts val="0"/>
+              </a:spcAft>
+              <a:buClr>
+                <a:srgbClr val="000000"/>
+              </a:buClr>
+              <a:buSzPct val="25000"/>
               <a:buFont typeface="Helvetica Neue"/>
-              <a:buChar char="●"/>
-            </a:pPr>
-            <a:r>
-              <a:rPr lang="en-GB" sz="2400" b="0" i="0" u="none" strike="noStrike" cap="none" baseline="0">
+              <a:buNone/>
+            </a:pPr>
+            <a:r>
+              <a:rPr lang="en-GB" sz="3600" b="1" i="0" u="none" strike="noStrike" cap="none" baseline="0">
                 <a:solidFill>
                   <a:srgbClr val="000000"/>
                 </a:solidFill>
@@ -25822,109 +25876,8 @@
                 <a:sym typeface="Helvetica Neue"/>
                 <a:rtl val="0"/>
               </a:rPr>
-              <a:t>Mainly concerned with the communication between objects.</a:t>
-            </a:r>
-          </a:p>
-          <a:p>
-            <a:pPr marL="457200" marR="0" lvl="0" indent="-381000" algn="l" rtl="0">
-              <a:lnSpc>
-                <a:spcPct val="150000"/>
-              </a:lnSpc>
-              <a:spcBef>
-                <a:spcPts val="0"/>
-              </a:spcBef>
-              <a:spcAft>
-                <a:spcPts val="0"/>
-              </a:spcAft>
-              <a:buClr>
-                <a:srgbClr val="000000"/>
-              </a:buClr>
-              <a:buSzPct val="100000"/>
-              <a:buFont typeface="Helvetica Neue"/>
-              <a:buChar char="●"/>
-            </a:pPr>
-            <a:r>
-              <a:rPr lang="en-GB">
-                <a:rtl val="0"/>
-              </a:rPr>
-              <a:t>Describe a process or a flow</a:t>
-            </a:r>
-          </a:p>
-          <a:p>
-            <a:pPr marL="457200" marR="0" lvl="0" indent="-381000" algn="l" rtl="0">
-              <a:lnSpc>
-                <a:spcPct val="150000"/>
-              </a:lnSpc>
-              <a:spcBef>
-                <a:spcPts val="0"/>
-              </a:spcBef>
-              <a:spcAft>
-                <a:spcPts val="0"/>
-              </a:spcAft>
-              <a:buClr>
-                <a:srgbClr val="000000"/>
-              </a:buClr>
-              <a:buSzPct val="100000"/>
-              <a:buFont typeface="Helvetica Neue"/>
-              <a:buChar char="●"/>
-            </a:pPr>
-            <a:r>
-              <a:rPr lang="en-GB">
-                <a:rtl val="0"/>
-              </a:rPr>
-              <a:t>encapsulating behavior and delegating of requests</a:t>
-            </a:r>
-          </a:p>
-          <a:p>
-            <a:pPr marL="457200" marR="0" lvl="0" indent="-381000" algn="l" rtl="0">
-              <a:lnSpc>
-                <a:spcPct val="115000"/>
-              </a:lnSpc>
-              <a:spcBef>
-                <a:spcPts val="0"/>
-              </a:spcBef>
-              <a:spcAft>
-                <a:spcPts val="0"/>
-              </a:spcAft>
-              <a:buClr>
-                <a:srgbClr val="000000"/>
-              </a:buClr>
-              <a:buSzPct val="100000"/>
-              <a:buFont typeface="Helvetica Neue"/>
-              <a:buChar char="●"/>
-            </a:pPr>
-            <a:r>
-              <a:rPr lang="en-GB"/>
-              <a:t>increases flexibility </a:t>
-            </a:r>
-          </a:p>
-          <a:p>
-            <a:pPr marL="0" marR="0" lvl="0" indent="0" algn="l" rtl="0">
-              <a:lnSpc>
-                <a:spcPct val="100000"/>
-              </a:lnSpc>
-              <a:spcBef>
-                <a:spcPts val="0"/>
-              </a:spcBef>
-              <a:spcAft>
-                <a:spcPts val="0"/>
-              </a:spcAft>
-              <a:buClr>
-                <a:srgbClr val="000000"/>
-              </a:buClr>
-              <a:buFont typeface="Arial"/>
-              <a:buNone/>
-            </a:pPr>
-            <a:endParaRPr sz="2400" b="0" i="0" u="none" strike="noStrike" cap="none" baseline="0">
-              <a:solidFill>
-                <a:srgbClr val="000000"/>
-              </a:solidFill>
-              <a:latin typeface="Arial"/>
-              <a:ea typeface="Arial"/>
-              <a:cs typeface="Arial"/>
-              <a:sym typeface="Arial"/>
-              <a:rtl val="0"/>
-            </a:endParaRPr>
+              <a:t>Behavior Pattern in general</a:t>
+            </a:r>
           </a:p>
         </p:txBody>
       </p:sp>
@@ -26002,7 +25955,7 @@
   <p:clrMapOvr>
     <a:masterClrMapping/>
   </p:clrMapOvr>
-  <p:transition spd="slow">
+  <p:transition xmlns:p14="http://schemas.microsoft.com/office/powerpoint/2010/main" spd="slow">
     <p:cut/>
   </p:transition>
 </p:sld>
@@ -26055,9 +26008,6 @@
           <a:lstStyle/>
           <a:p>
             <a:pPr marL="0" marR="0" lvl="0" indent="0" algn="l" rtl="0">
-              <a:lnSpc>
-                <a:spcPct val="150000"/>
-              </a:lnSpc>
               <a:spcBef>
                 <a:spcPts val="0"/>
               </a:spcBef>
@@ -26933,7 +26883,7 @@
   <p:clrMapOvr>
     <a:masterClrMapping/>
   </p:clrMapOvr>
-  <p:transition spd="slow">
+  <p:transition xmlns:p14="http://schemas.microsoft.com/office/powerpoint/2010/main" spd="slow">
     <p:cut/>
   </p:transition>
 </p:sld>
@@ -26986,9 +26936,6 @@
           <a:lstStyle/>
           <a:p>
             <a:pPr marL="0" marR="0" lvl="0" indent="0" algn="l" rtl="0">
-              <a:lnSpc>
-                <a:spcPct val="150000"/>
-              </a:lnSpc>
               <a:spcBef>
                 <a:spcPts val="0"/>
               </a:spcBef>
@@ -27830,7 +27777,7 @@
   <p:clrMapOvr>
     <a:masterClrMapping/>
   </p:clrMapOvr>
-  <p:transition spd="slow">
+  <p:transition xmlns:p14="http://schemas.microsoft.com/office/powerpoint/2010/main" spd="slow">
     <p:cut/>
   </p:transition>
 </p:sld>
@@ -27883,9 +27830,6 @@
           <a:lstStyle/>
           <a:p>
             <a:pPr marL="0" marR="0" lvl="0" indent="0" algn="l" rtl="0">
-              <a:lnSpc>
-                <a:spcPct val="150000"/>
-              </a:lnSpc>
               <a:spcBef>
                 <a:spcPts val="0"/>
               </a:spcBef>
@@ -28872,7 +28816,7 @@
   <p:clrMapOvr>
     <a:masterClrMapping/>
   </p:clrMapOvr>
-  <p:transition spd="slow">
+  <p:transition xmlns:p14="http://schemas.microsoft.com/office/powerpoint/2010/main" spd="slow">
     <p:cut/>
   </p:transition>
 </p:sld>
@@ -28925,9 +28869,6 @@
           <a:lstStyle/>
           <a:p>
             <a:pPr marL="0" marR="0" lvl="0" indent="0" algn="l" rtl="0">
-              <a:lnSpc>
-                <a:spcPct val="150000"/>
-              </a:lnSpc>
               <a:spcBef>
                 <a:spcPts val="0"/>
               </a:spcBef>
@@ -29894,7 +29835,7 @@
   <p:clrMapOvr>
     <a:masterClrMapping/>
   </p:clrMapOvr>
-  <p:transition spd="slow">
+  <p:transition xmlns:p14="http://schemas.microsoft.com/office/powerpoint/2010/main" spd="slow">
     <p:cut/>
   </p:transition>
 </p:sld>
@@ -29947,9 +29888,6 @@
           <a:lstStyle/>
           <a:p>
             <a:pPr marL="0" marR="0" lvl="0" indent="0" algn="l" rtl="0">
-              <a:lnSpc>
-                <a:spcPct val="150000"/>
-              </a:lnSpc>
               <a:spcBef>
                 <a:spcPts val="0"/>
               </a:spcBef>
@@ -30314,7 +30252,7 @@
   <p:clrMapOvr>
     <a:masterClrMapping/>
   </p:clrMapOvr>
-  <p:transition spd="slow">
+  <p:transition xmlns:p14="http://schemas.microsoft.com/office/powerpoint/2010/main" spd="slow">
     <p:cut/>
   </p:transition>
 </p:sld>
@@ -30367,9 +30305,6 @@
           <a:lstStyle/>
           <a:p>
             <a:pPr marL="0" marR="0" lvl="0" indent="0" algn="l" rtl="0">
-              <a:lnSpc>
-                <a:spcPct val="150000"/>
-              </a:lnSpc>
               <a:spcBef>
                 <a:spcPts val="0"/>
               </a:spcBef>
@@ -31188,7 +31123,7 @@
   <p:clrMapOvr>
     <a:masterClrMapping/>
   </p:clrMapOvr>
-  <p:transition spd="slow">
+  <p:transition xmlns:p14="http://schemas.microsoft.com/office/powerpoint/2010/main" spd="slow">
     <p:cut/>
   </p:transition>
 </p:sld>
@@ -31453,9 +31388,6 @@
           <a:lstStyle/>
           <a:p>
             <a:pPr marL="0" marR="0" lvl="0" indent="0" algn="l" rtl="0">
-              <a:lnSpc>
-                <a:spcPct val="150000"/>
-              </a:lnSpc>
               <a:spcBef>
                 <a:spcPts val="0"/>
               </a:spcBef>
@@ -32468,7 +32400,7 @@
   <p:clrMapOvr>
     <a:masterClrMapping/>
   </p:clrMapOvr>
-  <p:transition spd="slow">
+  <p:transition xmlns:p14="http://schemas.microsoft.com/office/powerpoint/2010/main" spd="slow">
     <p:cut/>
   </p:transition>
 </p:sld>
@@ -32521,9 +32453,6 @@
           <a:lstStyle/>
           <a:p>
             <a:pPr marL="0" marR="0" lvl="0" indent="0" algn="l" rtl="0">
-              <a:lnSpc>
-                <a:spcPct val="150000"/>
-              </a:lnSpc>
               <a:spcBef>
                 <a:spcPts val="0"/>
               </a:spcBef>
@@ -32858,7 +32787,7 @@
   <p:clrMapOvr>
     <a:masterClrMapping/>
   </p:clrMapOvr>
-  <p:transition spd="slow">
+  <p:transition xmlns:p14="http://schemas.microsoft.com/office/powerpoint/2010/main" spd="slow">
     <p:cut/>
   </p:transition>
 </p:sld>
@@ -32911,9 +32840,6 @@
           <a:lstStyle/>
           <a:p>
             <a:pPr marL="0" marR="0" lvl="0" indent="0" algn="l" rtl="0">
-              <a:lnSpc>
-                <a:spcPct val="150000"/>
-              </a:lnSpc>
               <a:spcBef>
                 <a:spcPts val="0"/>
               </a:spcBef>
@@ -33329,7 +33255,7 @@
   <p:clrMapOvr>
     <a:masterClrMapping/>
   </p:clrMapOvr>
-  <p:transition spd="slow">
+  <p:transition xmlns:p14="http://schemas.microsoft.com/office/powerpoint/2010/main" spd="slow">
     <p:cut/>
   </p:transition>
 </p:sld>
@@ -33684,7 +33610,7 @@
   <p:clrMapOvr>
     <a:masterClrMapping/>
   </p:clrMapOvr>
-  <p:transition spd="slow">
+  <p:transition xmlns:p14="http://schemas.microsoft.com/office/powerpoint/2010/main" spd="slow">
     <p:cut/>
   </p:transition>
 </p:sld>
@@ -33737,9 +33663,6 @@
           <a:lstStyle/>
           <a:p>
             <a:pPr marL="0" marR="0" lvl="0" indent="0" algn="l" rtl="0">
-              <a:lnSpc>
-                <a:spcPct val="150000"/>
-              </a:lnSpc>
               <a:spcBef>
                 <a:spcPts val="0"/>
               </a:spcBef>
@@ -33800,7 +33723,7 @@
           <a:p>
             <a:pPr marL="457200" marR="0" lvl="0" indent="-381000" algn="l" rtl="0">
               <a:lnSpc>
-                <a:spcPct val="150000"/>
+                <a:spcPct val="100000"/>
               </a:lnSpc>
               <a:spcBef>
                 <a:spcPts val="0"/>
@@ -34044,7 +33967,7 @@
   <p:clrMapOvr>
     <a:masterClrMapping/>
   </p:clrMapOvr>
-  <p:transition spd="slow">
+  <p:transition xmlns:p14="http://schemas.microsoft.com/office/powerpoint/2010/main" spd="slow">
     <p:cut/>
   </p:transition>
 </p:sld>
@@ -34393,7 +34316,7 @@
   <p:clrMapOvr>
     <a:masterClrMapping/>
   </p:clrMapOvr>
-  <p:transition spd="slow">
+  <p:transition xmlns:p14="http://schemas.microsoft.com/office/powerpoint/2010/main" spd="slow">
     <p:cut/>
   </p:transition>
 </p:sld>
@@ -34840,7 +34763,7 @@
   <p:clrMapOvr>
     <a:masterClrMapping/>
   </p:clrMapOvr>
-  <p:transition spd="slow">
+  <p:transition xmlns:p14="http://schemas.microsoft.com/office/powerpoint/2010/main" spd="slow">
     <p:cut/>
   </p:transition>
 </p:sld>
@@ -35169,7 +35092,7 @@
   <p:clrMapOvr>
     <a:masterClrMapping/>
   </p:clrMapOvr>
-  <p:transition spd="slow">
+  <p:transition xmlns:p14="http://schemas.microsoft.com/office/powerpoint/2010/main" spd="slow">
     <p:cut/>
   </p:transition>
 </p:sld>
@@ -35533,7 +35456,7 @@
   <p:clrMapOvr>
     <a:masterClrMapping/>
   </p:clrMapOvr>
-  <p:transition spd="slow">
+  <p:transition xmlns:p14="http://schemas.microsoft.com/office/powerpoint/2010/main" spd="slow">
     <p:cut/>
   </p:transition>
 </p:sld>
@@ -35818,7 +35741,7 @@
   <p:clrMapOvr>
     <a:masterClrMapping/>
   </p:clrMapOvr>
-  <p:transition spd="slow">
+  <p:transition xmlns:p14="http://schemas.microsoft.com/office/powerpoint/2010/main" spd="slow">
     <p:cut/>
   </p:transition>
 </p:sld>
@@ -36182,7 +36105,7 @@
   <p:clrMapOvr>
     <a:masterClrMapping/>
   </p:clrMapOvr>
-  <p:transition spd="slow">
+  <p:transition xmlns:p14="http://schemas.microsoft.com/office/powerpoint/2010/main" spd="slow">
     <p:cut/>
   </p:transition>
 </p:sld>
@@ -36467,7 +36390,7 @@
   <p:clrMapOvr>
     <a:masterClrMapping/>
   </p:clrMapOvr>
-  <p:transition spd="slow">
+  <p:transition xmlns:p14="http://schemas.microsoft.com/office/powerpoint/2010/main" spd="slow">
     <p:cut/>
   </p:transition>
 </p:sld>
@@ -36869,7 +36792,7 @@
   <p:clrMapOvr>
     <a:masterClrMapping/>
   </p:clrMapOvr>
-  <p:transition spd="slow">
+  <p:transition xmlns:p14="http://schemas.microsoft.com/office/powerpoint/2010/main" spd="slow">
     <p:cut/>
   </p:transition>
 </p:sld>
@@ -36907,7 +36830,7 @@
         </p:blipFill>
         <p:spPr>
           <a:xfrm>
-            <a:off x="589737" y="3767850"/>
+            <a:off x="589737" y="3731306"/>
             <a:ext cx="7969274" cy="2231399"/>
           </a:xfrm>
           <a:prstGeom prst="rect">
@@ -36949,9 +36872,6 @@
           <a:lstStyle/>
           <a:p>
             <a:pPr marL="0" marR="0" lvl="0" indent="0" algn="l" rtl="0">
-              <a:lnSpc>
-                <a:spcPct val="150000"/>
-              </a:lnSpc>
               <a:spcBef>
                 <a:spcPts val="0"/>
               </a:spcBef>
@@ -37012,7 +36932,7 @@
           <a:p>
             <a:pPr marL="457200" marR="0" lvl="0" indent="-381000" algn="l" rtl="0">
               <a:lnSpc>
-                <a:spcPct val="150000"/>
+                <a:spcPct val="100000"/>
               </a:lnSpc>
               <a:spcBef>
                 <a:spcPts val="0"/>
@@ -37057,7 +36977,7 @@
           <a:p>
             <a:pPr marL="457200" marR="0" lvl="0" indent="-381000" algn="l" rtl="0">
               <a:lnSpc>
-                <a:spcPct val="150000"/>
+                <a:spcPct val="100000"/>
               </a:lnSpc>
               <a:spcBef>
                 <a:spcPts val="0"/>
@@ -37351,7 +37271,7 @@
   <p:clrMapOvr>
     <a:masterClrMapping/>
   </p:clrMapOvr>
-  <p:transition spd="slow">
+  <p:transition xmlns:p14="http://schemas.microsoft.com/office/powerpoint/2010/main" spd="slow">
     <p:cut/>
   </p:transition>
 </p:sld>
@@ -37404,9 +37324,6 @@
           <a:lstStyle/>
           <a:p>
             <a:pPr marL="0" marR="0" lvl="0" indent="0" algn="l" rtl="0">
-              <a:lnSpc>
-                <a:spcPct val="150000"/>
-              </a:lnSpc>
               <a:spcBef>
                 <a:spcPts val="0"/>
               </a:spcBef>
@@ -37467,7 +37384,7 @@
           <a:p>
             <a:pPr marL="457200" marR="0" lvl="0" indent="-381000" algn="l" rtl="0">
               <a:lnSpc>
-                <a:spcPct val="150000"/>
+                <a:spcPct val="100000"/>
               </a:lnSpc>
               <a:spcBef>
                 <a:spcPts val="0"/>
@@ -37691,7 +37608,7 @@
   <p:clrMapOvr>
     <a:masterClrMapping/>
   </p:clrMapOvr>
-  <p:transition spd="slow">
+  <p:transition xmlns:p14="http://schemas.microsoft.com/office/powerpoint/2010/main" spd="slow">
     <p:cut/>
   </p:transition>
 </p:sld>
@@ -37744,9 +37661,6 @@
           <a:lstStyle/>
           <a:p>
             <a:pPr marL="0" marR="0" lvl="0" indent="0" algn="l" rtl="0">
-              <a:lnSpc>
-                <a:spcPct val="150000"/>
-              </a:lnSpc>
               <a:spcBef>
                 <a:spcPts val="0"/>
               </a:spcBef>
@@ -37807,7 +37721,7 @@
           <a:p>
             <a:pPr marL="0" marR="0" lvl="0" indent="0" algn="l" rtl="0">
               <a:lnSpc>
-                <a:spcPct val="150000"/>
+                <a:spcPct val="100000"/>
               </a:lnSpc>
               <a:spcBef>
                 <a:spcPts val="0"/>
@@ -38938,7 +38852,7 @@
   <p:clrMapOvr>
     <a:masterClrMapping/>
   </p:clrMapOvr>
-  <p:transition spd="slow">
+  <p:transition xmlns:p14="http://schemas.microsoft.com/office/powerpoint/2010/main" spd="slow">
     <p:cut/>
   </p:transition>
 </p:sld>
@@ -38991,9 +38905,6 @@
           <a:lstStyle/>
           <a:p>
             <a:pPr marL="0" marR="0" lvl="0" indent="0" algn="l" rtl="0">
-              <a:lnSpc>
-                <a:spcPct val="150000"/>
-              </a:lnSpc>
               <a:spcBef>
                 <a:spcPts val="0"/>
               </a:spcBef>
@@ -40072,7 +39983,7 @@
   <p:clrMapOvr>
     <a:masterClrMapping/>
   </p:clrMapOvr>
-  <p:transition spd="slow">
+  <p:transition xmlns:p14="http://schemas.microsoft.com/office/powerpoint/2010/main" spd="slow">
     <p:cut/>
   </p:transition>
 </p:sld>
@@ -40125,9 +40036,6 @@
           <a:lstStyle/>
           <a:p>
             <a:pPr marL="0" marR="0" lvl="0" indent="0" algn="l" rtl="0">
-              <a:lnSpc>
-                <a:spcPct val="150000"/>
-              </a:lnSpc>
               <a:spcBef>
                 <a:spcPts val="0"/>
               </a:spcBef>
@@ -41007,7 +40915,7 @@
   <p:clrMapOvr>
     <a:masterClrMapping/>
   </p:clrMapOvr>
-  <p:transition spd="slow">
+  <p:transition xmlns:p14="http://schemas.microsoft.com/office/powerpoint/2010/main" spd="slow">
     <p:cut/>
   </p:transition>
 </p:sld>

</xml_diff>